<commit_message>
Added slides for Disjunction
</commit_message>
<xml_diff>
--- a/09_Disjunction/Disjunction.pptx
+++ b/09_Disjunction/Disjunction.pptx
@@ -5,7 +5,7 @@
     <p:sldMasterId id="2147483648" r:id="rId1"/>
   </p:sldMasterIdLst>
   <p:notesMasterIdLst>
-    <p:notesMasterId r:id="rId9"/>
+    <p:notesMasterId r:id="rId13"/>
   </p:notesMasterIdLst>
   <p:sldIdLst>
     <p:sldId id="258" r:id="rId2"/>
@@ -14,7 +14,11 @@
     <p:sldId id="357" r:id="rId5"/>
     <p:sldId id="364" r:id="rId6"/>
     <p:sldId id="365" r:id="rId7"/>
-    <p:sldId id="261" r:id="rId8"/>
+    <p:sldId id="366" r:id="rId8"/>
+    <p:sldId id="367" r:id="rId9"/>
+    <p:sldId id="368" r:id="rId10"/>
+    <p:sldId id="369" r:id="rId11"/>
+    <p:sldId id="261" r:id="rId12"/>
   </p:sldIdLst>
   <p:sldSz cx="12192000" cy="6858000"/>
   <p:notesSz cx="6858000" cy="9144000"/>
@@ -3544,7 +3548,7 @@
 </p:sld>
 </file>
 
-<file path=ppt/slides/slide2.xml><?xml version="1.0" encoding="utf-8"?>
+<file path=ppt/slides/slide10.xml><?xml version="1.0" encoding="utf-8"?>
 <p:sld xmlns:a="http://schemas.openxmlformats.org/drawingml/2006/main" xmlns:r="http://schemas.openxmlformats.org/officeDocument/2006/relationships" xmlns:p="http://schemas.openxmlformats.org/presentationml/2006/main">
   <p:cSld>
     <p:spTree>
@@ -3566,7 +3570,7 @@
           <p:cNvPr id="2" name="Title 1">
             <a:extLst>
               <a:ext uri="{FF2B5EF4-FFF2-40B4-BE49-F238E27FC236}">
-                <a16:creationId xmlns:a16="http://schemas.microsoft.com/office/drawing/2014/main" id="{2B419016-63A1-804E-A64E-506D76FDB939}"/>
+                <a16:creationId xmlns:a16="http://schemas.microsoft.com/office/drawing/2014/main" id="{490E2B65-CFE4-154D-89C2-18A0694DD2EA}"/>
               </a:ext>
             </a:extLst>
           </p:cNvPr>
@@ -3584,7 +3588,7 @@
           <a:p>
             <a:r>
               <a:rPr lang="en-US" dirty="0"/>
-              <a:t>What do we mean by disjunction</a:t>
+              <a:t>Exercise</a:t>
             </a:r>
           </a:p>
         </p:txBody>
@@ -3594,7 +3598,7 @@
           <p:cNvPr id="3" name="Content Placeholder 2">
             <a:extLst>
               <a:ext uri="{FF2B5EF4-FFF2-40B4-BE49-F238E27FC236}">
-                <a16:creationId xmlns:a16="http://schemas.microsoft.com/office/drawing/2014/main" id="{9949A817-3AC3-E444-8ACB-8FC21F690AAB}"/>
+                <a16:creationId xmlns:a16="http://schemas.microsoft.com/office/drawing/2014/main" id="{E80F0E83-249D-0A4A-A89A-08F835F53606}"/>
               </a:ext>
             </a:extLst>
           </p:cNvPr>
@@ -3605,99 +3609,19 @@
             <p:ph idx="1"/>
           </p:nvPr>
         </p:nvSpPr>
-        <p:spPr>
-          <a:xfrm>
-            <a:off x="838200" y="1825624"/>
-            <a:ext cx="10515600" cy="4530725"/>
-          </a:xfrm>
-        </p:spPr>
-        <p:txBody>
-          <a:bodyPr>
-            <a:normAutofit/>
-          </a:bodyPr>
+        <p:spPr/>
+        <p:txBody>
+          <a:bodyPr/>
           <a:lstStyle/>
           <a:p>
             <a:r>
               <a:rPr lang="en-US" dirty="0"/>
-              <a:t>P ∨ Q is true if P is true, or if Q is true, or if both are true.</a:t>
-            </a:r>
-          </a:p>
-          <a:p>
-            <a:pPr lvl="1"/>
-            <a:r>
-              <a:rPr lang="en-US" dirty="0"/>
-              <a:t>In logic, disjunctions typically use the word “or” to mean that either one or both of the propositions can be true</a:t>
-            </a:r>
-          </a:p>
-          <a:p>
-            <a:pPr lvl="1"/>
-            <a:r>
-              <a:rPr lang="en-US" dirty="0"/>
-              <a:t>Exclusive-or (</a:t>
-            </a:r>
-            <a:r>
-              <a:rPr lang="en-US" dirty="0" err="1"/>
-              <a:t>xor</a:t>
-            </a:r>
-            <a:r>
-              <a:rPr lang="en-US" dirty="0"/>
-              <a:t>) is used to mean exactly one of the two propositions is true</a:t>
-            </a:r>
-          </a:p>
-          <a:p>
-            <a:pPr lvl="1"/>
-            <a:r>
-              <a:rPr lang="en-US" dirty="0"/>
-              <a:t>In some contexts, a disjunction might take more than two propositions, in which case the disjunction is true if </a:t>
-            </a:r>
-            <a:r>
-              <a:rPr lang="en-US" i="1" dirty="0"/>
-              <a:t>at least</a:t>
-            </a:r>
-            <a:r>
-              <a:rPr lang="en-US" dirty="0"/>
-              <a:t> one of the propositions is true</a:t>
-            </a:r>
-          </a:p>
-          <a:p>
-            <a:r>
-              <a:rPr lang="en-US" dirty="0"/>
-              <a:t>Consider the statement “it is raining or the sprinkler is on”, this proposition is true if:</a:t>
-            </a:r>
-          </a:p>
-          <a:p>
-            <a:pPr lvl="1"/>
-            <a:r>
-              <a:rPr lang="en-US" dirty="0"/>
-              <a:t>It is raining, and the sprinkler is off</a:t>
-            </a:r>
-          </a:p>
-          <a:p>
-            <a:pPr lvl="1"/>
-            <a:r>
-              <a:rPr lang="en-US" dirty="0"/>
-              <a:t>It is not raining, but the sprinkler is on</a:t>
-            </a:r>
-          </a:p>
-          <a:p>
-            <a:pPr lvl="1"/>
-            <a:r>
-              <a:rPr lang="en-US" dirty="0"/>
-              <a:t>It is raining, and the sprinkler is on</a:t>
-            </a:r>
-          </a:p>
-          <a:p>
-            <a:pPr marL="0" indent="0">
-              <a:buNone/>
-            </a:pPr>
-            <a:endParaRPr lang="en-US" dirty="0"/>
-          </a:p>
-          <a:p>
-            <a:endParaRPr lang="en-US" dirty="0"/>
-          </a:p>
-          <a:p>
-            <a:pPr lvl="1"/>
-            <a:endParaRPr lang="en-US" dirty="0"/>
+              <a:t>Prove </a:t>
+            </a:r>
+            <a:r>
+              <a:rPr lang="en-US"/>
+              <a:t>that false is also a left identity</a:t>
+            </a:r>
           </a:p>
         </p:txBody>
       </p:sp>
@@ -3706,7 +3630,7 @@
           <p:cNvPr id="4" name="Slide Number Placeholder 3">
             <a:extLst>
               <a:ext uri="{FF2B5EF4-FFF2-40B4-BE49-F238E27FC236}">
-                <a16:creationId xmlns:a16="http://schemas.microsoft.com/office/drawing/2014/main" id="{8BA586D8-2005-074F-AA33-A27B1604B577}"/>
+                <a16:creationId xmlns:a16="http://schemas.microsoft.com/office/drawing/2014/main" id="{9BAC3B52-D572-7545-8A35-F695C3B6DA37}"/>
               </a:ext>
             </a:extLst>
           </p:cNvPr>
@@ -3724,7 +3648,7 @@
           <a:p>
             <a:fld id="{3352CBF5-17B8-4387-88A6-ABF9F8C64D5A}" type="slidenum">
               <a:rPr lang="en-US" smtClean="0"/>
-              <a:t>2</a:t>
+              <a:t>10</a:t>
             </a:fld>
             <a:endParaRPr lang="en-US"/>
           </a:p>
@@ -3733,7 +3657,7 @@
     </p:spTree>
     <p:extLst>
       <p:ext uri="{BB962C8B-B14F-4D97-AF65-F5344CB8AC3E}">
-        <p14:creationId xmlns:p14="http://schemas.microsoft.com/office/powerpoint/2010/main" val="972595728"/>
+        <p14:creationId xmlns:p14="http://schemas.microsoft.com/office/powerpoint/2010/main" val="1516482070"/>
       </p:ext>
     </p:extLst>
   </p:cSld>
@@ -3743,850 +3667,7 @@
 </p:sld>
 </file>
 
-<file path=ppt/slides/slide3.xml><?xml version="1.0" encoding="utf-8"?>
-<p:sld xmlns:a="http://schemas.openxmlformats.org/drawingml/2006/main" xmlns:r="http://schemas.openxmlformats.org/officeDocument/2006/relationships" xmlns:p="http://schemas.openxmlformats.org/presentationml/2006/main">
-  <p:cSld>
-    <p:spTree>
-      <p:nvGrpSpPr>
-        <p:cNvPr id="1" name=""/>
-        <p:cNvGrpSpPr/>
-        <p:nvPr/>
-      </p:nvGrpSpPr>
-      <p:grpSpPr>
-        <a:xfrm>
-          <a:off x="0" y="0"/>
-          <a:ext cx="0" cy="0"/>
-          <a:chOff x="0" y="0"/>
-          <a:chExt cx="0" cy="0"/>
-        </a:xfrm>
-      </p:grpSpPr>
-      <p:sp>
-        <p:nvSpPr>
-          <p:cNvPr id="2" name="Title 1">
-            <a:extLst>
-              <a:ext uri="{FF2B5EF4-FFF2-40B4-BE49-F238E27FC236}">
-                <a16:creationId xmlns:a16="http://schemas.microsoft.com/office/drawing/2014/main" id="{F472052E-1D9C-0845-BED4-1DCB56F57EAF}"/>
-              </a:ext>
-            </a:extLst>
-          </p:cNvPr>
-          <p:cNvSpPr>
-            <a:spLocks noGrp="1"/>
-          </p:cNvSpPr>
-          <p:nvPr>
-            <p:ph type="title"/>
-          </p:nvPr>
-        </p:nvSpPr>
-        <p:spPr/>
-        <p:txBody>
-          <a:bodyPr/>
-          <a:lstStyle/>
-          <a:p>
-            <a:r>
-              <a:rPr lang="en-US" dirty="0"/>
-              <a:t>Introduction rules</a:t>
-            </a:r>
-          </a:p>
-        </p:txBody>
-      </p:sp>
-      <p:sp>
-        <p:nvSpPr>
-          <p:cNvPr id="3" name="Content Placeholder 2">
-            <a:extLst>
-              <a:ext uri="{FF2B5EF4-FFF2-40B4-BE49-F238E27FC236}">
-                <a16:creationId xmlns:a16="http://schemas.microsoft.com/office/drawing/2014/main" id="{89564A94-BC7A-EA45-8A2C-1762C20F3133}"/>
-              </a:ext>
-            </a:extLst>
-          </p:cNvPr>
-          <p:cNvSpPr>
-            <a:spLocks noGrp="1"/>
-          </p:cNvSpPr>
-          <p:nvPr>
-            <p:ph idx="1"/>
-          </p:nvPr>
-        </p:nvSpPr>
-        <p:spPr/>
-        <p:txBody>
-          <a:bodyPr>
-            <a:normAutofit fontScale="92500" lnSpcReduction="20000"/>
-          </a:bodyPr>
-          <a:lstStyle/>
-          <a:p>
-            <a:r>
-              <a:rPr lang="en-US" dirty="0"/>
-              <a:t>Unlike conjunction which requires both propositions to be true, disjunction only requires one proposition to be true, so we have two introduction rules:</a:t>
-            </a:r>
-          </a:p>
-          <a:p>
-            <a:pPr marL="0" indent="0">
-              <a:buNone/>
-            </a:pPr>
-            <a:r>
-              <a:rPr lang="en-US" dirty="0">
-                <a:latin typeface="Courier New" panose="02070309020205020404" pitchFamily="49" charset="0"/>
-                <a:cs typeface="Courier New" panose="02070309020205020404" pitchFamily="49" charset="0"/>
-              </a:rPr>
-              <a:t>   { P } Q : Prop, </a:t>
-            </a:r>
-            <a:r>
-              <a:rPr lang="en-US" dirty="0" err="1">
-                <a:latin typeface="Courier New" panose="02070309020205020404" pitchFamily="49" charset="0"/>
-                <a:cs typeface="Courier New" panose="02070309020205020404" pitchFamily="49" charset="0"/>
-              </a:rPr>
-              <a:t>pfP</a:t>
-            </a:r>
-            <a:r>
-              <a:rPr lang="en-US" dirty="0">
-                <a:latin typeface="Courier New" panose="02070309020205020404" pitchFamily="49" charset="0"/>
-                <a:cs typeface="Courier New" panose="02070309020205020404" pitchFamily="49" charset="0"/>
-              </a:rPr>
-              <a:t>: P</a:t>
-            </a:r>
-          </a:p>
-          <a:p>
-            <a:pPr marL="0" indent="0">
-              <a:buNone/>
-            </a:pPr>
-            <a:r>
-              <a:rPr lang="en-US" dirty="0">
-                <a:latin typeface="Courier New" panose="02070309020205020404" pitchFamily="49" charset="0"/>
-                <a:cs typeface="Courier New" panose="02070309020205020404" pitchFamily="49" charset="0"/>
-              </a:rPr>
-              <a:t>   ---------------------- (</a:t>
-            </a:r>
-            <a:r>
-              <a:rPr lang="en-US" dirty="0" err="1">
-                <a:latin typeface="Courier New" panose="02070309020205020404" pitchFamily="49" charset="0"/>
-                <a:cs typeface="Courier New" panose="02070309020205020404" pitchFamily="49" charset="0"/>
-              </a:rPr>
-              <a:t>or.intro_left</a:t>
-            </a:r>
-            <a:r>
-              <a:rPr lang="en-US" dirty="0">
-                <a:latin typeface="Courier New" panose="02070309020205020404" pitchFamily="49" charset="0"/>
-                <a:cs typeface="Courier New" panose="02070309020205020404" pitchFamily="49" charset="0"/>
-              </a:rPr>
-              <a:t>)</a:t>
-            </a:r>
-          </a:p>
-          <a:p>
-            <a:pPr marL="0" indent="0">
-              <a:buNone/>
-            </a:pPr>
-            <a:r>
-              <a:rPr lang="en-US" dirty="0">
-                <a:latin typeface="Courier New" panose="02070309020205020404" pitchFamily="49" charset="0"/>
-                <a:cs typeface="Courier New" panose="02070309020205020404" pitchFamily="49" charset="0"/>
-              </a:rPr>
-              <a:t>            P ∨ Q</a:t>
-            </a:r>
-          </a:p>
-          <a:p>
-            <a:pPr marL="0" indent="0">
-              <a:buNone/>
-            </a:pPr>
-            <a:br>
-              <a:rPr lang="en-US" dirty="0">
-                <a:latin typeface="Courier New" panose="02070309020205020404" pitchFamily="49" charset="0"/>
-                <a:cs typeface="Courier New" panose="02070309020205020404" pitchFamily="49" charset="0"/>
-              </a:rPr>
-            </a:br>
-            <a:br>
-              <a:rPr lang="en-US" dirty="0">
-                <a:latin typeface="Courier New" panose="02070309020205020404" pitchFamily="49" charset="0"/>
-                <a:cs typeface="Courier New" panose="02070309020205020404" pitchFamily="49" charset="0"/>
-              </a:rPr>
-            </a:br>
-            <a:r>
-              <a:rPr lang="en-US" dirty="0">
-                <a:latin typeface="Courier New" panose="02070309020205020404" pitchFamily="49" charset="0"/>
-                <a:cs typeface="Courier New" panose="02070309020205020404" pitchFamily="49" charset="0"/>
-              </a:rPr>
-              <a:t>   P { Q } : Prop, </a:t>
-            </a:r>
-            <a:r>
-              <a:rPr lang="en-US" dirty="0" err="1">
-                <a:latin typeface="Courier New" panose="02070309020205020404" pitchFamily="49" charset="0"/>
-                <a:cs typeface="Courier New" panose="02070309020205020404" pitchFamily="49" charset="0"/>
-              </a:rPr>
-              <a:t>pfQ</a:t>
-            </a:r>
-            <a:r>
-              <a:rPr lang="en-US" dirty="0">
-                <a:latin typeface="Courier New" panose="02070309020205020404" pitchFamily="49" charset="0"/>
-                <a:cs typeface="Courier New" panose="02070309020205020404" pitchFamily="49" charset="0"/>
-              </a:rPr>
-              <a:t>: Q</a:t>
-            </a:r>
-          </a:p>
-          <a:p>
-            <a:pPr marL="0" indent="0">
-              <a:buNone/>
-            </a:pPr>
-            <a:r>
-              <a:rPr lang="en-US" dirty="0">
-                <a:latin typeface="Courier New" panose="02070309020205020404" pitchFamily="49" charset="0"/>
-                <a:cs typeface="Courier New" panose="02070309020205020404" pitchFamily="49" charset="0"/>
-              </a:rPr>
-              <a:t>   ----------------------- (</a:t>
-            </a:r>
-            <a:r>
-              <a:rPr lang="en-US" dirty="0" err="1">
-                <a:latin typeface="Courier New" panose="02070309020205020404" pitchFamily="49" charset="0"/>
-                <a:cs typeface="Courier New" panose="02070309020205020404" pitchFamily="49" charset="0"/>
-              </a:rPr>
-              <a:t>or.intro_right</a:t>
-            </a:r>
-            <a:r>
-              <a:rPr lang="en-US" dirty="0">
-                <a:latin typeface="Courier New" panose="02070309020205020404" pitchFamily="49" charset="0"/>
-                <a:cs typeface="Courier New" panose="02070309020205020404" pitchFamily="49" charset="0"/>
-              </a:rPr>
-              <a:t>)</a:t>
-            </a:r>
-          </a:p>
-          <a:p>
-            <a:pPr marL="0" indent="0">
-              <a:buNone/>
-            </a:pPr>
-            <a:r>
-              <a:rPr lang="en-US" dirty="0">
-                <a:latin typeface="Courier New" panose="02070309020205020404" pitchFamily="49" charset="0"/>
-                <a:cs typeface="Courier New" panose="02070309020205020404" pitchFamily="49" charset="0"/>
-              </a:rPr>
-              <a:t>            P ∨ Q</a:t>
-            </a:r>
-          </a:p>
-        </p:txBody>
-      </p:sp>
-      <p:sp>
-        <p:nvSpPr>
-          <p:cNvPr id="4" name="Slide Number Placeholder 3">
-            <a:extLst>
-              <a:ext uri="{FF2B5EF4-FFF2-40B4-BE49-F238E27FC236}">
-                <a16:creationId xmlns:a16="http://schemas.microsoft.com/office/drawing/2014/main" id="{A0BEE56D-15B5-1E41-BA16-98126A6145C4}"/>
-              </a:ext>
-            </a:extLst>
-          </p:cNvPr>
-          <p:cNvSpPr>
-            <a:spLocks noGrp="1"/>
-          </p:cNvSpPr>
-          <p:nvPr>
-            <p:ph type="sldNum" sz="quarter" idx="12"/>
-          </p:nvPr>
-        </p:nvSpPr>
-        <p:spPr/>
-        <p:txBody>
-          <a:bodyPr/>
-          <a:lstStyle/>
-          <a:p>
-            <a:fld id="{3352CBF5-17B8-4387-88A6-ABF9F8C64D5A}" type="slidenum">
-              <a:rPr lang="en-US" smtClean="0"/>
-              <a:t>3</a:t>
-            </a:fld>
-            <a:endParaRPr lang="en-US"/>
-          </a:p>
-        </p:txBody>
-      </p:sp>
-    </p:spTree>
-    <p:extLst>
-      <p:ext uri="{BB962C8B-B14F-4D97-AF65-F5344CB8AC3E}">
-        <p14:creationId xmlns:p14="http://schemas.microsoft.com/office/powerpoint/2010/main" val="1773216933"/>
-      </p:ext>
-    </p:extLst>
-  </p:cSld>
-  <p:clrMapOvr>
-    <a:masterClrMapping/>
-  </p:clrMapOvr>
-</p:sld>
-</file>
-
-<file path=ppt/slides/slide4.xml><?xml version="1.0" encoding="utf-8"?>
-<p:sld xmlns:a="http://schemas.openxmlformats.org/drawingml/2006/main" xmlns:r="http://schemas.openxmlformats.org/officeDocument/2006/relationships" xmlns:p="http://schemas.openxmlformats.org/presentationml/2006/main">
-  <p:cSld>
-    <p:spTree>
-      <p:nvGrpSpPr>
-        <p:cNvPr id="1" name=""/>
-        <p:cNvGrpSpPr/>
-        <p:nvPr/>
-      </p:nvGrpSpPr>
-      <p:grpSpPr>
-        <a:xfrm>
-          <a:off x="0" y="0"/>
-          <a:ext cx="0" cy="0"/>
-          <a:chOff x="0" y="0"/>
-          <a:chExt cx="0" cy="0"/>
-        </a:xfrm>
-      </p:grpSpPr>
-      <p:sp>
-        <p:nvSpPr>
-          <p:cNvPr id="2" name="Title 1">
-            <a:extLst>
-              <a:ext uri="{FF2B5EF4-FFF2-40B4-BE49-F238E27FC236}">
-                <a16:creationId xmlns:a16="http://schemas.microsoft.com/office/drawing/2014/main" id="{7C3A5C1B-5377-5943-BBD6-400C1DF8B732}"/>
-              </a:ext>
-            </a:extLst>
-          </p:cNvPr>
-          <p:cNvSpPr>
-            <a:spLocks noGrp="1"/>
-          </p:cNvSpPr>
-          <p:nvPr>
-            <p:ph type="title"/>
-          </p:nvPr>
-        </p:nvSpPr>
-        <p:spPr/>
-        <p:txBody>
-          <a:bodyPr/>
-          <a:lstStyle/>
-          <a:p>
-            <a:r>
-              <a:rPr lang="en-US" dirty="0"/>
-              <a:t>Introduction rules in Lean</a:t>
-            </a:r>
-          </a:p>
-        </p:txBody>
-      </p:sp>
-      <p:sp>
-        <p:nvSpPr>
-          <p:cNvPr id="3" name="Content Placeholder 2">
-            <a:extLst>
-              <a:ext uri="{FF2B5EF4-FFF2-40B4-BE49-F238E27FC236}">
-                <a16:creationId xmlns:a16="http://schemas.microsoft.com/office/drawing/2014/main" id="{E7B52B44-A0EA-4F40-8568-39C57B222C6F}"/>
-              </a:ext>
-            </a:extLst>
-          </p:cNvPr>
-          <p:cNvSpPr>
-            <a:spLocks noGrp="1"/>
-          </p:cNvSpPr>
-          <p:nvPr>
-            <p:ph idx="1"/>
-          </p:nvPr>
-        </p:nvSpPr>
-        <p:spPr/>
-        <p:txBody>
-          <a:bodyPr/>
-          <a:lstStyle/>
-          <a:p>
-            <a:r>
-              <a:rPr lang="en-US" dirty="0"/>
-              <a:t>Lean provides the </a:t>
-            </a:r>
-            <a:r>
-              <a:rPr lang="en-US" dirty="0" err="1"/>
-              <a:t>or.intro_left</a:t>
-            </a:r>
-            <a:r>
-              <a:rPr lang="en-US" dirty="0"/>
-              <a:t> and </a:t>
-            </a:r>
-            <a:r>
-              <a:rPr lang="en-US" dirty="0" err="1"/>
-              <a:t>or.intro_right</a:t>
-            </a:r>
-            <a:r>
-              <a:rPr lang="en-US" dirty="0"/>
-              <a:t> rules</a:t>
-            </a:r>
-          </a:p>
-          <a:p>
-            <a:pPr marL="0" indent="0">
-              <a:buNone/>
-            </a:pPr>
-            <a:r>
-              <a:rPr lang="en-US" sz="2400" dirty="0">
-                <a:latin typeface="Courier New" panose="02070309020205020404" pitchFamily="49" charset="0"/>
-                <a:cs typeface="Courier New" panose="02070309020205020404" pitchFamily="49" charset="0"/>
-              </a:rPr>
-              <a:t>example : P ∨ false := </a:t>
-            </a:r>
-          </a:p>
-          <a:p>
-            <a:pPr marL="0" indent="0">
-              <a:buNone/>
-            </a:pPr>
-            <a:r>
-              <a:rPr lang="en-US" sz="2400" dirty="0">
-                <a:latin typeface="Courier New" panose="02070309020205020404" pitchFamily="49" charset="0"/>
-                <a:cs typeface="Courier New" panose="02070309020205020404" pitchFamily="49" charset="0"/>
-              </a:rPr>
-              <a:t>  </a:t>
-            </a:r>
-            <a:r>
-              <a:rPr lang="en-US" sz="2400" dirty="0" err="1">
-                <a:latin typeface="Courier New" panose="02070309020205020404" pitchFamily="49" charset="0"/>
-                <a:cs typeface="Courier New" panose="02070309020205020404" pitchFamily="49" charset="0"/>
-              </a:rPr>
-              <a:t>or.intro_left</a:t>
-            </a:r>
-            <a:r>
-              <a:rPr lang="en-US" sz="2400" dirty="0">
-                <a:latin typeface="Courier New" panose="02070309020205020404" pitchFamily="49" charset="0"/>
-                <a:cs typeface="Courier New" panose="02070309020205020404" pitchFamily="49" charset="0"/>
-              </a:rPr>
-              <a:t> false </a:t>
-            </a:r>
-            <a:r>
-              <a:rPr lang="en-US" sz="2400" dirty="0" err="1">
-                <a:latin typeface="Courier New" panose="02070309020205020404" pitchFamily="49" charset="0"/>
-                <a:cs typeface="Courier New" panose="02070309020205020404" pitchFamily="49" charset="0"/>
-              </a:rPr>
-              <a:t>pfP</a:t>
-            </a:r>
-            <a:endParaRPr lang="en-US" sz="2400" dirty="0">
-              <a:latin typeface="Courier New" panose="02070309020205020404" pitchFamily="49" charset="0"/>
-              <a:cs typeface="Courier New" panose="02070309020205020404" pitchFamily="49" charset="0"/>
-            </a:endParaRPr>
-          </a:p>
-          <a:p>
-            <a:pPr marL="0" indent="0">
-              <a:buNone/>
-            </a:pPr>
-            <a:br>
-              <a:rPr lang="en-US" sz="2400" dirty="0">
-                <a:latin typeface="Courier New" panose="02070309020205020404" pitchFamily="49" charset="0"/>
-                <a:cs typeface="Courier New" panose="02070309020205020404" pitchFamily="49" charset="0"/>
-              </a:rPr>
-            </a:br>
-            <a:r>
-              <a:rPr lang="en-US" sz="2400" dirty="0">
-                <a:latin typeface="Courier New" panose="02070309020205020404" pitchFamily="49" charset="0"/>
-                <a:cs typeface="Courier New" panose="02070309020205020404" pitchFamily="49" charset="0"/>
-              </a:rPr>
-              <a:t>example : false ∨ P := </a:t>
-            </a:r>
-          </a:p>
-          <a:p>
-            <a:pPr marL="0" indent="0">
-              <a:buNone/>
-            </a:pPr>
-            <a:r>
-              <a:rPr lang="en-US" sz="2400" dirty="0">
-                <a:latin typeface="Courier New" panose="02070309020205020404" pitchFamily="49" charset="0"/>
-                <a:cs typeface="Courier New" panose="02070309020205020404" pitchFamily="49" charset="0"/>
-              </a:rPr>
-              <a:t>  </a:t>
-            </a:r>
-            <a:r>
-              <a:rPr lang="en-US" sz="2400" dirty="0" err="1">
-                <a:latin typeface="Courier New" panose="02070309020205020404" pitchFamily="49" charset="0"/>
-                <a:cs typeface="Courier New" panose="02070309020205020404" pitchFamily="49" charset="0"/>
-              </a:rPr>
-              <a:t>or.intro_right</a:t>
-            </a:r>
-            <a:r>
-              <a:rPr lang="en-US" sz="2400" dirty="0">
-                <a:latin typeface="Courier New" panose="02070309020205020404" pitchFamily="49" charset="0"/>
-                <a:cs typeface="Courier New" panose="02070309020205020404" pitchFamily="49" charset="0"/>
-              </a:rPr>
-              <a:t> false </a:t>
-            </a:r>
-            <a:r>
-              <a:rPr lang="en-US" sz="2400" dirty="0" err="1">
-                <a:latin typeface="Courier New" panose="02070309020205020404" pitchFamily="49" charset="0"/>
-                <a:cs typeface="Courier New" panose="02070309020205020404" pitchFamily="49" charset="0"/>
-              </a:rPr>
-              <a:t>pfP</a:t>
-            </a:r>
-            <a:endParaRPr lang="en-US" sz="2400" dirty="0">
-              <a:latin typeface="Courier New" panose="02070309020205020404" pitchFamily="49" charset="0"/>
-              <a:cs typeface="Courier New" panose="02070309020205020404" pitchFamily="49" charset="0"/>
-            </a:endParaRPr>
-          </a:p>
-          <a:p>
-            <a:pPr marL="0" indent="0">
-              <a:buNone/>
-            </a:pPr>
-            <a:endParaRPr lang="en-US" dirty="0"/>
-          </a:p>
-        </p:txBody>
-      </p:sp>
-      <p:sp>
-        <p:nvSpPr>
-          <p:cNvPr id="4" name="Slide Number Placeholder 3">
-            <a:extLst>
-              <a:ext uri="{FF2B5EF4-FFF2-40B4-BE49-F238E27FC236}">
-                <a16:creationId xmlns:a16="http://schemas.microsoft.com/office/drawing/2014/main" id="{0C889411-5F53-554E-B510-1D5FFC133E07}"/>
-              </a:ext>
-            </a:extLst>
-          </p:cNvPr>
-          <p:cNvSpPr>
-            <a:spLocks noGrp="1"/>
-          </p:cNvSpPr>
-          <p:nvPr>
-            <p:ph type="sldNum" sz="quarter" idx="12"/>
-          </p:nvPr>
-        </p:nvSpPr>
-        <p:spPr/>
-        <p:txBody>
-          <a:bodyPr/>
-          <a:lstStyle/>
-          <a:p>
-            <a:fld id="{3352CBF5-17B8-4387-88A6-ABF9F8C64D5A}" type="slidenum">
-              <a:rPr lang="en-US" smtClean="0"/>
-              <a:t>4</a:t>
-            </a:fld>
-            <a:endParaRPr lang="en-US"/>
-          </a:p>
-        </p:txBody>
-      </p:sp>
-    </p:spTree>
-    <p:extLst>
-      <p:ext uri="{BB962C8B-B14F-4D97-AF65-F5344CB8AC3E}">
-        <p14:creationId xmlns:p14="http://schemas.microsoft.com/office/powerpoint/2010/main" val="3464213433"/>
-      </p:ext>
-    </p:extLst>
-  </p:cSld>
-  <p:clrMapOvr>
-    <a:masterClrMapping/>
-  </p:clrMapOvr>
-</p:sld>
-</file>
-
-<file path=ppt/slides/slide5.xml><?xml version="1.0" encoding="utf-8"?>
-<p:sld xmlns:a="http://schemas.openxmlformats.org/drawingml/2006/main" xmlns:r="http://schemas.openxmlformats.org/officeDocument/2006/relationships" xmlns:p="http://schemas.openxmlformats.org/presentationml/2006/main">
-  <p:cSld>
-    <p:spTree>
-      <p:nvGrpSpPr>
-        <p:cNvPr id="1" name=""/>
-        <p:cNvGrpSpPr/>
-        <p:nvPr/>
-      </p:nvGrpSpPr>
-      <p:grpSpPr>
-        <a:xfrm>
-          <a:off x="0" y="0"/>
-          <a:ext cx="0" cy="0"/>
-          <a:chOff x="0" y="0"/>
-          <a:chExt cx="0" cy="0"/>
-        </a:xfrm>
-      </p:grpSpPr>
-      <p:sp>
-        <p:nvSpPr>
-          <p:cNvPr id="2" name="Title 1">
-            <a:extLst>
-              <a:ext uri="{FF2B5EF4-FFF2-40B4-BE49-F238E27FC236}">
-                <a16:creationId xmlns:a16="http://schemas.microsoft.com/office/drawing/2014/main" id="{F4EE265F-B1AC-DC4D-9D8C-FE4E136E6F47}"/>
-              </a:ext>
-            </a:extLst>
-          </p:cNvPr>
-          <p:cNvSpPr>
-            <a:spLocks noGrp="1"/>
-          </p:cNvSpPr>
-          <p:nvPr>
-            <p:ph type="title"/>
-          </p:nvPr>
-        </p:nvSpPr>
-        <p:spPr/>
-        <p:txBody>
-          <a:bodyPr/>
-          <a:lstStyle/>
-          <a:p>
-            <a:r>
-              <a:rPr lang="en-US" dirty="0"/>
-              <a:t>Right Identity for Disjunction</a:t>
-            </a:r>
-          </a:p>
-        </p:txBody>
-      </p:sp>
-      <p:sp>
-        <p:nvSpPr>
-          <p:cNvPr id="3" name="Content Placeholder 2">
-            <a:extLst>
-              <a:ext uri="{FF2B5EF4-FFF2-40B4-BE49-F238E27FC236}">
-                <a16:creationId xmlns:a16="http://schemas.microsoft.com/office/drawing/2014/main" id="{C13B504E-F089-154D-9B13-B9EA8AF15F74}"/>
-              </a:ext>
-            </a:extLst>
-          </p:cNvPr>
-          <p:cNvSpPr>
-            <a:spLocks noGrp="1"/>
-          </p:cNvSpPr>
-          <p:nvPr>
-            <p:ph idx="1"/>
-          </p:nvPr>
-        </p:nvSpPr>
-        <p:spPr/>
-        <p:txBody>
-          <a:bodyPr/>
-          <a:lstStyle/>
-          <a:p>
-            <a:r>
-              <a:rPr lang="en-US"/>
-              <a:t>Identities</a:t>
-            </a:r>
-          </a:p>
-          <a:p>
-            <a:r>
-              <a:rPr lang="en-US" dirty="0"/>
-              <a:t>True is a “right identity” for disjunction:</a:t>
-            </a:r>
-          </a:p>
-          <a:p>
-            <a:pPr marL="0" indent="0">
-              <a:buNone/>
-            </a:pPr>
-            <a:r>
-              <a:rPr lang="en-US" sz="2400" dirty="0">
-                <a:latin typeface="Courier New" panose="02070309020205020404" pitchFamily="49" charset="0"/>
-                <a:cs typeface="Courier New" panose="02070309020205020404" pitchFamily="49" charset="0"/>
-              </a:rPr>
-              <a:t>theorem </a:t>
-            </a:r>
-            <a:r>
-              <a:rPr lang="en-US" sz="2400" dirty="0" err="1">
-                <a:latin typeface="Courier New" panose="02070309020205020404" pitchFamily="49" charset="0"/>
-                <a:cs typeface="Courier New" panose="02070309020205020404" pitchFamily="49" charset="0"/>
-              </a:rPr>
-              <a:t>id_right_or</a:t>
-            </a:r>
-            <a:r>
-              <a:rPr lang="en-US" sz="2400" dirty="0">
-                <a:latin typeface="Courier New" panose="02070309020205020404" pitchFamily="49" charset="0"/>
-                <a:cs typeface="Courier New" panose="02070309020205020404" pitchFamily="49" charset="0"/>
-              </a:rPr>
-              <a:t> : </a:t>
-            </a:r>
-          </a:p>
-          <a:p>
-            <a:pPr marL="0" indent="0">
-              <a:buNone/>
-            </a:pPr>
-            <a:r>
-              <a:rPr lang="en-US" sz="2400" dirty="0">
-                <a:latin typeface="Courier New" panose="02070309020205020404" pitchFamily="49" charset="0"/>
-                <a:cs typeface="Courier New" panose="02070309020205020404" pitchFamily="49" charset="0"/>
-              </a:rPr>
-              <a:t>  ∀ P : Prop, P ∨ true :=</a:t>
-            </a:r>
-          </a:p>
-          <a:p>
-            <a:pPr marL="0" indent="0">
-              <a:buNone/>
-            </a:pPr>
-            <a:r>
-              <a:rPr lang="en-US" sz="2400" dirty="0">
-                <a:latin typeface="Courier New" panose="02070309020205020404" pitchFamily="49" charset="0"/>
-                <a:cs typeface="Courier New" panose="02070309020205020404" pitchFamily="49" charset="0"/>
-              </a:rPr>
-              <a:t>    </a:t>
-            </a:r>
-            <a:r>
-              <a:rPr lang="el-GR" sz="2400" dirty="0">
-                <a:latin typeface="Courier New" panose="02070309020205020404" pitchFamily="49" charset="0"/>
-                <a:cs typeface="Courier New" panose="02070309020205020404" pitchFamily="49" charset="0"/>
-              </a:rPr>
-              <a:t>λ </a:t>
-            </a:r>
-            <a:r>
-              <a:rPr lang="en-US" sz="2400" dirty="0">
-                <a:latin typeface="Courier New" panose="02070309020205020404" pitchFamily="49" charset="0"/>
-                <a:cs typeface="Courier New" panose="02070309020205020404" pitchFamily="49" charset="0"/>
-              </a:rPr>
-              <a:t>P,</a:t>
-            </a:r>
-          </a:p>
-          <a:p>
-            <a:pPr marL="0" indent="0">
-              <a:buNone/>
-            </a:pPr>
-            <a:r>
-              <a:rPr lang="en-US" sz="2400" dirty="0">
-                <a:latin typeface="Courier New" panose="02070309020205020404" pitchFamily="49" charset="0"/>
-                <a:cs typeface="Courier New" panose="02070309020205020404" pitchFamily="49" charset="0"/>
-              </a:rPr>
-              <a:t>      </a:t>
-            </a:r>
-            <a:r>
-              <a:rPr lang="en-US" sz="2400" dirty="0" err="1">
-                <a:latin typeface="Courier New" panose="02070309020205020404" pitchFamily="49" charset="0"/>
-                <a:cs typeface="Courier New" panose="02070309020205020404" pitchFamily="49" charset="0"/>
-              </a:rPr>
-              <a:t>or.intro_right</a:t>
-            </a:r>
-            <a:r>
-              <a:rPr lang="en-US" sz="2400" dirty="0">
-                <a:latin typeface="Courier New" panose="02070309020205020404" pitchFamily="49" charset="0"/>
-                <a:cs typeface="Courier New" panose="02070309020205020404" pitchFamily="49" charset="0"/>
-              </a:rPr>
-              <a:t> P </a:t>
-            </a:r>
-            <a:r>
-              <a:rPr lang="en-US" sz="2400" dirty="0" err="1">
-                <a:latin typeface="Courier New" panose="02070309020205020404" pitchFamily="49" charset="0"/>
-                <a:cs typeface="Courier New" panose="02070309020205020404" pitchFamily="49" charset="0"/>
-              </a:rPr>
-              <a:t>true.intro</a:t>
-            </a:r>
-            <a:endParaRPr lang="en-US" sz="2400" dirty="0">
-              <a:latin typeface="Courier New" panose="02070309020205020404" pitchFamily="49" charset="0"/>
-              <a:cs typeface="Courier New" panose="02070309020205020404" pitchFamily="49" charset="0"/>
-            </a:endParaRPr>
-          </a:p>
-          <a:p>
-            <a:r>
-              <a:rPr lang="en-US" dirty="0">
-                <a:cs typeface="Courier New" panose="02070309020205020404" pitchFamily="49" charset="0"/>
-              </a:rPr>
-              <a:t>Exercise: Prove that true is also a “left identity” for disjunction</a:t>
-            </a:r>
-          </a:p>
-          <a:p>
-            <a:endParaRPr lang="en-US" dirty="0"/>
-          </a:p>
-        </p:txBody>
-      </p:sp>
-      <p:sp>
-        <p:nvSpPr>
-          <p:cNvPr id="4" name="Slide Number Placeholder 3">
-            <a:extLst>
-              <a:ext uri="{FF2B5EF4-FFF2-40B4-BE49-F238E27FC236}">
-                <a16:creationId xmlns:a16="http://schemas.microsoft.com/office/drawing/2014/main" id="{4E6EC673-4884-A048-8F9A-2B0EADAE0160}"/>
-              </a:ext>
-            </a:extLst>
-          </p:cNvPr>
-          <p:cNvSpPr>
-            <a:spLocks noGrp="1"/>
-          </p:cNvSpPr>
-          <p:nvPr>
-            <p:ph type="sldNum" sz="quarter" idx="12"/>
-          </p:nvPr>
-        </p:nvSpPr>
-        <p:spPr/>
-        <p:txBody>
-          <a:bodyPr/>
-          <a:lstStyle/>
-          <a:p>
-            <a:fld id="{3352CBF5-17B8-4387-88A6-ABF9F8C64D5A}" type="slidenum">
-              <a:rPr lang="en-US" smtClean="0"/>
-              <a:t>5</a:t>
-            </a:fld>
-            <a:endParaRPr lang="en-US"/>
-          </a:p>
-        </p:txBody>
-      </p:sp>
-    </p:spTree>
-    <p:extLst>
-      <p:ext uri="{BB962C8B-B14F-4D97-AF65-F5344CB8AC3E}">
-        <p14:creationId xmlns:p14="http://schemas.microsoft.com/office/powerpoint/2010/main" val="1537724452"/>
-      </p:ext>
-    </p:extLst>
-  </p:cSld>
-  <p:clrMapOvr>
-    <a:masterClrMapping/>
-  </p:clrMapOvr>
-</p:sld>
-</file>
-
-<file path=ppt/slides/slide6.xml><?xml version="1.0" encoding="utf-8"?>
-<p:sld xmlns:a="http://schemas.openxmlformats.org/drawingml/2006/main" xmlns:r="http://schemas.openxmlformats.org/officeDocument/2006/relationships" xmlns:p="http://schemas.openxmlformats.org/presentationml/2006/main">
-  <p:cSld>
-    <p:spTree>
-      <p:nvGrpSpPr>
-        <p:cNvPr id="1" name=""/>
-        <p:cNvGrpSpPr/>
-        <p:nvPr/>
-      </p:nvGrpSpPr>
-      <p:grpSpPr>
-        <a:xfrm>
-          <a:off x="0" y="0"/>
-          <a:ext cx="0" cy="0"/>
-          <a:chOff x="0" y="0"/>
-          <a:chExt cx="0" cy="0"/>
-        </a:xfrm>
-      </p:grpSpPr>
-      <p:sp>
-        <p:nvSpPr>
-          <p:cNvPr id="2" name="Title 1">
-            <a:extLst>
-              <a:ext uri="{FF2B5EF4-FFF2-40B4-BE49-F238E27FC236}">
-                <a16:creationId xmlns:a16="http://schemas.microsoft.com/office/drawing/2014/main" id="{83DDEC75-12A1-784D-AC83-03D678B0D31A}"/>
-              </a:ext>
-            </a:extLst>
-          </p:cNvPr>
-          <p:cNvSpPr>
-            <a:spLocks noGrp="1"/>
-          </p:cNvSpPr>
-          <p:nvPr>
-            <p:ph type="title"/>
-          </p:nvPr>
-        </p:nvSpPr>
-        <p:spPr/>
-        <p:txBody>
-          <a:bodyPr/>
-          <a:lstStyle/>
-          <a:p>
-            <a:r>
-              <a:rPr lang="en-US" dirty="0"/>
-              <a:t>Exercise</a:t>
-            </a:r>
-          </a:p>
-        </p:txBody>
-      </p:sp>
-      <p:sp>
-        <p:nvSpPr>
-          <p:cNvPr id="3" name="Content Placeholder 2">
-            <a:extLst>
-              <a:ext uri="{FF2B5EF4-FFF2-40B4-BE49-F238E27FC236}">
-                <a16:creationId xmlns:a16="http://schemas.microsoft.com/office/drawing/2014/main" id="{73097CB7-C02E-CB40-8A26-B331EF9E630A}"/>
-              </a:ext>
-            </a:extLst>
-          </p:cNvPr>
-          <p:cNvSpPr>
-            <a:spLocks noGrp="1"/>
-          </p:cNvSpPr>
-          <p:nvPr>
-            <p:ph idx="1"/>
-          </p:nvPr>
-        </p:nvSpPr>
-        <p:spPr/>
-        <p:txBody>
-          <a:bodyPr/>
-          <a:lstStyle/>
-          <a:p>
-            <a:endParaRPr lang="en-US"/>
-          </a:p>
-        </p:txBody>
-      </p:sp>
-      <p:sp>
-        <p:nvSpPr>
-          <p:cNvPr id="4" name="Slide Number Placeholder 3">
-            <a:extLst>
-              <a:ext uri="{FF2B5EF4-FFF2-40B4-BE49-F238E27FC236}">
-                <a16:creationId xmlns:a16="http://schemas.microsoft.com/office/drawing/2014/main" id="{CA053BD6-EFB1-BF44-B448-B32BC87043FF}"/>
-              </a:ext>
-            </a:extLst>
-          </p:cNvPr>
-          <p:cNvSpPr>
-            <a:spLocks noGrp="1"/>
-          </p:cNvSpPr>
-          <p:nvPr>
-            <p:ph type="sldNum" sz="quarter" idx="12"/>
-          </p:nvPr>
-        </p:nvSpPr>
-        <p:spPr/>
-        <p:txBody>
-          <a:bodyPr/>
-          <a:lstStyle/>
-          <a:p>
-            <a:fld id="{3352CBF5-17B8-4387-88A6-ABF9F8C64D5A}" type="slidenum">
-              <a:rPr lang="en-US" smtClean="0"/>
-              <a:t>6</a:t>
-            </a:fld>
-            <a:endParaRPr lang="en-US"/>
-          </a:p>
-        </p:txBody>
-      </p:sp>
-    </p:spTree>
-    <p:extLst>
-      <p:ext uri="{BB962C8B-B14F-4D97-AF65-F5344CB8AC3E}">
-        <p14:creationId xmlns:p14="http://schemas.microsoft.com/office/powerpoint/2010/main" val="721220024"/>
-      </p:ext>
-    </p:extLst>
-  </p:cSld>
-  <p:clrMapOvr>
-    <a:masterClrMapping/>
-  </p:clrMapOvr>
-</p:sld>
-</file>
-
-<file path=ppt/slides/slide7.xml><?xml version="1.0" encoding="utf-8"?>
+<file path=ppt/slides/slide11.xml><?xml version="1.0" encoding="utf-8"?>
 <p:sld xmlns:a="http://schemas.openxmlformats.org/drawingml/2006/main" xmlns:r="http://schemas.openxmlformats.org/officeDocument/2006/relationships" xmlns:p="http://schemas.openxmlformats.org/presentationml/2006/main">
   <p:cSld>
     <p:bg>
@@ -4857,7 +3938,7 @@
           <a:p>
             <a:fld id="{3352CBF5-17B8-4387-88A6-ABF9F8C64D5A}" type="slidenum">
               <a:rPr lang="en-US" smtClean="0"/>
-              <a:t>7</a:t>
+              <a:t>11</a:t>
             </a:fld>
             <a:endParaRPr lang="en-US"/>
           </a:p>
@@ -4867,6 +3948,2030 @@
     <p:extLst>
       <p:ext uri="{BB962C8B-B14F-4D97-AF65-F5344CB8AC3E}">
         <p14:creationId xmlns:p14="http://schemas.microsoft.com/office/powerpoint/2010/main" val="628979899"/>
+      </p:ext>
+    </p:extLst>
+  </p:cSld>
+  <p:clrMapOvr>
+    <a:masterClrMapping/>
+  </p:clrMapOvr>
+</p:sld>
+</file>
+
+<file path=ppt/slides/slide2.xml><?xml version="1.0" encoding="utf-8"?>
+<p:sld xmlns:a="http://schemas.openxmlformats.org/drawingml/2006/main" xmlns:r="http://schemas.openxmlformats.org/officeDocument/2006/relationships" xmlns:p="http://schemas.openxmlformats.org/presentationml/2006/main">
+  <p:cSld>
+    <p:spTree>
+      <p:nvGrpSpPr>
+        <p:cNvPr id="1" name=""/>
+        <p:cNvGrpSpPr/>
+        <p:nvPr/>
+      </p:nvGrpSpPr>
+      <p:grpSpPr>
+        <a:xfrm>
+          <a:off x="0" y="0"/>
+          <a:ext cx="0" cy="0"/>
+          <a:chOff x="0" y="0"/>
+          <a:chExt cx="0" cy="0"/>
+        </a:xfrm>
+      </p:grpSpPr>
+      <p:sp>
+        <p:nvSpPr>
+          <p:cNvPr id="2" name="Title 1">
+            <a:extLst>
+              <a:ext uri="{FF2B5EF4-FFF2-40B4-BE49-F238E27FC236}">
+                <a16:creationId xmlns:a16="http://schemas.microsoft.com/office/drawing/2014/main" id="{2B419016-63A1-804E-A64E-506D76FDB939}"/>
+              </a:ext>
+            </a:extLst>
+          </p:cNvPr>
+          <p:cNvSpPr>
+            <a:spLocks noGrp="1"/>
+          </p:cNvSpPr>
+          <p:nvPr>
+            <p:ph type="title"/>
+          </p:nvPr>
+        </p:nvSpPr>
+        <p:spPr/>
+        <p:txBody>
+          <a:bodyPr/>
+          <a:lstStyle/>
+          <a:p>
+            <a:r>
+              <a:rPr lang="en-US" dirty="0"/>
+              <a:t>What do we mean by disjunction</a:t>
+            </a:r>
+          </a:p>
+        </p:txBody>
+      </p:sp>
+      <p:sp>
+        <p:nvSpPr>
+          <p:cNvPr id="3" name="Content Placeholder 2">
+            <a:extLst>
+              <a:ext uri="{FF2B5EF4-FFF2-40B4-BE49-F238E27FC236}">
+                <a16:creationId xmlns:a16="http://schemas.microsoft.com/office/drawing/2014/main" id="{9949A817-3AC3-E444-8ACB-8FC21F690AAB}"/>
+              </a:ext>
+            </a:extLst>
+          </p:cNvPr>
+          <p:cNvSpPr>
+            <a:spLocks noGrp="1"/>
+          </p:cNvSpPr>
+          <p:nvPr>
+            <p:ph idx="1"/>
+          </p:nvPr>
+        </p:nvSpPr>
+        <p:spPr>
+          <a:xfrm>
+            <a:off x="838200" y="1825624"/>
+            <a:ext cx="10515600" cy="4530725"/>
+          </a:xfrm>
+        </p:spPr>
+        <p:txBody>
+          <a:bodyPr>
+            <a:normAutofit/>
+          </a:bodyPr>
+          <a:lstStyle/>
+          <a:p>
+            <a:r>
+              <a:rPr lang="en-US" dirty="0"/>
+              <a:t>P ∨ Q is true if P is true, or if Q is true, or if both are true.</a:t>
+            </a:r>
+          </a:p>
+          <a:p>
+            <a:pPr lvl="1"/>
+            <a:r>
+              <a:rPr lang="en-US" dirty="0"/>
+              <a:t>In logic, disjunctions typically use the word “or” to mean that either one or both of the propositions can be true</a:t>
+            </a:r>
+          </a:p>
+          <a:p>
+            <a:pPr lvl="1"/>
+            <a:r>
+              <a:rPr lang="en-US" dirty="0"/>
+              <a:t>Exclusive-or (</a:t>
+            </a:r>
+            <a:r>
+              <a:rPr lang="en-US" dirty="0" err="1"/>
+              <a:t>xor</a:t>
+            </a:r>
+            <a:r>
+              <a:rPr lang="en-US" dirty="0"/>
+              <a:t>) is used to mean exactly one of the two propositions is true</a:t>
+            </a:r>
+          </a:p>
+          <a:p>
+            <a:pPr lvl="1"/>
+            <a:r>
+              <a:rPr lang="en-US" dirty="0"/>
+              <a:t>In some contexts, a disjunction might take more than two propositions, in which case the disjunction is true if </a:t>
+            </a:r>
+            <a:r>
+              <a:rPr lang="en-US" i="1" dirty="0"/>
+              <a:t>at least</a:t>
+            </a:r>
+            <a:r>
+              <a:rPr lang="en-US" dirty="0"/>
+              <a:t> one of the propositions is true</a:t>
+            </a:r>
+          </a:p>
+          <a:p>
+            <a:r>
+              <a:rPr lang="en-US" dirty="0"/>
+              <a:t>Consider the statement “it is raining or the sprinkler is on”, this proposition is true if:</a:t>
+            </a:r>
+          </a:p>
+          <a:p>
+            <a:pPr lvl="1"/>
+            <a:r>
+              <a:rPr lang="en-US" dirty="0"/>
+              <a:t>It is raining, and the sprinkler is off</a:t>
+            </a:r>
+          </a:p>
+          <a:p>
+            <a:pPr lvl="1"/>
+            <a:r>
+              <a:rPr lang="en-US" dirty="0"/>
+              <a:t>It is not raining, but the sprinkler is on</a:t>
+            </a:r>
+          </a:p>
+          <a:p>
+            <a:pPr lvl="1"/>
+            <a:r>
+              <a:rPr lang="en-US" dirty="0"/>
+              <a:t>It is raining, and the sprinkler is on</a:t>
+            </a:r>
+          </a:p>
+          <a:p>
+            <a:pPr marL="0" indent="0">
+              <a:buNone/>
+            </a:pPr>
+            <a:endParaRPr lang="en-US" dirty="0"/>
+          </a:p>
+          <a:p>
+            <a:endParaRPr lang="en-US" dirty="0"/>
+          </a:p>
+          <a:p>
+            <a:pPr lvl="1"/>
+            <a:endParaRPr lang="en-US" dirty="0"/>
+          </a:p>
+        </p:txBody>
+      </p:sp>
+      <p:sp>
+        <p:nvSpPr>
+          <p:cNvPr id="4" name="Slide Number Placeholder 3">
+            <a:extLst>
+              <a:ext uri="{FF2B5EF4-FFF2-40B4-BE49-F238E27FC236}">
+                <a16:creationId xmlns:a16="http://schemas.microsoft.com/office/drawing/2014/main" id="{8BA586D8-2005-074F-AA33-A27B1604B577}"/>
+              </a:ext>
+            </a:extLst>
+          </p:cNvPr>
+          <p:cNvSpPr>
+            <a:spLocks noGrp="1"/>
+          </p:cNvSpPr>
+          <p:nvPr>
+            <p:ph type="sldNum" sz="quarter" idx="12"/>
+          </p:nvPr>
+        </p:nvSpPr>
+        <p:spPr/>
+        <p:txBody>
+          <a:bodyPr/>
+          <a:lstStyle/>
+          <a:p>
+            <a:fld id="{3352CBF5-17B8-4387-88A6-ABF9F8C64D5A}" type="slidenum">
+              <a:rPr lang="en-US" smtClean="0"/>
+              <a:t>2</a:t>
+            </a:fld>
+            <a:endParaRPr lang="en-US"/>
+          </a:p>
+        </p:txBody>
+      </p:sp>
+    </p:spTree>
+    <p:extLst>
+      <p:ext uri="{BB962C8B-B14F-4D97-AF65-F5344CB8AC3E}">
+        <p14:creationId xmlns:p14="http://schemas.microsoft.com/office/powerpoint/2010/main" val="972595728"/>
+      </p:ext>
+    </p:extLst>
+  </p:cSld>
+  <p:clrMapOvr>
+    <a:masterClrMapping/>
+  </p:clrMapOvr>
+</p:sld>
+</file>
+
+<file path=ppt/slides/slide3.xml><?xml version="1.0" encoding="utf-8"?>
+<p:sld xmlns:a="http://schemas.openxmlformats.org/drawingml/2006/main" xmlns:r="http://schemas.openxmlformats.org/officeDocument/2006/relationships" xmlns:p="http://schemas.openxmlformats.org/presentationml/2006/main">
+  <p:cSld>
+    <p:spTree>
+      <p:nvGrpSpPr>
+        <p:cNvPr id="1" name=""/>
+        <p:cNvGrpSpPr/>
+        <p:nvPr/>
+      </p:nvGrpSpPr>
+      <p:grpSpPr>
+        <a:xfrm>
+          <a:off x="0" y="0"/>
+          <a:ext cx="0" cy="0"/>
+          <a:chOff x="0" y="0"/>
+          <a:chExt cx="0" cy="0"/>
+        </a:xfrm>
+      </p:grpSpPr>
+      <p:sp>
+        <p:nvSpPr>
+          <p:cNvPr id="2" name="Title 1">
+            <a:extLst>
+              <a:ext uri="{FF2B5EF4-FFF2-40B4-BE49-F238E27FC236}">
+                <a16:creationId xmlns:a16="http://schemas.microsoft.com/office/drawing/2014/main" id="{F472052E-1D9C-0845-BED4-1DCB56F57EAF}"/>
+              </a:ext>
+            </a:extLst>
+          </p:cNvPr>
+          <p:cNvSpPr>
+            <a:spLocks noGrp="1"/>
+          </p:cNvSpPr>
+          <p:nvPr>
+            <p:ph type="title"/>
+          </p:nvPr>
+        </p:nvSpPr>
+        <p:spPr/>
+        <p:txBody>
+          <a:bodyPr/>
+          <a:lstStyle/>
+          <a:p>
+            <a:r>
+              <a:rPr lang="en-US" dirty="0"/>
+              <a:t>Introduction rules</a:t>
+            </a:r>
+          </a:p>
+        </p:txBody>
+      </p:sp>
+      <p:sp>
+        <p:nvSpPr>
+          <p:cNvPr id="3" name="Content Placeholder 2">
+            <a:extLst>
+              <a:ext uri="{FF2B5EF4-FFF2-40B4-BE49-F238E27FC236}">
+                <a16:creationId xmlns:a16="http://schemas.microsoft.com/office/drawing/2014/main" id="{89564A94-BC7A-EA45-8A2C-1762C20F3133}"/>
+              </a:ext>
+            </a:extLst>
+          </p:cNvPr>
+          <p:cNvSpPr>
+            <a:spLocks noGrp="1"/>
+          </p:cNvSpPr>
+          <p:nvPr>
+            <p:ph idx="1"/>
+          </p:nvPr>
+        </p:nvSpPr>
+        <p:spPr/>
+        <p:txBody>
+          <a:bodyPr>
+            <a:normAutofit fontScale="92500" lnSpcReduction="20000"/>
+          </a:bodyPr>
+          <a:lstStyle/>
+          <a:p>
+            <a:r>
+              <a:rPr lang="en-US" dirty="0"/>
+              <a:t>Unlike conjunction which requires both propositions to be true, disjunction only requires one proposition to be true, so we have two introduction rules:</a:t>
+            </a:r>
+          </a:p>
+          <a:p>
+            <a:pPr marL="0" indent="0">
+              <a:buNone/>
+            </a:pPr>
+            <a:r>
+              <a:rPr lang="en-US" dirty="0">
+                <a:latin typeface="Courier New" panose="02070309020205020404" pitchFamily="49" charset="0"/>
+                <a:cs typeface="Courier New" panose="02070309020205020404" pitchFamily="49" charset="0"/>
+              </a:rPr>
+              <a:t>   { P } Q : Prop, </a:t>
+            </a:r>
+            <a:r>
+              <a:rPr lang="en-US" dirty="0" err="1">
+                <a:latin typeface="Courier New" panose="02070309020205020404" pitchFamily="49" charset="0"/>
+                <a:cs typeface="Courier New" panose="02070309020205020404" pitchFamily="49" charset="0"/>
+              </a:rPr>
+              <a:t>pfP</a:t>
+            </a:r>
+            <a:r>
+              <a:rPr lang="en-US" dirty="0">
+                <a:latin typeface="Courier New" panose="02070309020205020404" pitchFamily="49" charset="0"/>
+                <a:cs typeface="Courier New" panose="02070309020205020404" pitchFamily="49" charset="0"/>
+              </a:rPr>
+              <a:t>: P</a:t>
+            </a:r>
+          </a:p>
+          <a:p>
+            <a:pPr marL="0" indent="0">
+              <a:buNone/>
+            </a:pPr>
+            <a:r>
+              <a:rPr lang="en-US" dirty="0">
+                <a:latin typeface="Courier New" panose="02070309020205020404" pitchFamily="49" charset="0"/>
+                <a:cs typeface="Courier New" panose="02070309020205020404" pitchFamily="49" charset="0"/>
+              </a:rPr>
+              <a:t>   ---------------------- (</a:t>
+            </a:r>
+            <a:r>
+              <a:rPr lang="en-US" dirty="0" err="1">
+                <a:latin typeface="Courier New" panose="02070309020205020404" pitchFamily="49" charset="0"/>
+                <a:cs typeface="Courier New" panose="02070309020205020404" pitchFamily="49" charset="0"/>
+              </a:rPr>
+              <a:t>or.intro_left</a:t>
+            </a:r>
+            <a:r>
+              <a:rPr lang="en-US" dirty="0">
+                <a:latin typeface="Courier New" panose="02070309020205020404" pitchFamily="49" charset="0"/>
+                <a:cs typeface="Courier New" panose="02070309020205020404" pitchFamily="49" charset="0"/>
+              </a:rPr>
+              <a:t>)</a:t>
+            </a:r>
+          </a:p>
+          <a:p>
+            <a:pPr marL="0" indent="0">
+              <a:buNone/>
+            </a:pPr>
+            <a:r>
+              <a:rPr lang="en-US" dirty="0">
+                <a:latin typeface="Courier New" panose="02070309020205020404" pitchFamily="49" charset="0"/>
+                <a:cs typeface="Courier New" panose="02070309020205020404" pitchFamily="49" charset="0"/>
+              </a:rPr>
+              <a:t>            P ∨ Q</a:t>
+            </a:r>
+          </a:p>
+          <a:p>
+            <a:pPr marL="0" indent="0">
+              <a:buNone/>
+            </a:pPr>
+            <a:br>
+              <a:rPr lang="en-US" dirty="0">
+                <a:latin typeface="Courier New" panose="02070309020205020404" pitchFamily="49" charset="0"/>
+                <a:cs typeface="Courier New" panose="02070309020205020404" pitchFamily="49" charset="0"/>
+              </a:rPr>
+            </a:br>
+            <a:br>
+              <a:rPr lang="en-US" dirty="0">
+                <a:latin typeface="Courier New" panose="02070309020205020404" pitchFamily="49" charset="0"/>
+                <a:cs typeface="Courier New" panose="02070309020205020404" pitchFamily="49" charset="0"/>
+              </a:rPr>
+            </a:br>
+            <a:r>
+              <a:rPr lang="en-US" dirty="0">
+                <a:latin typeface="Courier New" panose="02070309020205020404" pitchFamily="49" charset="0"/>
+                <a:cs typeface="Courier New" panose="02070309020205020404" pitchFamily="49" charset="0"/>
+              </a:rPr>
+              <a:t>   P { Q } : Prop, </a:t>
+            </a:r>
+            <a:r>
+              <a:rPr lang="en-US" dirty="0" err="1">
+                <a:latin typeface="Courier New" panose="02070309020205020404" pitchFamily="49" charset="0"/>
+                <a:cs typeface="Courier New" panose="02070309020205020404" pitchFamily="49" charset="0"/>
+              </a:rPr>
+              <a:t>pfQ</a:t>
+            </a:r>
+            <a:r>
+              <a:rPr lang="en-US" dirty="0">
+                <a:latin typeface="Courier New" panose="02070309020205020404" pitchFamily="49" charset="0"/>
+                <a:cs typeface="Courier New" panose="02070309020205020404" pitchFamily="49" charset="0"/>
+              </a:rPr>
+              <a:t>: Q</a:t>
+            </a:r>
+          </a:p>
+          <a:p>
+            <a:pPr marL="0" indent="0">
+              <a:buNone/>
+            </a:pPr>
+            <a:r>
+              <a:rPr lang="en-US" dirty="0">
+                <a:latin typeface="Courier New" panose="02070309020205020404" pitchFamily="49" charset="0"/>
+                <a:cs typeface="Courier New" panose="02070309020205020404" pitchFamily="49" charset="0"/>
+              </a:rPr>
+              <a:t>   ----------------------- (</a:t>
+            </a:r>
+            <a:r>
+              <a:rPr lang="en-US" dirty="0" err="1">
+                <a:latin typeface="Courier New" panose="02070309020205020404" pitchFamily="49" charset="0"/>
+                <a:cs typeface="Courier New" panose="02070309020205020404" pitchFamily="49" charset="0"/>
+              </a:rPr>
+              <a:t>or.intro_right</a:t>
+            </a:r>
+            <a:r>
+              <a:rPr lang="en-US" dirty="0">
+                <a:latin typeface="Courier New" panose="02070309020205020404" pitchFamily="49" charset="0"/>
+                <a:cs typeface="Courier New" panose="02070309020205020404" pitchFamily="49" charset="0"/>
+              </a:rPr>
+              <a:t>)</a:t>
+            </a:r>
+          </a:p>
+          <a:p>
+            <a:pPr marL="0" indent="0">
+              <a:buNone/>
+            </a:pPr>
+            <a:r>
+              <a:rPr lang="en-US" dirty="0">
+                <a:latin typeface="Courier New" panose="02070309020205020404" pitchFamily="49" charset="0"/>
+                <a:cs typeface="Courier New" panose="02070309020205020404" pitchFamily="49" charset="0"/>
+              </a:rPr>
+              <a:t>            P ∨ Q</a:t>
+            </a:r>
+          </a:p>
+        </p:txBody>
+      </p:sp>
+      <p:sp>
+        <p:nvSpPr>
+          <p:cNvPr id="4" name="Slide Number Placeholder 3">
+            <a:extLst>
+              <a:ext uri="{FF2B5EF4-FFF2-40B4-BE49-F238E27FC236}">
+                <a16:creationId xmlns:a16="http://schemas.microsoft.com/office/drawing/2014/main" id="{A0BEE56D-15B5-1E41-BA16-98126A6145C4}"/>
+              </a:ext>
+            </a:extLst>
+          </p:cNvPr>
+          <p:cNvSpPr>
+            <a:spLocks noGrp="1"/>
+          </p:cNvSpPr>
+          <p:nvPr>
+            <p:ph type="sldNum" sz="quarter" idx="12"/>
+          </p:nvPr>
+        </p:nvSpPr>
+        <p:spPr/>
+        <p:txBody>
+          <a:bodyPr/>
+          <a:lstStyle/>
+          <a:p>
+            <a:fld id="{3352CBF5-17B8-4387-88A6-ABF9F8C64D5A}" type="slidenum">
+              <a:rPr lang="en-US" smtClean="0"/>
+              <a:t>3</a:t>
+            </a:fld>
+            <a:endParaRPr lang="en-US"/>
+          </a:p>
+        </p:txBody>
+      </p:sp>
+    </p:spTree>
+    <p:extLst>
+      <p:ext uri="{BB962C8B-B14F-4D97-AF65-F5344CB8AC3E}">
+        <p14:creationId xmlns:p14="http://schemas.microsoft.com/office/powerpoint/2010/main" val="1773216933"/>
+      </p:ext>
+    </p:extLst>
+  </p:cSld>
+  <p:clrMapOvr>
+    <a:masterClrMapping/>
+  </p:clrMapOvr>
+</p:sld>
+</file>
+
+<file path=ppt/slides/slide4.xml><?xml version="1.0" encoding="utf-8"?>
+<p:sld xmlns:a="http://schemas.openxmlformats.org/drawingml/2006/main" xmlns:r="http://schemas.openxmlformats.org/officeDocument/2006/relationships" xmlns:p="http://schemas.openxmlformats.org/presentationml/2006/main">
+  <p:cSld>
+    <p:spTree>
+      <p:nvGrpSpPr>
+        <p:cNvPr id="1" name=""/>
+        <p:cNvGrpSpPr/>
+        <p:nvPr/>
+      </p:nvGrpSpPr>
+      <p:grpSpPr>
+        <a:xfrm>
+          <a:off x="0" y="0"/>
+          <a:ext cx="0" cy="0"/>
+          <a:chOff x="0" y="0"/>
+          <a:chExt cx="0" cy="0"/>
+        </a:xfrm>
+      </p:grpSpPr>
+      <p:sp>
+        <p:nvSpPr>
+          <p:cNvPr id="2" name="Title 1">
+            <a:extLst>
+              <a:ext uri="{FF2B5EF4-FFF2-40B4-BE49-F238E27FC236}">
+                <a16:creationId xmlns:a16="http://schemas.microsoft.com/office/drawing/2014/main" id="{7C3A5C1B-5377-5943-BBD6-400C1DF8B732}"/>
+              </a:ext>
+            </a:extLst>
+          </p:cNvPr>
+          <p:cNvSpPr>
+            <a:spLocks noGrp="1"/>
+          </p:cNvSpPr>
+          <p:nvPr>
+            <p:ph type="title"/>
+          </p:nvPr>
+        </p:nvSpPr>
+        <p:spPr/>
+        <p:txBody>
+          <a:bodyPr/>
+          <a:lstStyle/>
+          <a:p>
+            <a:r>
+              <a:rPr lang="en-US" dirty="0"/>
+              <a:t>Introduction rules in Lean</a:t>
+            </a:r>
+          </a:p>
+        </p:txBody>
+      </p:sp>
+      <p:sp>
+        <p:nvSpPr>
+          <p:cNvPr id="3" name="Content Placeholder 2">
+            <a:extLst>
+              <a:ext uri="{FF2B5EF4-FFF2-40B4-BE49-F238E27FC236}">
+                <a16:creationId xmlns:a16="http://schemas.microsoft.com/office/drawing/2014/main" id="{E7B52B44-A0EA-4F40-8568-39C57B222C6F}"/>
+              </a:ext>
+            </a:extLst>
+          </p:cNvPr>
+          <p:cNvSpPr>
+            <a:spLocks noGrp="1"/>
+          </p:cNvSpPr>
+          <p:nvPr>
+            <p:ph idx="1"/>
+          </p:nvPr>
+        </p:nvSpPr>
+        <p:spPr/>
+        <p:txBody>
+          <a:bodyPr/>
+          <a:lstStyle/>
+          <a:p>
+            <a:r>
+              <a:rPr lang="en-US" dirty="0"/>
+              <a:t>Lean provides the </a:t>
+            </a:r>
+            <a:r>
+              <a:rPr lang="en-US" dirty="0" err="1"/>
+              <a:t>or.intro_left</a:t>
+            </a:r>
+            <a:r>
+              <a:rPr lang="en-US" dirty="0"/>
+              <a:t> and </a:t>
+            </a:r>
+            <a:r>
+              <a:rPr lang="en-US" dirty="0" err="1"/>
+              <a:t>or.intro_right</a:t>
+            </a:r>
+            <a:r>
+              <a:rPr lang="en-US" dirty="0"/>
+              <a:t> rules</a:t>
+            </a:r>
+          </a:p>
+          <a:p>
+            <a:pPr marL="0" indent="0">
+              <a:buNone/>
+            </a:pPr>
+            <a:r>
+              <a:rPr lang="en-US" sz="2400" dirty="0">
+                <a:latin typeface="Courier New" panose="02070309020205020404" pitchFamily="49" charset="0"/>
+                <a:cs typeface="Courier New" panose="02070309020205020404" pitchFamily="49" charset="0"/>
+              </a:rPr>
+              <a:t>example : P ∨ false := </a:t>
+            </a:r>
+          </a:p>
+          <a:p>
+            <a:pPr marL="0" indent="0">
+              <a:buNone/>
+            </a:pPr>
+            <a:r>
+              <a:rPr lang="en-US" sz="2400" dirty="0">
+                <a:latin typeface="Courier New" panose="02070309020205020404" pitchFamily="49" charset="0"/>
+                <a:cs typeface="Courier New" panose="02070309020205020404" pitchFamily="49" charset="0"/>
+              </a:rPr>
+              <a:t>  </a:t>
+            </a:r>
+            <a:r>
+              <a:rPr lang="en-US" sz="2400" dirty="0" err="1">
+                <a:latin typeface="Courier New" panose="02070309020205020404" pitchFamily="49" charset="0"/>
+                <a:cs typeface="Courier New" panose="02070309020205020404" pitchFamily="49" charset="0"/>
+              </a:rPr>
+              <a:t>or.intro_left</a:t>
+            </a:r>
+            <a:r>
+              <a:rPr lang="en-US" sz="2400" dirty="0">
+                <a:latin typeface="Courier New" panose="02070309020205020404" pitchFamily="49" charset="0"/>
+                <a:cs typeface="Courier New" panose="02070309020205020404" pitchFamily="49" charset="0"/>
+              </a:rPr>
+              <a:t> false </a:t>
+            </a:r>
+            <a:r>
+              <a:rPr lang="en-US" sz="2400" dirty="0" err="1">
+                <a:latin typeface="Courier New" panose="02070309020205020404" pitchFamily="49" charset="0"/>
+                <a:cs typeface="Courier New" panose="02070309020205020404" pitchFamily="49" charset="0"/>
+              </a:rPr>
+              <a:t>pfP</a:t>
+            </a:r>
+            <a:endParaRPr lang="en-US" sz="2400" dirty="0">
+              <a:latin typeface="Courier New" panose="02070309020205020404" pitchFamily="49" charset="0"/>
+              <a:cs typeface="Courier New" panose="02070309020205020404" pitchFamily="49" charset="0"/>
+            </a:endParaRPr>
+          </a:p>
+          <a:p>
+            <a:pPr marL="0" indent="0">
+              <a:buNone/>
+            </a:pPr>
+            <a:br>
+              <a:rPr lang="en-US" sz="2400" dirty="0">
+                <a:latin typeface="Courier New" panose="02070309020205020404" pitchFamily="49" charset="0"/>
+                <a:cs typeface="Courier New" panose="02070309020205020404" pitchFamily="49" charset="0"/>
+              </a:rPr>
+            </a:br>
+            <a:r>
+              <a:rPr lang="en-US" sz="2400" dirty="0">
+                <a:latin typeface="Courier New" panose="02070309020205020404" pitchFamily="49" charset="0"/>
+                <a:cs typeface="Courier New" panose="02070309020205020404" pitchFamily="49" charset="0"/>
+              </a:rPr>
+              <a:t>example : false ∨ P := </a:t>
+            </a:r>
+          </a:p>
+          <a:p>
+            <a:pPr marL="0" indent="0">
+              <a:buNone/>
+            </a:pPr>
+            <a:r>
+              <a:rPr lang="en-US" sz="2400" dirty="0">
+                <a:latin typeface="Courier New" panose="02070309020205020404" pitchFamily="49" charset="0"/>
+                <a:cs typeface="Courier New" panose="02070309020205020404" pitchFamily="49" charset="0"/>
+              </a:rPr>
+              <a:t>  </a:t>
+            </a:r>
+            <a:r>
+              <a:rPr lang="en-US" sz="2400" dirty="0" err="1">
+                <a:latin typeface="Courier New" panose="02070309020205020404" pitchFamily="49" charset="0"/>
+                <a:cs typeface="Courier New" panose="02070309020205020404" pitchFamily="49" charset="0"/>
+              </a:rPr>
+              <a:t>or.intro_right</a:t>
+            </a:r>
+            <a:r>
+              <a:rPr lang="en-US" sz="2400" dirty="0">
+                <a:latin typeface="Courier New" panose="02070309020205020404" pitchFamily="49" charset="0"/>
+                <a:cs typeface="Courier New" panose="02070309020205020404" pitchFamily="49" charset="0"/>
+              </a:rPr>
+              <a:t> false </a:t>
+            </a:r>
+            <a:r>
+              <a:rPr lang="en-US" sz="2400" dirty="0" err="1">
+                <a:latin typeface="Courier New" panose="02070309020205020404" pitchFamily="49" charset="0"/>
+                <a:cs typeface="Courier New" panose="02070309020205020404" pitchFamily="49" charset="0"/>
+              </a:rPr>
+              <a:t>pfP</a:t>
+            </a:r>
+            <a:endParaRPr lang="en-US" sz="2400" dirty="0">
+              <a:latin typeface="Courier New" panose="02070309020205020404" pitchFamily="49" charset="0"/>
+              <a:cs typeface="Courier New" panose="02070309020205020404" pitchFamily="49" charset="0"/>
+            </a:endParaRPr>
+          </a:p>
+          <a:p>
+            <a:pPr marL="0" indent="0">
+              <a:buNone/>
+            </a:pPr>
+            <a:endParaRPr lang="en-US" dirty="0"/>
+          </a:p>
+        </p:txBody>
+      </p:sp>
+      <p:sp>
+        <p:nvSpPr>
+          <p:cNvPr id="4" name="Slide Number Placeholder 3">
+            <a:extLst>
+              <a:ext uri="{FF2B5EF4-FFF2-40B4-BE49-F238E27FC236}">
+                <a16:creationId xmlns:a16="http://schemas.microsoft.com/office/drawing/2014/main" id="{0C889411-5F53-554E-B510-1D5FFC133E07}"/>
+              </a:ext>
+            </a:extLst>
+          </p:cNvPr>
+          <p:cNvSpPr>
+            <a:spLocks noGrp="1"/>
+          </p:cNvSpPr>
+          <p:nvPr>
+            <p:ph type="sldNum" sz="quarter" idx="12"/>
+          </p:nvPr>
+        </p:nvSpPr>
+        <p:spPr/>
+        <p:txBody>
+          <a:bodyPr/>
+          <a:lstStyle/>
+          <a:p>
+            <a:fld id="{3352CBF5-17B8-4387-88A6-ABF9F8C64D5A}" type="slidenum">
+              <a:rPr lang="en-US" smtClean="0"/>
+              <a:t>4</a:t>
+            </a:fld>
+            <a:endParaRPr lang="en-US"/>
+          </a:p>
+        </p:txBody>
+      </p:sp>
+    </p:spTree>
+    <p:extLst>
+      <p:ext uri="{BB962C8B-B14F-4D97-AF65-F5344CB8AC3E}">
+        <p14:creationId xmlns:p14="http://schemas.microsoft.com/office/powerpoint/2010/main" val="3464213433"/>
+      </p:ext>
+    </p:extLst>
+  </p:cSld>
+  <p:clrMapOvr>
+    <a:masterClrMapping/>
+  </p:clrMapOvr>
+</p:sld>
+</file>
+
+<file path=ppt/slides/slide5.xml><?xml version="1.0" encoding="utf-8"?>
+<p:sld xmlns:a="http://schemas.openxmlformats.org/drawingml/2006/main" xmlns:r="http://schemas.openxmlformats.org/officeDocument/2006/relationships" xmlns:p="http://schemas.openxmlformats.org/presentationml/2006/main">
+  <p:cSld>
+    <p:spTree>
+      <p:nvGrpSpPr>
+        <p:cNvPr id="1" name=""/>
+        <p:cNvGrpSpPr/>
+        <p:nvPr/>
+      </p:nvGrpSpPr>
+      <p:grpSpPr>
+        <a:xfrm>
+          <a:off x="0" y="0"/>
+          <a:ext cx="0" cy="0"/>
+          <a:chOff x="0" y="0"/>
+          <a:chExt cx="0" cy="0"/>
+        </a:xfrm>
+      </p:grpSpPr>
+      <p:sp>
+        <p:nvSpPr>
+          <p:cNvPr id="2" name="Title 1">
+            <a:extLst>
+              <a:ext uri="{FF2B5EF4-FFF2-40B4-BE49-F238E27FC236}">
+                <a16:creationId xmlns:a16="http://schemas.microsoft.com/office/drawing/2014/main" id="{F4EE265F-B1AC-DC4D-9D8C-FE4E136E6F47}"/>
+              </a:ext>
+            </a:extLst>
+          </p:cNvPr>
+          <p:cNvSpPr>
+            <a:spLocks noGrp="1"/>
+          </p:cNvSpPr>
+          <p:nvPr>
+            <p:ph type="title"/>
+          </p:nvPr>
+        </p:nvSpPr>
+        <p:spPr/>
+        <p:txBody>
+          <a:bodyPr/>
+          <a:lstStyle/>
+          <a:p>
+            <a:r>
+              <a:rPr lang="en-US" dirty="0"/>
+              <a:t>Disjunction with true</a:t>
+            </a:r>
+          </a:p>
+        </p:txBody>
+      </p:sp>
+      <p:sp>
+        <p:nvSpPr>
+          <p:cNvPr id="3" name="Content Placeholder 2">
+            <a:extLst>
+              <a:ext uri="{FF2B5EF4-FFF2-40B4-BE49-F238E27FC236}">
+                <a16:creationId xmlns:a16="http://schemas.microsoft.com/office/drawing/2014/main" id="{C13B504E-F089-154D-9B13-B9EA8AF15F74}"/>
+              </a:ext>
+            </a:extLst>
+          </p:cNvPr>
+          <p:cNvSpPr>
+            <a:spLocks noGrp="1"/>
+          </p:cNvSpPr>
+          <p:nvPr>
+            <p:ph idx="1"/>
+          </p:nvPr>
+        </p:nvSpPr>
+        <p:spPr/>
+        <p:txBody>
+          <a:bodyPr/>
+          <a:lstStyle/>
+          <a:p>
+            <a:r>
+              <a:rPr lang="en-US" dirty="0"/>
+              <a:t>Here’s a proof that P or true is always true:</a:t>
+            </a:r>
+          </a:p>
+          <a:p>
+            <a:pPr marL="0" indent="0">
+              <a:buNone/>
+            </a:pPr>
+            <a:r>
+              <a:rPr lang="en-US" sz="2400" dirty="0">
+                <a:latin typeface="Courier New" panose="02070309020205020404" pitchFamily="49" charset="0"/>
+                <a:cs typeface="Courier New" panose="02070309020205020404" pitchFamily="49" charset="0"/>
+              </a:rPr>
+              <a:t>theorem </a:t>
+            </a:r>
+            <a:r>
+              <a:rPr lang="en-US" sz="2400" dirty="0" err="1">
+                <a:latin typeface="Courier New" panose="02070309020205020404" pitchFamily="49" charset="0"/>
+                <a:cs typeface="Courier New" panose="02070309020205020404" pitchFamily="49" charset="0"/>
+              </a:rPr>
+              <a:t>id_right_or</a:t>
+            </a:r>
+            <a:r>
+              <a:rPr lang="en-US" sz="2400" dirty="0">
+                <a:latin typeface="Courier New" panose="02070309020205020404" pitchFamily="49" charset="0"/>
+                <a:cs typeface="Courier New" panose="02070309020205020404" pitchFamily="49" charset="0"/>
+              </a:rPr>
+              <a:t> : </a:t>
+            </a:r>
+          </a:p>
+          <a:p>
+            <a:pPr marL="0" indent="0">
+              <a:buNone/>
+            </a:pPr>
+            <a:r>
+              <a:rPr lang="en-US" sz="2400" dirty="0">
+                <a:latin typeface="Courier New" panose="02070309020205020404" pitchFamily="49" charset="0"/>
+                <a:cs typeface="Courier New" panose="02070309020205020404" pitchFamily="49" charset="0"/>
+              </a:rPr>
+              <a:t>  ∀ P : Prop, P ∨ true :=</a:t>
+            </a:r>
+          </a:p>
+          <a:p>
+            <a:pPr marL="0" indent="0">
+              <a:buNone/>
+            </a:pPr>
+            <a:r>
+              <a:rPr lang="en-US" sz="2400" dirty="0">
+                <a:latin typeface="Courier New" panose="02070309020205020404" pitchFamily="49" charset="0"/>
+                <a:cs typeface="Courier New" panose="02070309020205020404" pitchFamily="49" charset="0"/>
+              </a:rPr>
+              <a:t>    </a:t>
+            </a:r>
+            <a:r>
+              <a:rPr lang="el-GR" sz="2400" dirty="0">
+                <a:latin typeface="Courier New" panose="02070309020205020404" pitchFamily="49" charset="0"/>
+                <a:cs typeface="Courier New" panose="02070309020205020404" pitchFamily="49" charset="0"/>
+              </a:rPr>
+              <a:t>λ </a:t>
+            </a:r>
+            <a:r>
+              <a:rPr lang="en-US" sz="2400" dirty="0">
+                <a:latin typeface="Courier New" panose="02070309020205020404" pitchFamily="49" charset="0"/>
+                <a:cs typeface="Courier New" panose="02070309020205020404" pitchFamily="49" charset="0"/>
+              </a:rPr>
+              <a:t>P,</a:t>
+            </a:r>
+          </a:p>
+          <a:p>
+            <a:pPr marL="0" indent="0">
+              <a:buNone/>
+            </a:pPr>
+            <a:r>
+              <a:rPr lang="en-US" sz="2400" dirty="0">
+                <a:latin typeface="Courier New" panose="02070309020205020404" pitchFamily="49" charset="0"/>
+                <a:cs typeface="Courier New" panose="02070309020205020404" pitchFamily="49" charset="0"/>
+              </a:rPr>
+              <a:t>      </a:t>
+            </a:r>
+            <a:r>
+              <a:rPr lang="en-US" sz="2400" dirty="0" err="1">
+                <a:latin typeface="Courier New" panose="02070309020205020404" pitchFamily="49" charset="0"/>
+                <a:cs typeface="Courier New" panose="02070309020205020404" pitchFamily="49" charset="0"/>
+              </a:rPr>
+              <a:t>or.intro_right</a:t>
+            </a:r>
+            <a:r>
+              <a:rPr lang="en-US" sz="2400" dirty="0">
+                <a:latin typeface="Courier New" panose="02070309020205020404" pitchFamily="49" charset="0"/>
+                <a:cs typeface="Courier New" panose="02070309020205020404" pitchFamily="49" charset="0"/>
+              </a:rPr>
+              <a:t> P </a:t>
+            </a:r>
+            <a:r>
+              <a:rPr lang="en-US" sz="2400" dirty="0" err="1">
+                <a:latin typeface="Courier New" panose="02070309020205020404" pitchFamily="49" charset="0"/>
+                <a:cs typeface="Courier New" panose="02070309020205020404" pitchFamily="49" charset="0"/>
+              </a:rPr>
+              <a:t>true.intro</a:t>
+            </a:r>
+            <a:endParaRPr lang="en-US" sz="2400" dirty="0">
+              <a:latin typeface="Courier New" panose="02070309020205020404" pitchFamily="49" charset="0"/>
+              <a:cs typeface="Courier New" panose="02070309020205020404" pitchFamily="49" charset="0"/>
+            </a:endParaRPr>
+          </a:p>
+          <a:p>
+            <a:r>
+              <a:rPr lang="en-US" dirty="0">
+                <a:cs typeface="Courier New" panose="02070309020205020404" pitchFamily="49" charset="0"/>
+              </a:rPr>
+              <a:t>Exercise: Prove that true or Q is always true as well.</a:t>
+            </a:r>
+          </a:p>
+          <a:p>
+            <a:endParaRPr lang="en-US" dirty="0"/>
+          </a:p>
+        </p:txBody>
+      </p:sp>
+      <p:sp>
+        <p:nvSpPr>
+          <p:cNvPr id="4" name="Slide Number Placeholder 3">
+            <a:extLst>
+              <a:ext uri="{FF2B5EF4-FFF2-40B4-BE49-F238E27FC236}">
+                <a16:creationId xmlns:a16="http://schemas.microsoft.com/office/drawing/2014/main" id="{4E6EC673-4884-A048-8F9A-2B0EADAE0160}"/>
+              </a:ext>
+            </a:extLst>
+          </p:cNvPr>
+          <p:cNvSpPr>
+            <a:spLocks noGrp="1"/>
+          </p:cNvSpPr>
+          <p:nvPr>
+            <p:ph type="sldNum" sz="quarter" idx="12"/>
+          </p:nvPr>
+        </p:nvSpPr>
+        <p:spPr/>
+        <p:txBody>
+          <a:bodyPr/>
+          <a:lstStyle/>
+          <a:p>
+            <a:fld id="{3352CBF5-17B8-4387-88A6-ABF9F8C64D5A}" type="slidenum">
+              <a:rPr lang="en-US" smtClean="0"/>
+              <a:t>5</a:t>
+            </a:fld>
+            <a:endParaRPr lang="en-US"/>
+          </a:p>
+        </p:txBody>
+      </p:sp>
+    </p:spTree>
+    <p:extLst>
+      <p:ext uri="{BB962C8B-B14F-4D97-AF65-F5344CB8AC3E}">
+        <p14:creationId xmlns:p14="http://schemas.microsoft.com/office/powerpoint/2010/main" val="1537724452"/>
+      </p:ext>
+    </p:extLst>
+  </p:cSld>
+  <p:clrMapOvr>
+    <a:masterClrMapping/>
+  </p:clrMapOvr>
+</p:sld>
+</file>
+
+<file path=ppt/slides/slide6.xml><?xml version="1.0" encoding="utf-8"?>
+<p:sld xmlns:a="http://schemas.openxmlformats.org/drawingml/2006/main" xmlns:r="http://schemas.openxmlformats.org/officeDocument/2006/relationships" xmlns:p="http://schemas.openxmlformats.org/presentationml/2006/main">
+  <p:cSld>
+    <p:spTree>
+      <p:nvGrpSpPr>
+        <p:cNvPr id="1" name=""/>
+        <p:cNvGrpSpPr/>
+        <p:nvPr/>
+      </p:nvGrpSpPr>
+      <p:grpSpPr>
+        <a:xfrm>
+          <a:off x="0" y="0"/>
+          <a:ext cx="0" cy="0"/>
+          <a:chOff x="0" y="0"/>
+          <a:chExt cx="0" cy="0"/>
+        </a:xfrm>
+      </p:grpSpPr>
+      <p:sp>
+        <p:nvSpPr>
+          <p:cNvPr id="2" name="Title 1">
+            <a:extLst>
+              <a:ext uri="{FF2B5EF4-FFF2-40B4-BE49-F238E27FC236}">
+                <a16:creationId xmlns:a16="http://schemas.microsoft.com/office/drawing/2014/main" id="{83DDEC75-12A1-784D-AC83-03D678B0D31A}"/>
+              </a:ext>
+            </a:extLst>
+          </p:cNvPr>
+          <p:cNvSpPr>
+            <a:spLocks noGrp="1"/>
+          </p:cNvSpPr>
+          <p:nvPr>
+            <p:ph type="title"/>
+          </p:nvPr>
+        </p:nvSpPr>
+        <p:spPr/>
+        <p:txBody>
+          <a:bodyPr/>
+          <a:lstStyle/>
+          <a:p>
+            <a:r>
+              <a:rPr lang="en-US" dirty="0"/>
+              <a:t>Elimination rule</a:t>
+            </a:r>
+          </a:p>
+        </p:txBody>
+      </p:sp>
+      <p:sp>
+        <p:nvSpPr>
+          <p:cNvPr id="3" name="Content Placeholder 2">
+            <a:extLst>
+              <a:ext uri="{FF2B5EF4-FFF2-40B4-BE49-F238E27FC236}">
+                <a16:creationId xmlns:a16="http://schemas.microsoft.com/office/drawing/2014/main" id="{73097CB7-C02E-CB40-8A26-B331EF9E630A}"/>
+              </a:ext>
+            </a:extLst>
+          </p:cNvPr>
+          <p:cNvSpPr>
+            <a:spLocks noGrp="1"/>
+          </p:cNvSpPr>
+          <p:nvPr>
+            <p:ph idx="1"/>
+          </p:nvPr>
+        </p:nvSpPr>
+        <p:spPr/>
+        <p:txBody>
+          <a:bodyPr>
+            <a:normAutofit fontScale="92500" lnSpcReduction="10000"/>
+          </a:bodyPr>
+          <a:lstStyle/>
+          <a:p>
+            <a:r>
+              <a:rPr lang="en-US" dirty="0"/>
+              <a:t>The elimination rule for disjunction has some nuance:</a:t>
+            </a:r>
+          </a:p>
+          <a:p>
+            <a:pPr lvl="1"/>
+            <a:r>
+              <a:rPr lang="en-US" dirty="0"/>
+              <a:t>If P ∨ Q, then if both P → R and Q → R, then R</a:t>
+            </a:r>
+          </a:p>
+          <a:p>
+            <a:pPr marL="0" indent="0">
+              <a:buNone/>
+            </a:pPr>
+            <a:r>
+              <a:rPr lang="en-US" sz="2400" dirty="0">
+                <a:latin typeface="Courier New" panose="02070309020205020404" pitchFamily="49" charset="0"/>
+                <a:cs typeface="Courier New" panose="02070309020205020404" pitchFamily="49" charset="0"/>
+              </a:rPr>
+              <a:t>   </a:t>
+            </a:r>
+            <a:r>
+              <a:rPr lang="en-US" sz="2400" dirty="0" err="1">
+                <a:latin typeface="Courier New" panose="02070309020205020404" pitchFamily="49" charset="0"/>
+                <a:cs typeface="Courier New" panose="02070309020205020404" pitchFamily="49" charset="0"/>
+              </a:rPr>
+              <a:t>pfPQ</a:t>
+            </a:r>
+            <a:r>
+              <a:rPr lang="en-US" sz="2400" dirty="0">
+                <a:latin typeface="Courier New" panose="02070309020205020404" pitchFamily="49" charset="0"/>
+                <a:cs typeface="Courier New" panose="02070309020205020404" pitchFamily="49" charset="0"/>
+              </a:rPr>
+              <a:t>: P ∨ Q, </a:t>
+            </a:r>
+            <a:r>
+              <a:rPr lang="en-US" sz="2400" dirty="0" err="1">
+                <a:latin typeface="Courier New" panose="02070309020205020404" pitchFamily="49" charset="0"/>
+                <a:cs typeface="Courier New" panose="02070309020205020404" pitchFamily="49" charset="0"/>
+              </a:rPr>
+              <a:t>pfPR</a:t>
+            </a:r>
+            <a:r>
+              <a:rPr lang="en-US" sz="2400" dirty="0">
+                <a:latin typeface="Courier New" panose="02070309020205020404" pitchFamily="49" charset="0"/>
+                <a:cs typeface="Courier New" panose="02070309020205020404" pitchFamily="49" charset="0"/>
+              </a:rPr>
+              <a:t>: P → R, </a:t>
+            </a:r>
+            <a:r>
+              <a:rPr lang="en-US" sz="2400" dirty="0" err="1">
+                <a:latin typeface="Courier New" panose="02070309020205020404" pitchFamily="49" charset="0"/>
+                <a:cs typeface="Courier New" panose="02070309020205020404" pitchFamily="49" charset="0"/>
+              </a:rPr>
+              <a:t>pfQR</a:t>
+            </a:r>
+            <a:r>
+              <a:rPr lang="en-US" sz="2400" dirty="0">
+                <a:latin typeface="Courier New" panose="02070309020205020404" pitchFamily="49" charset="0"/>
+                <a:cs typeface="Courier New" panose="02070309020205020404" pitchFamily="49" charset="0"/>
+              </a:rPr>
+              <a:t>: Q → R</a:t>
+            </a:r>
+          </a:p>
+          <a:p>
+            <a:pPr marL="0" indent="0">
+              <a:buNone/>
+            </a:pPr>
+            <a:r>
+              <a:rPr lang="en-US" sz="2400" dirty="0">
+                <a:latin typeface="Courier New" panose="02070309020205020404" pitchFamily="49" charset="0"/>
+                <a:cs typeface="Courier New" panose="02070309020205020404" pitchFamily="49" charset="0"/>
+              </a:rPr>
+              <a:t>  -------------------------------------- ∨-</a:t>
+            </a:r>
+            <a:r>
+              <a:rPr lang="en-US" sz="2400" dirty="0" err="1">
+                <a:latin typeface="Courier New" panose="02070309020205020404" pitchFamily="49" charset="0"/>
+                <a:cs typeface="Courier New" panose="02070309020205020404" pitchFamily="49" charset="0"/>
+              </a:rPr>
+              <a:t>elim</a:t>
+            </a:r>
+            <a:endParaRPr lang="en-US" sz="2400" dirty="0">
+              <a:latin typeface="Courier New" panose="02070309020205020404" pitchFamily="49" charset="0"/>
+              <a:cs typeface="Courier New" panose="02070309020205020404" pitchFamily="49" charset="0"/>
+            </a:endParaRPr>
+          </a:p>
+          <a:p>
+            <a:pPr marL="0" indent="0">
+              <a:buNone/>
+            </a:pPr>
+            <a:r>
+              <a:rPr lang="en-US" sz="2400" dirty="0">
+                <a:latin typeface="Courier New" panose="02070309020205020404" pitchFamily="49" charset="0"/>
+                <a:cs typeface="Courier New" panose="02070309020205020404" pitchFamily="49" charset="0"/>
+              </a:rPr>
+              <a:t>                     R</a:t>
+            </a:r>
+          </a:p>
+          <a:p>
+            <a:r>
+              <a:rPr lang="en-US" dirty="0"/>
+              <a:t>Example:</a:t>
+            </a:r>
+          </a:p>
+          <a:p>
+            <a:pPr lvl="1"/>
+            <a:r>
+              <a:rPr lang="en-US" dirty="0"/>
+              <a:t>When it’s raining, the grass is wet (P → R)</a:t>
+            </a:r>
+          </a:p>
+          <a:p>
+            <a:pPr lvl="1"/>
+            <a:r>
+              <a:rPr lang="en-US" dirty="0"/>
+              <a:t>When the sprinkler’s on, the grass is wet (Q → R)</a:t>
+            </a:r>
+          </a:p>
+          <a:p>
+            <a:pPr lvl="1"/>
+            <a:r>
+              <a:rPr lang="en-US" dirty="0"/>
+              <a:t>It’s raining, or the sprinkler’s on (P ∨ Q)</a:t>
+            </a:r>
+          </a:p>
+          <a:p>
+            <a:pPr lvl="1"/>
+            <a:r>
+              <a:rPr lang="en-US" dirty="0"/>
+              <a:t>Therefore, the grass must be wet (R)</a:t>
+            </a:r>
+          </a:p>
+          <a:p>
+            <a:r>
+              <a:rPr lang="en-US" dirty="0"/>
+              <a:t>See Lean for examples</a:t>
+            </a:r>
+          </a:p>
+          <a:p>
+            <a:pPr lvl="1"/>
+            <a:endParaRPr lang="en-US" dirty="0"/>
+          </a:p>
+          <a:p>
+            <a:endParaRPr lang="en-US" dirty="0"/>
+          </a:p>
+        </p:txBody>
+      </p:sp>
+      <p:sp>
+        <p:nvSpPr>
+          <p:cNvPr id="4" name="Slide Number Placeholder 3">
+            <a:extLst>
+              <a:ext uri="{FF2B5EF4-FFF2-40B4-BE49-F238E27FC236}">
+                <a16:creationId xmlns:a16="http://schemas.microsoft.com/office/drawing/2014/main" id="{CA053BD6-EFB1-BF44-B448-B32BC87043FF}"/>
+              </a:ext>
+            </a:extLst>
+          </p:cNvPr>
+          <p:cNvSpPr>
+            <a:spLocks noGrp="1"/>
+          </p:cNvSpPr>
+          <p:nvPr>
+            <p:ph type="sldNum" sz="quarter" idx="12"/>
+          </p:nvPr>
+        </p:nvSpPr>
+        <p:spPr/>
+        <p:txBody>
+          <a:bodyPr/>
+          <a:lstStyle/>
+          <a:p>
+            <a:fld id="{3352CBF5-17B8-4387-88A6-ABF9F8C64D5A}" type="slidenum">
+              <a:rPr lang="en-US" smtClean="0"/>
+              <a:t>6</a:t>
+            </a:fld>
+            <a:endParaRPr lang="en-US"/>
+          </a:p>
+        </p:txBody>
+      </p:sp>
+    </p:spTree>
+    <p:extLst>
+      <p:ext uri="{BB962C8B-B14F-4D97-AF65-F5344CB8AC3E}">
+        <p14:creationId xmlns:p14="http://schemas.microsoft.com/office/powerpoint/2010/main" val="721220024"/>
+      </p:ext>
+    </p:extLst>
+  </p:cSld>
+  <p:clrMapOvr>
+    <a:masterClrMapping/>
+  </p:clrMapOvr>
+</p:sld>
+</file>
+
+<file path=ppt/slides/slide7.xml><?xml version="1.0" encoding="utf-8"?>
+<p:sld xmlns:a="http://schemas.openxmlformats.org/drawingml/2006/main" xmlns:r="http://schemas.openxmlformats.org/officeDocument/2006/relationships" xmlns:p="http://schemas.openxmlformats.org/presentationml/2006/main">
+  <p:cSld>
+    <p:spTree>
+      <p:nvGrpSpPr>
+        <p:cNvPr id="1" name=""/>
+        <p:cNvGrpSpPr/>
+        <p:nvPr/>
+      </p:nvGrpSpPr>
+      <p:grpSpPr>
+        <a:xfrm>
+          <a:off x="0" y="0"/>
+          <a:ext cx="0" cy="0"/>
+          <a:chOff x="0" y="0"/>
+          <a:chExt cx="0" cy="0"/>
+        </a:xfrm>
+      </p:grpSpPr>
+      <p:sp>
+        <p:nvSpPr>
+          <p:cNvPr id="2" name="Title 1">
+            <a:extLst>
+              <a:ext uri="{FF2B5EF4-FFF2-40B4-BE49-F238E27FC236}">
+                <a16:creationId xmlns:a16="http://schemas.microsoft.com/office/drawing/2014/main" id="{05A09F99-3D4C-ED4C-B43F-FBA7A57E324C}"/>
+              </a:ext>
+            </a:extLst>
+          </p:cNvPr>
+          <p:cNvSpPr>
+            <a:spLocks noGrp="1"/>
+          </p:cNvSpPr>
+          <p:nvPr>
+            <p:ph type="title"/>
+          </p:nvPr>
+        </p:nvSpPr>
+        <p:spPr/>
+        <p:txBody>
+          <a:bodyPr/>
+          <a:lstStyle/>
+          <a:p>
+            <a:r>
+              <a:rPr lang="en-US" dirty="0"/>
+              <a:t>Cases</a:t>
+            </a:r>
+          </a:p>
+        </p:txBody>
+      </p:sp>
+      <p:sp>
+        <p:nvSpPr>
+          <p:cNvPr id="3" name="Content Placeholder 2">
+            <a:extLst>
+              <a:ext uri="{FF2B5EF4-FFF2-40B4-BE49-F238E27FC236}">
+                <a16:creationId xmlns:a16="http://schemas.microsoft.com/office/drawing/2014/main" id="{974912DA-052A-644D-AA69-3DAFFFBD3D6D}"/>
+              </a:ext>
+            </a:extLst>
+          </p:cNvPr>
+          <p:cNvSpPr>
+            <a:spLocks noGrp="1"/>
+          </p:cNvSpPr>
+          <p:nvPr>
+            <p:ph idx="1"/>
+          </p:nvPr>
+        </p:nvSpPr>
+        <p:spPr/>
+        <p:txBody>
+          <a:bodyPr>
+            <a:normAutofit fontScale="85000" lnSpcReduction="20000"/>
+          </a:bodyPr>
+          <a:lstStyle/>
+          <a:p>
+            <a:r>
+              <a:rPr lang="en-US" dirty="0"/>
+              <a:t>We’ve already seen cases, but now let’s examine it more deeply with respect to disjunction:</a:t>
+            </a:r>
+          </a:p>
+          <a:p>
+            <a:pPr marL="0" indent="0">
+              <a:buNone/>
+            </a:pPr>
+            <a:endParaRPr lang="en-US" dirty="0"/>
+          </a:p>
+          <a:p>
+            <a:pPr marL="0" indent="0">
+              <a:buNone/>
+            </a:pPr>
+            <a:r>
+              <a:rPr lang="en-US" sz="2600" dirty="0">
+                <a:latin typeface="Courier New" panose="02070309020205020404" pitchFamily="49" charset="0"/>
+                <a:cs typeface="Courier New" panose="02070309020205020404" pitchFamily="49" charset="0"/>
+              </a:rPr>
+              <a:t>theorem wet''' : </a:t>
+            </a:r>
+          </a:p>
+          <a:p>
+            <a:pPr marL="0" indent="0">
+              <a:buNone/>
+            </a:pPr>
+            <a:r>
+              <a:rPr lang="en-US" sz="2600" dirty="0">
+                <a:latin typeface="Courier New" panose="02070309020205020404" pitchFamily="49" charset="0"/>
+                <a:cs typeface="Courier New" panose="02070309020205020404" pitchFamily="49" charset="0"/>
+              </a:rPr>
+              <a:t>  ∀ R S W: Prop, </a:t>
+            </a:r>
+          </a:p>
+          <a:p>
+            <a:pPr marL="0" indent="0">
+              <a:buNone/>
+            </a:pPr>
+            <a:r>
+              <a:rPr lang="en-US" sz="2600" dirty="0">
+                <a:latin typeface="Courier New" panose="02070309020205020404" pitchFamily="49" charset="0"/>
+                <a:cs typeface="Courier New" panose="02070309020205020404" pitchFamily="49" charset="0"/>
+              </a:rPr>
+              <a:t>    (R ∨ S) → (R → W) → (S → W) → W :=</a:t>
+            </a:r>
+          </a:p>
+          <a:p>
+            <a:pPr marL="0" indent="0">
+              <a:buNone/>
+            </a:pPr>
+            <a:r>
+              <a:rPr lang="en-US" sz="2600" dirty="0">
+                <a:latin typeface="Courier New" panose="02070309020205020404" pitchFamily="49" charset="0"/>
+                <a:cs typeface="Courier New" panose="02070309020205020404" pitchFamily="49" charset="0"/>
+              </a:rPr>
+              <a:t>begin</a:t>
+            </a:r>
+          </a:p>
+          <a:p>
+            <a:pPr marL="0" indent="0">
+              <a:buNone/>
+            </a:pPr>
+            <a:r>
+              <a:rPr lang="en-US" sz="2600" dirty="0">
+                <a:latin typeface="Courier New" panose="02070309020205020404" pitchFamily="49" charset="0"/>
+                <a:cs typeface="Courier New" panose="02070309020205020404" pitchFamily="49" charset="0"/>
+              </a:rPr>
+              <a:t>  assume R S W </a:t>
+            </a:r>
+            <a:r>
+              <a:rPr lang="en-US" sz="2600" dirty="0" err="1">
+                <a:latin typeface="Courier New" panose="02070309020205020404" pitchFamily="49" charset="0"/>
+                <a:cs typeface="Courier New" panose="02070309020205020404" pitchFamily="49" charset="0"/>
+              </a:rPr>
+              <a:t>pfRorS</a:t>
+            </a:r>
+            <a:r>
+              <a:rPr lang="en-US" sz="2600" dirty="0">
+                <a:latin typeface="Courier New" panose="02070309020205020404" pitchFamily="49" charset="0"/>
+                <a:cs typeface="Courier New" panose="02070309020205020404" pitchFamily="49" charset="0"/>
+              </a:rPr>
+              <a:t> r2w s2w,</a:t>
+            </a:r>
+          </a:p>
+          <a:p>
+            <a:pPr marL="0" indent="0">
+              <a:buNone/>
+            </a:pPr>
+            <a:r>
+              <a:rPr lang="en-US" sz="2600" dirty="0">
+                <a:latin typeface="Courier New" panose="02070309020205020404" pitchFamily="49" charset="0"/>
+                <a:cs typeface="Courier New" panose="02070309020205020404" pitchFamily="49" charset="0"/>
+              </a:rPr>
+              <a:t>  cases </a:t>
+            </a:r>
+            <a:r>
+              <a:rPr lang="en-US" sz="2600" dirty="0" err="1">
+                <a:latin typeface="Courier New" panose="02070309020205020404" pitchFamily="49" charset="0"/>
+                <a:cs typeface="Courier New" panose="02070309020205020404" pitchFamily="49" charset="0"/>
+              </a:rPr>
+              <a:t>pfRorS</a:t>
+            </a:r>
+            <a:r>
+              <a:rPr lang="en-US" sz="2600" dirty="0">
+                <a:latin typeface="Courier New" panose="02070309020205020404" pitchFamily="49" charset="0"/>
+                <a:cs typeface="Courier New" panose="02070309020205020404" pitchFamily="49" charset="0"/>
+              </a:rPr>
+              <a:t> with </a:t>
+            </a:r>
+            <a:r>
+              <a:rPr lang="en-US" sz="2600" dirty="0" err="1">
+                <a:latin typeface="Courier New" panose="02070309020205020404" pitchFamily="49" charset="0"/>
+                <a:cs typeface="Courier New" panose="02070309020205020404" pitchFamily="49" charset="0"/>
+              </a:rPr>
+              <a:t>pfR</a:t>
+            </a:r>
+            <a:r>
+              <a:rPr lang="en-US" sz="2600" dirty="0">
+                <a:latin typeface="Courier New" panose="02070309020205020404" pitchFamily="49" charset="0"/>
+                <a:cs typeface="Courier New" panose="02070309020205020404" pitchFamily="49" charset="0"/>
+              </a:rPr>
+              <a:t> </a:t>
+            </a:r>
+            <a:r>
+              <a:rPr lang="en-US" sz="2600" dirty="0" err="1">
+                <a:latin typeface="Courier New" panose="02070309020205020404" pitchFamily="49" charset="0"/>
+                <a:cs typeface="Courier New" panose="02070309020205020404" pitchFamily="49" charset="0"/>
+              </a:rPr>
+              <a:t>pfS</a:t>
+            </a:r>
+            <a:r>
+              <a:rPr lang="en-US" sz="2600" dirty="0">
+                <a:latin typeface="Courier New" panose="02070309020205020404" pitchFamily="49" charset="0"/>
+                <a:cs typeface="Courier New" panose="02070309020205020404" pitchFamily="49" charset="0"/>
+              </a:rPr>
+              <a:t>,</a:t>
+            </a:r>
+          </a:p>
+          <a:p>
+            <a:pPr marL="0" indent="0">
+              <a:buNone/>
+            </a:pPr>
+            <a:r>
+              <a:rPr lang="en-US" sz="2600" dirty="0">
+                <a:latin typeface="Courier New" panose="02070309020205020404" pitchFamily="49" charset="0"/>
+                <a:cs typeface="Courier New" panose="02070309020205020404" pitchFamily="49" charset="0"/>
+              </a:rPr>
+              <a:t>    exact r2w </a:t>
+            </a:r>
+            <a:r>
+              <a:rPr lang="en-US" sz="2600" dirty="0" err="1">
+                <a:latin typeface="Courier New" panose="02070309020205020404" pitchFamily="49" charset="0"/>
+                <a:cs typeface="Courier New" panose="02070309020205020404" pitchFamily="49" charset="0"/>
+              </a:rPr>
+              <a:t>pfR</a:t>
+            </a:r>
+            <a:r>
+              <a:rPr lang="en-US" sz="2600" dirty="0">
+                <a:latin typeface="Courier New" panose="02070309020205020404" pitchFamily="49" charset="0"/>
+                <a:cs typeface="Courier New" panose="02070309020205020404" pitchFamily="49" charset="0"/>
+              </a:rPr>
+              <a:t>, -- case when it’s raining</a:t>
+            </a:r>
+          </a:p>
+          <a:p>
+            <a:pPr marL="0" indent="0">
+              <a:buNone/>
+            </a:pPr>
+            <a:r>
+              <a:rPr lang="en-US" sz="2600" dirty="0">
+                <a:latin typeface="Courier New" panose="02070309020205020404" pitchFamily="49" charset="0"/>
+                <a:cs typeface="Courier New" panose="02070309020205020404" pitchFamily="49" charset="0"/>
+              </a:rPr>
+              <a:t>    exact s2w </a:t>
+            </a:r>
+            <a:r>
+              <a:rPr lang="en-US" sz="2600" dirty="0" err="1">
+                <a:latin typeface="Courier New" panose="02070309020205020404" pitchFamily="49" charset="0"/>
+                <a:cs typeface="Courier New" panose="02070309020205020404" pitchFamily="49" charset="0"/>
+              </a:rPr>
+              <a:t>pfS</a:t>
+            </a:r>
+            <a:r>
+              <a:rPr lang="en-US" sz="2600" dirty="0">
+                <a:latin typeface="Courier New" panose="02070309020205020404" pitchFamily="49" charset="0"/>
+                <a:cs typeface="Courier New" panose="02070309020205020404" pitchFamily="49" charset="0"/>
+              </a:rPr>
+              <a:t>, -- case when the sprinkler’s on</a:t>
+            </a:r>
+          </a:p>
+          <a:p>
+            <a:pPr marL="0" indent="0">
+              <a:buNone/>
+            </a:pPr>
+            <a:r>
+              <a:rPr lang="en-US" sz="2600" dirty="0">
+                <a:latin typeface="Courier New" panose="02070309020205020404" pitchFamily="49" charset="0"/>
+                <a:cs typeface="Courier New" panose="02070309020205020404" pitchFamily="49" charset="0"/>
+              </a:rPr>
+              <a:t>end</a:t>
+            </a:r>
+          </a:p>
+          <a:p>
+            <a:pPr marL="0" indent="0">
+              <a:buNone/>
+            </a:pPr>
+            <a:endParaRPr lang="en-US" dirty="0"/>
+          </a:p>
+        </p:txBody>
+      </p:sp>
+      <p:sp>
+        <p:nvSpPr>
+          <p:cNvPr id="4" name="Slide Number Placeholder 3">
+            <a:extLst>
+              <a:ext uri="{FF2B5EF4-FFF2-40B4-BE49-F238E27FC236}">
+                <a16:creationId xmlns:a16="http://schemas.microsoft.com/office/drawing/2014/main" id="{2C51E704-2BDA-FA4F-BCD0-8872EB2A8DA4}"/>
+              </a:ext>
+            </a:extLst>
+          </p:cNvPr>
+          <p:cNvSpPr>
+            <a:spLocks noGrp="1"/>
+          </p:cNvSpPr>
+          <p:nvPr>
+            <p:ph type="sldNum" sz="quarter" idx="12"/>
+          </p:nvPr>
+        </p:nvSpPr>
+        <p:spPr/>
+        <p:txBody>
+          <a:bodyPr/>
+          <a:lstStyle/>
+          <a:p>
+            <a:fld id="{3352CBF5-17B8-4387-88A6-ABF9F8C64D5A}" type="slidenum">
+              <a:rPr lang="en-US" smtClean="0"/>
+              <a:t>7</a:t>
+            </a:fld>
+            <a:endParaRPr lang="en-US"/>
+          </a:p>
+        </p:txBody>
+      </p:sp>
+    </p:spTree>
+    <p:extLst>
+      <p:ext uri="{BB962C8B-B14F-4D97-AF65-F5344CB8AC3E}">
+        <p14:creationId xmlns:p14="http://schemas.microsoft.com/office/powerpoint/2010/main" val="3861147334"/>
+      </p:ext>
+    </p:extLst>
+  </p:cSld>
+  <p:clrMapOvr>
+    <a:masterClrMapping/>
+  </p:clrMapOvr>
+</p:sld>
+</file>
+
+<file path=ppt/slides/slide8.xml><?xml version="1.0" encoding="utf-8"?>
+<p:sld xmlns:a="http://schemas.openxmlformats.org/drawingml/2006/main" xmlns:r="http://schemas.openxmlformats.org/officeDocument/2006/relationships" xmlns:p="http://schemas.openxmlformats.org/presentationml/2006/main">
+  <p:cSld>
+    <p:spTree>
+      <p:nvGrpSpPr>
+        <p:cNvPr id="1" name=""/>
+        <p:cNvGrpSpPr/>
+        <p:nvPr/>
+      </p:nvGrpSpPr>
+      <p:grpSpPr>
+        <a:xfrm>
+          <a:off x="0" y="0"/>
+          <a:ext cx="0" cy="0"/>
+          <a:chOff x="0" y="0"/>
+          <a:chExt cx="0" cy="0"/>
+        </a:xfrm>
+      </p:grpSpPr>
+      <p:sp>
+        <p:nvSpPr>
+          <p:cNvPr id="2" name="Title 1">
+            <a:extLst>
+              <a:ext uri="{FF2B5EF4-FFF2-40B4-BE49-F238E27FC236}">
+                <a16:creationId xmlns:a16="http://schemas.microsoft.com/office/drawing/2014/main" id="{54A03735-720F-5F44-B80D-7B7CDDA1012C}"/>
+              </a:ext>
+            </a:extLst>
+          </p:cNvPr>
+          <p:cNvSpPr>
+            <a:spLocks noGrp="1"/>
+          </p:cNvSpPr>
+          <p:nvPr>
+            <p:ph type="title"/>
+          </p:nvPr>
+        </p:nvSpPr>
+        <p:spPr/>
+        <p:txBody>
+          <a:bodyPr/>
+          <a:lstStyle/>
+          <a:p>
+            <a:r>
+              <a:rPr lang="en-US" dirty="0"/>
+              <a:t>Disjunction Identity</a:t>
+            </a:r>
+          </a:p>
+        </p:txBody>
+      </p:sp>
+      <p:sp>
+        <p:nvSpPr>
+          <p:cNvPr id="3" name="Content Placeholder 2">
+            <a:extLst>
+              <a:ext uri="{FF2B5EF4-FFF2-40B4-BE49-F238E27FC236}">
+                <a16:creationId xmlns:a16="http://schemas.microsoft.com/office/drawing/2014/main" id="{81E4415C-DA17-7D4F-9C25-102BB0CAF6A9}"/>
+              </a:ext>
+            </a:extLst>
+          </p:cNvPr>
+          <p:cNvSpPr>
+            <a:spLocks noGrp="1"/>
+          </p:cNvSpPr>
+          <p:nvPr>
+            <p:ph idx="1"/>
+          </p:nvPr>
+        </p:nvSpPr>
+        <p:spPr/>
+        <p:txBody>
+          <a:bodyPr/>
+          <a:lstStyle/>
+          <a:p>
+            <a:r>
+              <a:rPr lang="en-US" dirty="0"/>
+              <a:t>In multiplication, 1 is the identity element, because x times 1 is x for any value of x</a:t>
+            </a:r>
+          </a:p>
+          <a:p>
+            <a:r>
+              <a:rPr lang="en-US" dirty="0"/>
+              <a:t>In addition, 0 is the identity element, because x plus 0 is x for any value of x</a:t>
+            </a:r>
+          </a:p>
+          <a:p>
+            <a:r>
+              <a:rPr lang="en-US" dirty="0"/>
+              <a:t>What is the identity element for disjunction?</a:t>
+            </a:r>
+          </a:p>
+        </p:txBody>
+      </p:sp>
+      <p:sp>
+        <p:nvSpPr>
+          <p:cNvPr id="4" name="Slide Number Placeholder 3">
+            <a:extLst>
+              <a:ext uri="{FF2B5EF4-FFF2-40B4-BE49-F238E27FC236}">
+                <a16:creationId xmlns:a16="http://schemas.microsoft.com/office/drawing/2014/main" id="{A30249B4-7088-4145-87FB-7B0B85EE1BE1}"/>
+              </a:ext>
+            </a:extLst>
+          </p:cNvPr>
+          <p:cNvSpPr>
+            <a:spLocks noGrp="1"/>
+          </p:cNvSpPr>
+          <p:nvPr>
+            <p:ph type="sldNum" sz="quarter" idx="12"/>
+          </p:nvPr>
+        </p:nvSpPr>
+        <p:spPr/>
+        <p:txBody>
+          <a:bodyPr/>
+          <a:lstStyle/>
+          <a:p>
+            <a:fld id="{3352CBF5-17B8-4387-88A6-ABF9F8C64D5A}" type="slidenum">
+              <a:rPr lang="en-US" smtClean="0"/>
+              <a:t>8</a:t>
+            </a:fld>
+            <a:endParaRPr lang="en-US"/>
+          </a:p>
+        </p:txBody>
+      </p:sp>
+    </p:spTree>
+    <p:extLst>
+      <p:ext uri="{BB962C8B-B14F-4D97-AF65-F5344CB8AC3E}">
+        <p14:creationId xmlns:p14="http://schemas.microsoft.com/office/powerpoint/2010/main" val="784796663"/>
+      </p:ext>
+    </p:extLst>
+  </p:cSld>
+  <p:clrMapOvr>
+    <a:masterClrMapping/>
+  </p:clrMapOvr>
+</p:sld>
+</file>
+
+<file path=ppt/slides/slide9.xml><?xml version="1.0" encoding="utf-8"?>
+<p:sld xmlns:a="http://schemas.openxmlformats.org/drawingml/2006/main" xmlns:r="http://schemas.openxmlformats.org/officeDocument/2006/relationships" xmlns:p="http://schemas.openxmlformats.org/presentationml/2006/main">
+  <p:cSld>
+    <p:spTree>
+      <p:nvGrpSpPr>
+        <p:cNvPr id="1" name=""/>
+        <p:cNvGrpSpPr/>
+        <p:nvPr/>
+      </p:nvGrpSpPr>
+      <p:grpSpPr>
+        <a:xfrm>
+          <a:off x="0" y="0"/>
+          <a:ext cx="0" cy="0"/>
+          <a:chOff x="0" y="0"/>
+          <a:chExt cx="0" cy="0"/>
+        </a:xfrm>
+      </p:grpSpPr>
+      <p:sp>
+        <p:nvSpPr>
+          <p:cNvPr id="2" name="Title 1">
+            <a:extLst>
+              <a:ext uri="{FF2B5EF4-FFF2-40B4-BE49-F238E27FC236}">
+                <a16:creationId xmlns:a16="http://schemas.microsoft.com/office/drawing/2014/main" id="{CE608805-A7CF-AF46-AEE0-BE2F138D4B12}"/>
+              </a:ext>
+            </a:extLst>
+          </p:cNvPr>
+          <p:cNvSpPr>
+            <a:spLocks noGrp="1"/>
+          </p:cNvSpPr>
+          <p:nvPr>
+            <p:ph type="title"/>
+          </p:nvPr>
+        </p:nvSpPr>
+        <p:spPr/>
+        <p:txBody>
+          <a:bodyPr/>
+          <a:lstStyle/>
+          <a:p>
+            <a:r>
+              <a:rPr lang="en-US" dirty="0"/>
+              <a:t>Right Identity</a:t>
+            </a:r>
+          </a:p>
+        </p:txBody>
+      </p:sp>
+      <p:sp>
+        <p:nvSpPr>
+          <p:cNvPr id="3" name="Content Placeholder 2">
+            <a:extLst>
+              <a:ext uri="{FF2B5EF4-FFF2-40B4-BE49-F238E27FC236}">
+                <a16:creationId xmlns:a16="http://schemas.microsoft.com/office/drawing/2014/main" id="{9062BEEF-6150-4E44-BEE0-E4C761ABA6A3}"/>
+              </a:ext>
+            </a:extLst>
+          </p:cNvPr>
+          <p:cNvSpPr>
+            <a:spLocks noGrp="1"/>
+          </p:cNvSpPr>
+          <p:nvPr>
+            <p:ph idx="1"/>
+          </p:nvPr>
+        </p:nvSpPr>
+        <p:spPr/>
+        <p:txBody>
+          <a:bodyPr>
+            <a:normAutofit fontScale="85000" lnSpcReduction="20000"/>
+          </a:bodyPr>
+          <a:lstStyle/>
+          <a:p>
+            <a:r>
+              <a:rPr lang="en-US" dirty="0"/>
+              <a:t>Here’s a proof that false is a right identity for disjunction:</a:t>
+            </a:r>
+          </a:p>
+          <a:p>
+            <a:pPr marL="0" indent="0">
+              <a:buNone/>
+            </a:pPr>
+            <a:r>
+              <a:rPr lang="en-US" sz="2600" dirty="0">
+                <a:latin typeface="Courier New" panose="02070309020205020404" pitchFamily="49" charset="0"/>
+                <a:cs typeface="Courier New" panose="02070309020205020404" pitchFamily="49" charset="0"/>
+              </a:rPr>
+              <a:t>theorem </a:t>
+            </a:r>
+            <a:r>
+              <a:rPr lang="en-US" sz="2600" dirty="0" err="1">
+                <a:latin typeface="Courier New" panose="02070309020205020404" pitchFamily="49" charset="0"/>
+                <a:cs typeface="Courier New" panose="02070309020205020404" pitchFamily="49" charset="0"/>
+              </a:rPr>
+              <a:t>id_right_or</a:t>
+            </a:r>
+            <a:r>
+              <a:rPr lang="en-US" sz="2600" dirty="0">
+                <a:latin typeface="Courier New" panose="02070309020205020404" pitchFamily="49" charset="0"/>
+                <a:cs typeface="Courier New" panose="02070309020205020404" pitchFamily="49" charset="0"/>
+              </a:rPr>
+              <a:t> : </a:t>
+            </a:r>
+          </a:p>
+          <a:p>
+            <a:pPr marL="0" indent="0">
+              <a:buNone/>
+            </a:pPr>
+            <a:r>
+              <a:rPr lang="en-US" sz="2600" dirty="0">
+                <a:latin typeface="Courier New" panose="02070309020205020404" pitchFamily="49" charset="0"/>
+                <a:cs typeface="Courier New" panose="02070309020205020404" pitchFamily="49" charset="0"/>
+              </a:rPr>
+              <a:t>  ∀ P : Prop, P ∨ false ↔ P :=</a:t>
+            </a:r>
+          </a:p>
+          <a:p>
+            <a:pPr marL="0" indent="0">
+              <a:buNone/>
+            </a:pPr>
+            <a:r>
+              <a:rPr lang="en-US" sz="2600" dirty="0">
+                <a:latin typeface="Courier New" panose="02070309020205020404" pitchFamily="49" charset="0"/>
+                <a:cs typeface="Courier New" panose="02070309020205020404" pitchFamily="49" charset="0"/>
+              </a:rPr>
+              <a:t>    </a:t>
+            </a:r>
+            <a:r>
+              <a:rPr lang="el-GR" sz="2600" dirty="0">
+                <a:latin typeface="Courier New" panose="02070309020205020404" pitchFamily="49" charset="0"/>
+                <a:cs typeface="Courier New" panose="02070309020205020404" pitchFamily="49" charset="0"/>
+              </a:rPr>
+              <a:t>λ </a:t>
+            </a:r>
+            <a:r>
+              <a:rPr lang="en-US" sz="2600" dirty="0">
+                <a:latin typeface="Courier New" panose="02070309020205020404" pitchFamily="49" charset="0"/>
+                <a:cs typeface="Courier New" panose="02070309020205020404" pitchFamily="49" charset="0"/>
+              </a:rPr>
+              <a:t>P,</a:t>
+            </a:r>
+          </a:p>
+          <a:p>
+            <a:pPr marL="0" indent="0">
+              <a:buNone/>
+            </a:pPr>
+            <a:r>
+              <a:rPr lang="en-US" sz="2600" dirty="0">
+                <a:latin typeface="Courier New" panose="02070309020205020404" pitchFamily="49" charset="0"/>
+                <a:cs typeface="Courier New" panose="02070309020205020404" pitchFamily="49" charset="0"/>
+              </a:rPr>
+              <a:t>    begin</a:t>
+            </a:r>
+          </a:p>
+          <a:p>
+            <a:pPr marL="0" indent="0">
+              <a:buNone/>
+            </a:pPr>
+            <a:r>
+              <a:rPr lang="en-US" sz="2600" dirty="0">
+                <a:latin typeface="Courier New" panose="02070309020205020404" pitchFamily="49" charset="0"/>
+                <a:cs typeface="Courier New" panose="02070309020205020404" pitchFamily="49" charset="0"/>
+              </a:rPr>
+              <a:t>      apply </a:t>
+            </a:r>
+            <a:r>
+              <a:rPr lang="en-US" sz="2600" dirty="0" err="1">
+                <a:latin typeface="Courier New" panose="02070309020205020404" pitchFamily="49" charset="0"/>
+                <a:cs typeface="Courier New" panose="02070309020205020404" pitchFamily="49" charset="0"/>
+              </a:rPr>
+              <a:t>iff.intro</a:t>
+            </a:r>
+            <a:r>
+              <a:rPr lang="en-US" sz="2600" dirty="0">
+                <a:latin typeface="Courier New" panose="02070309020205020404" pitchFamily="49" charset="0"/>
+                <a:cs typeface="Courier New" panose="02070309020205020404" pitchFamily="49" charset="0"/>
+              </a:rPr>
+              <a:t>,</a:t>
+            </a:r>
+          </a:p>
+          <a:p>
+            <a:pPr marL="0" indent="0">
+              <a:buNone/>
+            </a:pPr>
+            <a:r>
+              <a:rPr lang="en-US" sz="2600" dirty="0">
+                <a:latin typeface="Courier New" panose="02070309020205020404" pitchFamily="49" charset="0"/>
+                <a:cs typeface="Courier New" panose="02070309020205020404" pitchFamily="49" charset="0"/>
+              </a:rPr>
+              <a:t>      assume </a:t>
+            </a:r>
+            <a:r>
+              <a:rPr lang="en-US" sz="2600" dirty="0" err="1">
+                <a:latin typeface="Courier New" panose="02070309020205020404" pitchFamily="49" charset="0"/>
+                <a:cs typeface="Courier New" panose="02070309020205020404" pitchFamily="49" charset="0"/>
+              </a:rPr>
+              <a:t>pfPorfalse</a:t>
+            </a:r>
+            <a:r>
+              <a:rPr lang="en-US" sz="2600" dirty="0">
+                <a:latin typeface="Courier New" panose="02070309020205020404" pitchFamily="49" charset="0"/>
+                <a:cs typeface="Courier New" panose="02070309020205020404" pitchFamily="49" charset="0"/>
+              </a:rPr>
+              <a:t>,</a:t>
+            </a:r>
+          </a:p>
+          <a:p>
+            <a:pPr marL="0" indent="0">
+              <a:buNone/>
+            </a:pPr>
+            <a:r>
+              <a:rPr lang="en-US" sz="2600" dirty="0">
+                <a:latin typeface="Courier New" panose="02070309020205020404" pitchFamily="49" charset="0"/>
+                <a:cs typeface="Courier New" panose="02070309020205020404" pitchFamily="49" charset="0"/>
+              </a:rPr>
+              <a:t>      cases </a:t>
+            </a:r>
+            <a:r>
+              <a:rPr lang="en-US" sz="2600" dirty="0" err="1">
+                <a:latin typeface="Courier New" panose="02070309020205020404" pitchFamily="49" charset="0"/>
+                <a:cs typeface="Courier New" panose="02070309020205020404" pitchFamily="49" charset="0"/>
+              </a:rPr>
+              <a:t>pfPorfalse</a:t>
+            </a:r>
+            <a:r>
+              <a:rPr lang="en-US" sz="2600" dirty="0">
+                <a:latin typeface="Courier New" panose="02070309020205020404" pitchFamily="49" charset="0"/>
+                <a:cs typeface="Courier New" panose="02070309020205020404" pitchFamily="49" charset="0"/>
+              </a:rPr>
+              <a:t> with </a:t>
+            </a:r>
+            <a:r>
+              <a:rPr lang="en-US" sz="2600" dirty="0" err="1">
+                <a:latin typeface="Courier New" panose="02070309020205020404" pitchFamily="49" charset="0"/>
+                <a:cs typeface="Courier New" panose="02070309020205020404" pitchFamily="49" charset="0"/>
+              </a:rPr>
+              <a:t>pfP</a:t>
+            </a:r>
+            <a:r>
+              <a:rPr lang="en-US" sz="2600" dirty="0">
+                <a:latin typeface="Courier New" panose="02070309020205020404" pitchFamily="49" charset="0"/>
+                <a:cs typeface="Courier New" panose="02070309020205020404" pitchFamily="49" charset="0"/>
+              </a:rPr>
+              <a:t> </a:t>
+            </a:r>
+            <a:r>
+              <a:rPr lang="en-US" sz="2600" dirty="0" err="1">
+                <a:latin typeface="Courier New" panose="02070309020205020404" pitchFamily="49" charset="0"/>
+                <a:cs typeface="Courier New" panose="02070309020205020404" pitchFamily="49" charset="0"/>
+              </a:rPr>
+              <a:t>pfFalse</a:t>
+            </a:r>
+            <a:r>
+              <a:rPr lang="en-US" sz="2600" dirty="0">
+                <a:latin typeface="Courier New" panose="02070309020205020404" pitchFamily="49" charset="0"/>
+                <a:cs typeface="Courier New" panose="02070309020205020404" pitchFamily="49" charset="0"/>
+              </a:rPr>
+              <a:t>,</a:t>
+            </a:r>
+          </a:p>
+          <a:p>
+            <a:pPr marL="0" indent="0">
+              <a:buNone/>
+            </a:pPr>
+            <a:r>
+              <a:rPr lang="en-US" sz="2600" dirty="0">
+                <a:latin typeface="Courier New" panose="02070309020205020404" pitchFamily="49" charset="0"/>
+                <a:cs typeface="Courier New" panose="02070309020205020404" pitchFamily="49" charset="0"/>
+              </a:rPr>
+              <a:t>        assumption, -- case where we have a proof of P</a:t>
+            </a:r>
+          </a:p>
+          <a:p>
+            <a:pPr marL="0" indent="0">
+              <a:buNone/>
+            </a:pPr>
+            <a:r>
+              <a:rPr lang="en-US" sz="2600" dirty="0">
+                <a:latin typeface="Courier New" panose="02070309020205020404" pitchFamily="49" charset="0"/>
+                <a:cs typeface="Courier New" panose="02070309020205020404" pitchFamily="49" charset="0"/>
+              </a:rPr>
+              <a:t>        exact </a:t>
+            </a:r>
+            <a:r>
+              <a:rPr lang="en-US" sz="2600" dirty="0" err="1">
+                <a:latin typeface="Courier New" panose="02070309020205020404" pitchFamily="49" charset="0"/>
+                <a:cs typeface="Courier New" panose="02070309020205020404" pitchFamily="49" charset="0"/>
+              </a:rPr>
+              <a:t>false.elim</a:t>
+            </a:r>
+            <a:r>
+              <a:rPr lang="en-US" sz="2600" dirty="0">
+                <a:latin typeface="Courier New" panose="02070309020205020404" pitchFamily="49" charset="0"/>
+                <a:cs typeface="Courier New" panose="02070309020205020404" pitchFamily="49" charset="0"/>
+              </a:rPr>
+              <a:t> </a:t>
+            </a:r>
+            <a:r>
+              <a:rPr lang="en-US" sz="2600" dirty="0" err="1">
+                <a:latin typeface="Courier New" panose="02070309020205020404" pitchFamily="49" charset="0"/>
+                <a:cs typeface="Courier New" panose="02070309020205020404" pitchFamily="49" charset="0"/>
+              </a:rPr>
+              <a:t>pfFalse</a:t>
+            </a:r>
+            <a:r>
+              <a:rPr lang="en-US" sz="2600" dirty="0">
+                <a:latin typeface="Courier New" panose="02070309020205020404" pitchFamily="49" charset="0"/>
+                <a:cs typeface="Courier New" panose="02070309020205020404" pitchFamily="49" charset="0"/>
+              </a:rPr>
+              <a:t>, -- case with proof of false</a:t>
+            </a:r>
+          </a:p>
+          <a:p>
+            <a:pPr marL="0" indent="0">
+              <a:buNone/>
+            </a:pPr>
+            <a:r>
+              <a:rPr lang="en-US" sz="2600" dirty="0">
+                <a:latin typeface="Courier New" panose="02070309020205020404" pitchFamily="49" charset="0"/>
+                <a:cs typeface="Courier New" panose="02070309020205020404" pitchFamily="49" charset="0"/>
+              </a:rPr>
+              <a:t>      apply </a:t>
+            </a:r>
+            <a:r>
+              <a:rPr lang="en-US" sz="2600" dirty="0" err="1">
+                <a:latin typeface="Courier New" panose="02070309020205020404" pitchFamily="49" charset="0"/>
+                <a:cs typeface="Courier New" panose="02070309020205020404" pitchFamily="49" charset="0"/>
+              </a:rPr>
+              <a:t>or.intro_left</a:t>
+            </a:r>
+            <a:endParaRPr lang="en-US" sz="2600" dirty="0">
+              <a:latin typeface="Courier New" panose="02070309020205020404" pitchFamily="49" charset="0"/>
+              <a:cs typeface="Courier New" panose="02070309020205020404" pitchFamily="49" charset="0"/>
+            </a:endParaRPr>
+          </a:p>
+          <a:p>
+            <a:pPr marL="0" indent="0">
+              <a:buNone/>
+            </a:pPr>
+            <a:r>
+              <a:rPr lang="en-US" sz="2600" dirty="0">
+                <a:latin typeface="Courier New" panose="02070309020205020404" pitchFamily="49" charset="0"/>
+                <a:cs typeface="Courier New" panose="02070309020205020404" pitchFamily="49" charset="0"/>
+              </a:rPr>
+              <a:t>    end</a:t>
+            </a:r>
+          </a:p>
+          <a:p>
+            <a:pPr marL="0" indent="0">
+              <a:buNone/>
+            </a:pPr>
+            <a:endParaRPr lang="en-US" dirty="0"/>
+          </a:p>
+        </p:txBody>
+      </p:sp>
+      <p:sp>
+        <p:nvSpPr>
+          <p:cNvPr id="4" name="Slide Number Placeholder 3">
+            <a:extLst>
+              <a:ext uri="{FF2B5EF4-FFF2-40B4-BE49-F238E27FC236}">
+                <a16:creationId xmlns:a16="http://schemas.microsoft.com/office/drawing/2014/main" id="{913376F0-2CBD-EC46-B547-AD4BEA7F454B}"/>
+              </a:ext>
+            </a:extLst>
+          </p:cNvPr>
+          <p:cNvSpPr>
+            <a:spLocks noGrp="1"/>
+          </p:cNvSpPr>
+          <p:nvPr>
+            <p:ph type="sldNum" sz="quarter" idx="12"/>
+          </p:nvPr>
+        </p:nvSpPr>
+        <p:spPr/>
+        <p:txBody>
+          <a:bodyPr/>
+          <a:lstStyle/>
+          <a:p>
+            <a:fld id="{3352CBF5-17B8-4387-88A6-ABF9F8C64D5A}" type="slidenum">
+              <a:rPr lang="en-US" smtClean="0"/>
+              <a:t>9</a:t>
+            </a:fld>
+            <a:endParaRPr lang="en-US"/>
+          </a:p>
+        </p:txBody>
+      </p:sp>
+    </p:spTree>
+    <p:extLst>
+      <p:ext uri="{BB962C8B-B14F-4D97-AF65-F5344CB8AC3E}">
+        <p14:creationId xmlns:p14="http://schemas.microsoft.com/office/powerpoint/2010/main" val="4036505198"/>
       </p:ext>
     </p:extLst>
   </p:cSld>

</xml_diff>

<commit_message>
Updated disjunction notes and slides
</commit_message>
<xml_diff>
--- a/09_Disjunction/Disjunction.pptx
+++ b/09_Disjunction/Disjunction.pptx
@@ -5,21 +5,24 @@
     <p:sldMasterId id="2147483648" r:id="rId1"/>
   </p:sldMasterIdLst>
   <p:notesMasterIdLst>
-    <p:notesMasterId r:id="rId14"/>
+    <p:notesMasterId r:id="rId17"/>
   </p:notesMasterIdLst>
   <p:sldIdLst>
     <p:sldId id="258" r:id="rId2"/>
     <p:sldId id="356" r:id="rId3"/>
     <p:sldId id="363" r:id="rId4"/>
     <p:sldId id="357" r:id="rId5"/>
-    <p:sldId id="370" r:id="rId6"/>
-    <p:sldId id="364" r:id="rId7"/>
-    <p:sldId id="365" r:id="rId8"/>
-    <p:sldId id="366" r:id="rId9"/>
-    <p:sldId id="367" r:id="rId10"/>
-    <p:sldId id="368" r:id="rId11"/>
-    <p:sldId id="369" r:id="rId12"/>
-    <p:sldId id="261" r:id="rId13"/>
+    <p:sldId id="372" r:id="rId6"/>
+    <p:sldId id="371" r:id="rId7"/>
+    <p:sldId id="370" r:id="rId8"/>
+    <p:sldId id="364" r:id="rId9"/>
+    <p:sldId id="365" r:id="rId10"/>
+    <p:sldId id="366" r:id="rId11"/>
+    <p:sldId id="367" r:id="rId12"/>
+    <p:sldId id="368" r:id="rId13"/>
+    <p:sldId id="369" r:id="rId14"/>
+    <p:sldId id="373" r:id="rId15"/>
+    <p:sldId id="261" r:id="rId16"/>
   </p:sldIdLst>
   <p:sldSz cx="12192000" cy="6858000"/>
   <p:notesSz cx="6858000" cy="9144000"/>
@@ -3571,7 +3574,7 @@
           <p:cNvPr id="2" name="Title 1">
             <a:extLst>
               <a:ext uri="{FF2B5EF4-FFF2-40B4-BE49-F238E27FC236}">
-                <a16:creationId xmlns:a16="http://schemas.microsoft.com/office/drawing/2014/main" id="{CE608805-A7CF-AF46-AEE0-BE2F138D4B12}"/>
+                <a16:creationId xmlns:a16="http://schemas.microsoft.com/office/drawing/2014/main" id="{05A09F99-3D4C-ED4C-B43F-FBA7A57E324C}"/>
               </a:ext>
             </a:extLst>
           </p:cNvPr>
@@ -3589,7 +3592,7 @@
           <a:p>
             <a:r>
               <a:rPr lang="en-US" dirty="0"/>
-              <a:t>Right Identity</a:t>
+              <a:t>Cases</a:t>
             </a:r>
           </a:p>
         </p:txBody>
@@ -3599,7 +3602,7 @@
           <p:cNvPr id="3" name="Content Placeholder 2">
             <a:extLst>
               <a:ext uri="{FF2B5EF4-FFF2-40B4-BE49-F238E27FC236}">
-                <a16:creationId xmlns:a16="http://schemas.microsoft.com/office/drawing/2014/main" id="{9062BEEF-6150-4E44-BEE0-E4C761ABA6A3}"/>
+                <a16:creationId xmlns:a16="http://schemas.microsoft.com/office/drawing/2014/main" id="{974912DA-052A-644D-AA69-3DAFFFBD3D6D}"/>
               </a:ext>
             </a:extLst>
           </p:cNvPr>
@@ -3619,33 +3622,87 @@
           <a:p>
             <a:r>
               <a:rPr lang="en-US" dirty="0"/>
-              <a:t>Here’s a proof that false is a right identity for disjunction:</a:t>
+              <a:t>We’ve already seen cases, but now let’s examine it more deeply with respect to disjunction:</a:t>
             </a:r>
           </a:p>
           <a:p>
             <a:pPr marL="0" indent="0">
               <a:buNone/>
             </a:pPr>
+            <a:endParaRPr lang="en-US" dirty="0"/>
+          </a:p>
+          <a:p>
+            <a:pPr marL="0" indent="0">
+              <a:buNone/>
+            </a:pPr>
             <a:r>
               <a:rPr lang="en-US" sz="2600" dirty="0">
                 <a:latin typeface="Courier New" panose="02070309020205020404" pitchFamily="49" charset="0"/>
                 <a:cs typeface="Courier New" panose="02070309020205020404" pitchFamily="49" charset="0"/>
               </a:rPr>
-              <a:t>theorem </a:t>
+              <a:t>theorem wet''' : </a:t>
+            </a:r>
+          </a:p>
+          <a:p>
+            <a:pPr marL="0" indent="0">
+              <a:buNone/>
+            </a:pPr>
+            <a:r>
+              <a:rPr lang="en-US" sz="2600" dirty="0">
+                <a:latin typeface="Courier New" panose="02070309020205020404" pitchFamily="49" charset="0"/>
+                <a:cs typeface="Courier New" panose="02070309020205020404" pitchFamily="49" charset="0"/>
+              </a:rPr>
+              <a:t>  ∀ R S W: Prop, </a:t>
+            </a:r>
+          </a:p>
+          <a:p>
+            <a:pPr marL="0" indent="0">
+              <a:buNone/>
+            </a:pPr>
+            <a:r>
+              <a:rPr lang="en-US" sz="2600" dirty="0">
+                <a:latin typeface="Courier New" panose="02070309020205020404" pitchFamily="49" charset="0"/>
+                <a:cs typeface="Courier New" panose="02070309020205020404" pitchFamily="49" charset="0"/>
+              </a:rPr>
+              <a:t>    (R ∨ S) → (R → W) → (S → W) → W :=</a:t>
+            </a:r>
+          </a:p>
+          <a:p>
+            <a:pPr marL="0" indent="0">
+              <a:buNone/>
+            </a:pPr>
+            <a:r>
+              <a:rPr lang="en-US" sz="2600" dirty="0">
+                <a:latin typeface="Courier New" panose="02070309020205020404" pitchFamily="49" charset="0"/>
+                <a:cs typeface="Courier New" panose="02070309020205020404" pitchFamily="49" charset="0"/>
+              </a:rPr>
+              <a:t>begin</a:t>
+            </a:r>
+          </a:p>
+          <a:p>
+            <a:pPr marL="0" indent="0">
+              <a:buNone/>
+            </a:pPr>
+            <a:r>
+              <a:rPr lang="en-US" sz="2600" dirty="0">
+                <a:latin typeface="Courier New" panose="02070309020205020404" pitchFamily="49" charset="0"/>
+                <a:cs typeface="Courier New" panose="02070309020205020404" pitchFamily="49" charset="0"/>
+              </a:rPr>
+              <a:t>  assume R S W </a:t>
             </a:r>
             <a:r>
               <a:rPr lang="en-US" sz="2600" dirty="0" err="1">
                 <a:latin typeface="Courier New" panose="02070309020205020404" pitchFamily="49" charset="0"/>
                 <a:cs typeface="Courier New" panose="02070309020205020404" pitchFamily="49" charset="0"/>
               </a:rPr>
-              <a:t>id_right_or</a:t>
+              <a:t>pfRorS</a:t>
             </a:r>
             <a:r>
               <a:rPr lang="en-US" sz="2600" dirty="0">
                 <a:latin typeface="Courier New" panose="02070309020205020404" pitchFamily="49" charset="0"/>
                 <a:cs typeface="Courier New" panose="02070309020205020404" pitchFamily="49" charset="0"/>
               </a:rPr>
-              <a:t> : </a:t>
+              <a:t> r2w s2w,</a:t>
             </a:r>
           </a:p>
           <a:p>
@@ -3657,7 +3714,49 @@
                 <a:latin typeface="Courier New" panose="02070309020205020404" pitchFamily="49" charset="0"/>
                 <a:cs typeface="Courier New" panose="02070309020205020404" pitchFamily="49" charset="0"/>
               </a:rPr>
-              <a:t>  ∀ P : Prop, P ∨ false ↔ P :=</a:t>
+              <a:t>  cases </a:t>
+            </a:r>
+            <a:r>
+              <a:rPr lang="en-US" sz="2600" dirty="0" err="1">
+                <a:latin typeface="Courier New" panose="02070309020205020404" pitchFamily="49" charset="0"/>
+                <a:cs typeface="Courier New" panose="02070309020205020404" pitchFamily="49" charset="0"/>
+              </a:rPr>
+              <a:t>pfRorS</a:t>
+            </a:r>
+            <a:r>
+              <a:rPr lang="en-US" sz="2600" dirty="0">
+                <a:latin typeface="Courier New" panose="02070309020205020404" pitchFamily="49" charset="0"/>
+                <a:cs typeface="Courier New" panose="02070309020205020404" pitchFamily="49" charset="0"/>
+              </a:rPr>
+              <a:t> with </a:t>
+            </a:r>
+            <a:r>
+              <a:rPr lang="en-US" sz="2600" dirty="0" err="1">
+                <a:latin typeface="Courier New" panose="02070309020205020404" pitchFamily="49" charset="0"/>
+                <a:cs typeface="Courier New" panose="02070309020205020404" pitchFamily="49" charset="0"/>
+              </a:rPr>
+              <a:t>pfR</a:t>
+            </a:r>
+            <a:r>
+              <a:rPr lang="en-US" sz="2600" dirty="0">
+                <a:latin typeface="Courier New" panose="02070309020205020404" pitchFamily="49" charset="0"/>
+                <a:cs typeface="Courier New" panose="02070309020205020404" pitchFamily="49" charset="0"/>
+              </a:rPr>
+              <a:t> </a:t>
+            </a:r>
+            <a:r>
+              <a:rPr lang="en-US" sz="2600" dirty="0" err="1">
+                <a:latin typeface="Courier New" panose="02070309020205020404" pitchFamily="49" charset="0"/>
+                <a:cs typeface="Courier New" panose="02070309020205020404" pitchFamily="49" charset="0"/>
+              </a:rPr>
+              <a:t>pfS</a:t>
+            </a:r>
+            <a:r>
+              <a:rPr lang="en-US" sz="2600" dirty="0">
+                <a:latin typeface="Courier New" panose="02070309020205020404" pitchFamily="49" charset="0"/>
+                <a:cs typeface="Courier New" panose="02070309020205020404" pitchFamily="49" charset="0"/>
+              </a:rPr>
+              <a:t>,</a:t>
             </a:r>
           </a:p>
           <a:p>
@@ -3669,21 +3768,21 @@
                 <a:latin typeface="Courier New" panose="02070309020205020404" pitchFamily="49" charset="0"/>
                 <a:cs typeface="Courier New" panose="02070309020205020404" pitchFamily="49" charset="0"/>
               </a:rPr>
-              <a:t>    </a:t>
-            </a:r>
-            <a:r>
-              <a:rPr lang="el-GR" sz="2600" dirty="0">
-                <a:latin typeface="Courier New" panose="02070309020205020404" pitchFamily="49" charset="0"/>
-                <a:cs typeface="Courier New" panose="02070309020205020404" pitchFamily="49" charset="0"/>
-              </a:rPr>
-              <a:t>λ </a:t>
+              <a:t>    exact r2w </a:t>
+            </a:r>
+            <a:r>
+              <a:rPr lang="en-US" sz="2600" dirty="0" err="1">
+                <a:latin typeface="Courier New" panose="02070309020205020404" pitchFamily="49" charset="0"/>
+                <a:cs typeface="Courier New" panose="02070309020205020404" pitchFamily="49" charset="0"/>
+              </a:rPr>
+              <a:t>pfR</a:t>
             </a:r>
             <a:r>
               <a:rPr lang="en-US" sz="2600" dirty="0">
                 <a:latin typeface="Courier New" panose="02070309020205020404" pitchFamily="49" charset="0"/>
                 <a:cs typeface="Courier New" panose="02070309020205020404" pitchFamily="49" charset="0"/>
               </a:rPr>
-              <a:t>P,</a:t>
+              <a:t>, -- case when it’s raining</a:t>
             </a:r>
           </a:p>
           <a:p>
@@ -3695,7 +3794,21 @@
                 <a:latin typeface="Courier New" panose="02070309020205020404" pitchFamily="49" charset="0"/>
                 <a:cs typeface="Courier New" panose="02070309020205020404" pitchFamily="49" charset="0"/>
               </a:rPr>
-              <a:t>    begin</a:t>
+              <a:t>    exact s2w </a:t>
+            </a:r>
+            <a:r>
+              <a:rPr lang="en-US" sz="2600" dirty="0" err="1">
+                <a:latin typeface="Courier New" panose="02070309020205020404" pitchFamily="49" charset="0"/>
+                <a:cs typeface="Courier New" panose="02070309020205020404" pitchFamily="49" charset="0"/>
+              </a:rPr>
+              <a:t>pfS</a:t>
+            </a:r>
+            <a:r>
+              <a:rPr lang="en-US" sz="2600" dirty="0">
+                <a:latin typeface="Courier New" panose="02070309020205020404" pitchFamily="49" charset="0"/>
+                <a:cs typeface="Courier New" panose="02070309020205020404" pitchFamily="49" charset="0"/>
+              </a:rPr>
+              <a:t>, -- case when the sprinkler’s on</a:t>
             </a:r>
           </a:p>
           <a:p>
@@ -3707,188 +3820,7 @@
                 <a:latin typeface="Courier New" panose="02070309020205020404" pitchFamily="49" charset="0"/>
                 <a:cs typeface="Courier New" panose="02070309020205020404" pitchFamily="49" charset="0"/>
               </a:rPr>
-              <a:t>      apply </a:t>
-            </a:r>
-            <a:r>
-              <a:rPr lang="en-US" sz="2600" dirty="0" err="1">
-                <a:latin typeface="Courier New" panose="02070309020205020404" pitchFamily="49" charset="0"/>
-                <a:cs typeface="Courier New" panose="02070309020205020404" pitchFamily="49" charset="0"/>
-              </a:rPr>
-              <a:t>iff.intro</a:t>
-            </a:r>
-            <a:r>
-              <a:rPr lang="en-US" sz="2600" dirty="0">
-                <a:latin typeface="Courier New" panose="02070309020205020404" pitchFamily="49" charset="0"/>
-                <a:cs typeface="Courier New" panose="02070309020205020404" pitchFamily="49" charset="0"/>
-              </a:rPr>
-              <a:t>,</a:t>
-            </a:r>
-          </a:p>
-          <a:p>
-            <a:pPr marL="0" indent="0">
-              <a:buNone/>
-            </a:pPr>
-            <a:r>
-              <a:rPr lang="en-US" sz="2600" dirty="0">
-                <a:latin typeface="Courier New" panose="02070309020205020404" pitchFamily="49" charset="0"/>
-                <a:cs typeface="Courier New" panose="02070309020205020404" pitchFamily="49" charset="0"/>
-              </a:rPr>
-              <a:t>      assume </a:t>
-            </a:r>
-            <a:r>
-              <a:rPr lang="en-US" sz="2600" dirty="0" err="1">
-                <a:latin typeface="Courier New" panose="02070309020205020404" pitchFamily="49" charset="0"/>
-                <a:cs typeface="Courier New" panose="02070309020205020404" pitchFamily="49" charset="0"/>
-              </a:rPr>
-              <a:t>pfPorfalse</a:t>
-            </a:r>
-            <a:r>
-              <a:rPr lang="en-US" sz="2600" dirty="0">
-                <a:latin typeface="Courier New" panose="02070309020205020404" pitchFamily="49" charset="0"/>
-                <a:cs typeface="Courier New" panose="02070309020205020404" pitchFamily="49" charset="0"/>
-              </a:rPr>
-              <a:t>,</a:t>
-            </a:r>
-          </a:p>
-          <a:p>
-            <a:pPr marL="0" indent="0">
-              <a:buNone/>
-            </a:pPr>
-            <a:r>
-              <a:rPr lang="en-US" sz="2600" dirty="0">
-                <a:latin typeface="Courier New" panose="02070309020205020404" pitchFamily="49" charset="0"/>
-                <a:cs typeface="Courier New" panose="02070309020205020404" pitchFamily="49" charset="0"/>
-              </a:rPr>
-              <a:t>      cases </a:t>
-            </a:r>
-            <a:r>
-              <a:rPr lang="en-US" sz="2600" dirty="0" err="1">
-                <a:latin typeface="Courier New" panose="02070309020205020404" pitchFamily="49" charset="0"/>
-                <a:cs typeface="Courier New" panose="02070309020205020404" pitchFamily="49" charset="0"/>
-              </a:rPr>
-              <a:t>pfPorfalse</a:t>
-            </a:r>
-            <a:r>
-              <a:rPr lang="en-US" sz="2600" dirty="0">
-                <a:latin typeface="Courier New" panose="02070309020205020404" pitchFamily="49" charset="0"/>
-                <a:cs typeface="Courier New" panose="02070309020205020404" pitchFamily="49" charset="0"/>
-              </a:rPr>
-              <a:t> with </a:t>
-            </a:r>
-            <a:r>
-              <a:rPr lang="en-US" sz="2600" dirty="0" err="1">
-                <a:latin typeface="Courier New" panose="02070309020205020404" pitchFamily="49" charset="0"/>
-                <a:cs typeface="Courier New" panose="02070309020205020404" pitchFamily="49" charset="0"/>
-              </a:rPr>
-              <a:t>pfP</a:t>
-            </a:r>
-            <a:r>
-              <a:rPr lang="en-US" sz="2600" dirty="0">
-                <a:latin typeface="Courier New" panose="02070309020205020404" pitchFamily="49" charset="0"/>
-                <a:cs typeface="Courier New" panose="02070309020205020404" pitchFamily="49" charset="0"/>
-              </a:rPr>
-              <a:t> </a:t>
-            </a:r>
-            <a:r>
-              <a:rPr lang="en-US" sz="2600" dirty="0" err="1">
-                <a:latin typeface="Courier New" panose="02070309020205020404" pitchFamily="49" charset="0"/>
-                <a:cs typeface="Courier New" panose="02070309020205020404" pitchFamily="49" charset="0"/>
-              </a:rPr>
-              <a:t>pfFalse</a:t>
-            </a:r>
-            <a:r>
-              <a:rPr lang="en-US" sz="2600" dirty="0">
-                <a:latin typeface="Courier New" panose="02070309020205020404" pitchFamily="49" charset="0"/>
-                <a:cs typeface="Courier New" panose="02070309020205020404" pitchFamily="49" charset="0"/>
-              </a:rPr>
-              <a:t>,</a:t>
-            </a:r>
-          </a:p>
-          <a:p>
-            <a:pPr marL="0" indent="0">
-              <a:buNone/>
-            </a:pPr>
-            <a:r>
-              <a:rPr lang="en-US" sz="2600" dirty="0">
-                <a:latin typeface="Courier New" panose="02070309020205020404" pitchFamily="49" charset="0"/>
-                <a:cs typeface="Courier New" panose="02070309020205020404" pitchFamily="49" charset="0"/>
-              </a:rPr>
-              <a:t>        assumption, -- case where we have a proof of P</a:t>
-            </a:r>
-          </a:p>
-          <a:p>
-            <a:pPr marL="0" indent="0">
-              <a:buNone/>
-            </a:pPr>
-            <a:r>
-              <a:rPr lang="en-US" sz="2600" dirty="0">
-                <a:latin typeface="Courier New" panose="02070309020205020404" pitchFamily="49" charset="0"/>
-                <a:cs typeface="Courier New" panose="02070309020205020404" pitchFamily="49" charset="0"/>
-              </a:rPr>
-              <a:t>        exact </a:t>
-            </a:r>
-            <a:r>
-              <a:rPr lang="en-US" sz="2600" dirty="0" err="1">
-                <a:latin typeface="Courier New" panose="02070309020205020404" pitchFamily="49" charset="0"/>
-                <a:cs typeface="Courier New" panose="02070309020205020404" pitchFamily="49" charset="0"/>
-              </a:rPr>
-              <a:t>false.elim</a:t>
-            </a:r>
-            <a:r>
-              <a:rPr lang="en-US" sz="2600" dirty="0">
-                <a:latin typeface="Courier New" panose="02070309020205020404" pitchFamily="49" charset="0"/>
-                <a:cs typeface="Courier New" panose="02070309020205020404" pitchFamily="49" charset="0"/>
-              </a:rPr>
-              <a:t> </a:t>
-            </a:r>
-            <a:r>
-              <a:rPr lang="en-US" sz="2600" dirty="0" err="1">
-                <a:latin typeface="Courier New" panose="02070309020205020404" pitchFamily="49" charset="0"/>
-                <a:cs typeface="Courier New" panose="02070309020205020404" pitchFamily="49" charset="0"/>
-              </a:rPr>
-              <a:t>pfFalse</a:t>
-            </a:r>
-            <a:r>
-              <a:rPr lang="en-US" sz="2600" dirty="0">
-                <a:latin typeface="Courier New" panose="02070309020205020404" pitchFamily="49" charset="0"/>
-                <a:cs typeface="Courier New" panose="02070309020205020404" pitchFamily="49" charset="0"/>
-              </a:rPr>
-              <a:t>, -- case with proof of false</a:t>
-            </a:r>
-          </a:p>
-          <a:p>
-            <a:pPr marL="0" indent="0">
-              <a:buNone/>
-            </a:pPr>
-            <a:r>
-              <a:rPr lang="en-US" sz="2600" dirty="0">
-                <a:latin typeface="Courier New" panose="02070309020205020404" pitchFamily="49" charset="0"/>
-                <a:cs typeface="Courier New" panose="02070309020205020404" pitchFamily="49" charset="0"/>
-              </a:rPr>
-              <a:t>      apply </a:t>
-            </a:r>
-            <a:r>
-              <a:rPr lang="en-US" sz="2600" dirty="0" err="1">
-                <a:latin typeface="Courier New" panose="02070309020205020404" pitchFamily="49" charset="0"/>
-                <a:cs typeface="Courier New" panose="02070309020205020404" pitchFamily="49" charset="0"/>
-              </a:rPr>
-              <a:t>or.intro_left</a:t>
-            </a:r>
-            <a:endParaRPr lang="en-US" sz="2600" dirty="0">
-              <a:latin typeface="Courier New" panose="02070309020205020404" pitchFamily="49" charset="0"/>
-              <a:cs typeface="Courier New" panose="02070309020205020404" pitchFamily="49" charset="0"/>
-            </a:endParaRPr>
-          </a:p>
-          <a:p>
-            <a:pPr marL="0" indent="0">
-              <a:buNone/>
-            </a:pPr>
-            <a:r>
-              <a:rPr lang="en-US" sz="2600" dirty="0">
-                <a:latin typeface="Courier New" panose="02070309020205020404" pitchFamily="49" charset="0"/>
-                <a:cs typeface="Courier New" panose="02070309020205020404" pitchFamily="49" charset="0"/>
-              </a:rPr>
-              <a:t>    end</a:t>
+              <a:t>end</a:t>
             </a:r>
           </a:p>
           <a:p>
@@ -3904,7 +3836,7 @@
           <p:cNvPr id="4" name="Slide Number Placeholder 3">
             <a:extLst>
               <a:ext uri="{FF2B5EF4-FFF2-40B4-BE49-F238E27FC236}">
-                <a16:creationId xmlns:a16="http://schemas.microsoft.com/office/drawing/2014/main" id="{913376F0-2CBD-EC46-B547-AD4BEA7F454B}"/>
+                <a16:creationId xmlns:a16="http://schemas.microsoft.com/office/drawing/2014/main" id="{2C51E704-2BDA-FA4F-BCD0-8872EB2A8DA4}"/>
               </a:ext>
             </a:extLst>
           </p:cNvPr>
@@ -3931,7 +3863,7 @@
     </p:spTree>
     <p:extLst>
       <p:ext uri="{BB962C8B-B14F-4D97-AF65-F5344CB8AC3E}">
-        <p14:creationId xmlns:p14="http://schemas.microsoft.com/office/powerpoint/2010/main" val="4036505198"/>
+        <p14:creationId xmlns:p14="http://schemas.microsoft.com/office/powerpoint/2010/main" val="3861147334"/>
       </p:ext>
     </p:extLst>
   </p:cSld>
@@ -3963,6 +3895,525 @@
           <p:cNvPr id="2" name="Title 1">
             <a:extLst>
               <a:ext uri="{FF2B5EF4-FFF2-40B4-BE49-F238E27FC236}">
+                <a16:creationId xmlns:a16="http://schemas.microsoft.com/office/drawing/2014/main" id="{54A03735-720F-5F44-B80D-7B7CDDA1012C}"/>
+              </a:ext>
+            </a:extLst>
+          </p:cNvPr>
+          <p:cNvSpPr>
+            <a:spLocks noGrp="1"/>
+          </p:cNvSpPr>
+          <p:nvPr>
+            <p:ph type="title"/>
+          </p:nvPr>
+        </p:nvSpPr>
+        <p:spPr/>
+        <p:txBody>
+          <a:bodyPr/>
+          <a:lstStyle/>
+          <a:p>
+            <a:r>
+              <a:rPr lang="en-US" dirty="0"/>
+              <a:t>Disjunction Identity</a:t>
+            </a:r>
+          </a:p>
+        </p:txBody>
+      </p:sp>
+      <p:sp>
+        <p:nvSpPr>
+          <p:cNvPr id="3" name="Content Placeholder 2">
+            <a:extLst>
+              <a:ext uri="{FF2B5EF4-FFF2-40B4-BE49-F238E27FC236}">
+                <a16:creationId xmlns:a16="http://schemas.microsoft.com/office/drawing/2014/main" id="{81E4415C-DA17-7D4F-9C25-102BB0CAF6A9}"/>
+              </a:ext>
+            </a:extLst>
+          </p:cNvPr>
+          <p:cNvSpPr>
+            <a:spLocks noGrp="1"/>
+          </p:cNvSpPr>
+          <p:nvPr>
+            <p:ph idx="1"/>
+          </p:nvPr>
+        </p:nvSpPr>
+        <p:spPr/>
+        <p:txBody>
+          <a:bodyPr/>
+          <a:lstStyle/>
+          <a:p>
+            <a:r>
+              <a:rPr lang="en-US" dirty="0"/>
+              <a:t>In multiplication, 1 is the identity element, because x times 1 is x for any value of x</a:t>
+            </a:r>
+          </a:p>
+          <a:p>
+            <a:r>
+              <a:rPr lang="en-US" dirty="0"/>
+              <a:t>In addition, 0 is the identity element, because x plus 0 is x for any value of x</a:t>
+            </a:r>
+          </a:p>
+          <a:p>
+            <a:r>
+              <a:rPr lang="en-US" dirty="0"/>
+              <a:t>What is the identity element for disjunction?</a:t>
+            </a:r>
+          </a:p>
+        </p:txBody>
+      </p:sp>
+      <p:sp>
+        <p:nvSpPr>
+          <p:cNvPr id="4" name="Slide Number Placeholder 3">
+            <a:extLst>
+              <a:ext uri="{FF2B5EF4-FFF2-40B4-BE49-F238E27FC236}">
+                <a16:creationId xmlns:a16="http://schemas.microsoft.com/office/drawing/2014/main" id="{A30249B4-7088-4145-87FB-7B0B85EE1BE1}"/>
+              </a:ext>
+            </a:extLst>
+          </p:cNvPr>
+          <p:cNvSpPr>
+            <a:spLocks noGrp="1"/>
+          </p:cNvSpPr>
+          <p:nvPr>
+            <p:ph type="sldNum" sz="quarter" idx="12"/>
+          </p:nvPr>
+        </p:nvSpPr>
+        <p:spPr/>
+        <p:txBody>
+          <a:bodyPr/>
+          <a:lstStyle/>
+          <a:p>
+            <a:fld id="{3352CBF5-17B8-4387-88A6-ABF9F8C64D5A}" type="slidenum">
+              <a:rPr lang="en-US" smtClean="0"/>
+              <a:t>11</a:t>
+            </a:fld>
+            <a:endParaRPr lang="en-US"/>
+          </a:p>
+        </p:txBody>
+      </p:sp>
+    </p:spTree>
+    <p:extLst>
+      <p:ext uri="{BB962C8B-B14F-4D97-AF65-F5344CB8AC3E}">
+        <p14:creationId xmlns:p14="http://schemas.microsoft.com/office/powerpoint/2010/main" val="784796663"/>
+      </p:ext>
+    </p:extLst>
+  </p:cSld>
+  <p:clrMapOvr>
+    <a:masterClrMapping/>
+  </p:clrMapOvr>
+</p:sld>
+</file>
+
+<file path=ppt/slides/slide12.xml><?xml version="1.0" encoding="utf-8"?>
+<p:sld xmlns:a="http://schemas.openxmlformats.org/drawingml/2006/main" xmlns:r="http://schemas.openxmlformats.org/officeDocument/2006/relationships" xmlns:p="http://schemas.openxmlformats.org/presentationml/2006/main">
+  <p:cSld>
+    <p:spTree>
+      <p:nvGrpSpPr>
+        <p:cNvPr id="1" name=""/>
+        <p:cNvGrpSpPr/>
+        <p:nvPr/>
+      </p:nvGrpSpPr>
+      <p:grpSpPr>
+        <a:xfrm>
+          <a:off x="0" y="0"/>
+          <a:ext cx="0" cy="0"/>
+          <a:chOff x="0" y="0"/>
+          <a:chExt cx="0" cy="0"/>
+        </a:xfrm>
+      </p:grpSpPr>
+      <p:sp>
+        <p:nvSpPr>
+          <p:cNvPr id="2" name="Title 1">
+            <a:extLst>
+              <a:ext uri="{FF2B5EF4-FFF2-40B4-BE49-F238E27FC236}">
+                <a16:creationId xmlns:a16="http://schemas.microsoft.com/office/drawing/2014/main" id="{CE608805-A7CF-AF46-AEE0-BE2F138D4B12}"/>
+              </a:ext>
+            </a:extLst>
+          </p:cNvPr>
+          <p:cNvSpPr>
+            <a:spLocks noGrp="1"/>
+          </p:cNvSpPr>
+          <p:nvPr>
+            <p:ph type="title"/>
+          </p:nvPr>
+        </p:nvSpPr>
+        <p:spPr/>
+        <p:txBody>
+          <a:bodyPr/>
+          <a:lstStyle/>
+          <a:p>
+            <a:r>
+              <a:rPr lang="en-US" dirty="0"/>
+              <a:t>Right Identity</a:t>
+            </a:r>
+          </a:p>
+        </p:txBody>
+      </p:sp>
+      <p:sp>
+        <p:nvSpPr>
+          <p:cNvPr id="3" name="Content Placeholder 2">
+            <a:extLst>
+              <a:ext uri="{FF2B5EF4-FFF2-40B4-BE49-F238E27FC236}">
+                <a16:creationId xmlns:a16="http://schemas.microsoft.com/office/drawing/2014/main" id="{9062BEEF-6150-4E44-BEE0-E4C761ABA6A3}"/>
+              </a:ext>
+            </a:extLst>
+          </p:cNvPr>
+          <p:cNvSpPr>
+            <a:spLocks noGrp="1"/>
+          </p:cNvSpPr>
+          <p:nvPr>
+            <p:ph idx="1"/>
+          </p:nvPr>
+        </p:nvSpPr>
+        <p:spPr/>
+        <p:txBody>
+          <a:bodyPr>
+            <a:normAutofit fontScale="85000" lnSpcReduction="20000"/>
+          </a:bodyPr>
+          <a:lstStyle/>
+          <a:p>
+            <a:r>
+              <a:rPr lang="en-US" dirty="0"/>
+              <a:t>Here’s a proof that false is a right identity for disjunction:</a:t>
+            </a:r>
+          </a:p>
+          <a:p>
+            <a:pPr marL="0" indent="0">
+              <a:buNone/>
+            </a:pPr>
+            <a:r>
+              <a:rPr lang="en-US" sz="2600" dirty="0">
+                <a:latin typeface="Courier New" panose="02070309020205020404" pitchFamily="49" charset="0"/>
+                <a:cs typeface="Courier New" panose="02070309020205020404" pitchFamily="49" charset="0"/>
+              </a:rPr>
+              <a:t>theorem </a:t>
+            </a:r>
+            <a:r>
+              <a:rPr lang="en-US" sz="2600" dirty="0" err="1">
+                <a:latin typeface="Courier New" panose="02070309020205020404" pitchFamily="49" charset="0"/>
+                <a:cs typeface="Courier New" panose="02070309020205020404" pitchFamily="49" charset="0"/>
+              </a:rPr>
+              <a:t>id_right_or</a:t>
+            </a:r>
+            <a:r>
+              <a:rPr lang="en-US" sz="2600" dirty="0">
+                <a:latin typeface="Courier New" panose="02070309020205020404" pitchFamily="49" charset="0"/>
+                <a:cs typeface="Courier New" panose="02070309020205020404" pitchFamily="49" charset="0"/>
+              </a:rPr>
+              <a:t> : </a:t>
+            </a:r>
+          </a:p>
+          <a:p>
+            <a:pPr marL="0" indent="0">
+              <a:buNone/>
+            </a:pPr>
+            <a:r>
+              <a:rPr lang="en-US" sz="2600" dirty="0">
+                <a:latin typeface="Courier New" panose="02070309020205020404" pitchFamily="49" charset="0"/>
+                <a:cs typeface="Courier New" panose="02070309020205020404" pitchFamily="49" charset="0"/>
+              </a:rPr>
+              <a:t>  ∀ P : Prop, P ∨ false ↔ P :=</a:t>
+            </a:r>
+          </a:p>
+          <a:p>
+            <a:pPr marL="0" indent="0">
+              <a:buNone/>
+            </a:pPr>
+            <a:r>
+              <a:rPr lang="en-US" sz="2600" dirty="0">
+                <a:latin typeface="Courier New" panose="02070309020205020404" pitchFamily="49" charset="0"/>
+                <a:cs typeface="Courier New" panose="02070309020205020404" pitchFamily="49" charset="0"/>
+              </a:rPr>
+              <a:t>    </a:t>
+            </a:r>
+            <a:r>
+              <a:rPr lang="el-GR" sz="2600" dirty="0">
+                <a:latin typeface="Courier New" panose="02070309020205020404" pitchFamily="49" charset="0"/>
+                <a:cs typeface="Courier New" panose="02070309020205020404" pitchFamily="49" charset="0"/>
+              </a:rPr>
+              <a:t>λ </a:t>
+            </a:r>
+            <a:r>
+              <a:rPr lang="en-US" sz="2600" dirty="0">
+                <a:latin typeface="Courier New" panose="02070309020205020404" pitchFamily="49" charset="0"/>
+                <a:cs typeface="Courier New" panose="02070309020205020404" pitchFamily="49" charset="0"/>
+              </a:rPr>
+              <a:t>P,</a:t>
+            </a:r>
+          </a:p>
+          <a:p>
+            <a:pPr marL="0" indent="0">
+              <a:buNone/>
+            </a:pPr>
+            <a:r>
+              <a:rPr lang="en-US" sz="2600" dirty="0">
+                <a:latin typeface="Courier New" panose="02070309020205020404" pitchFamily="49" charset="0"/>
+                <a:cs typeface="Courier New" panose="02070309020205020404" pitchFamily="49" charset="0"/>
+              </a:rPr>
+              <a:t>    begin</a:t>
+            </a:r>
+          </a:p>
+          <a:p>
+            <a:pPr marL="0" indent="0">
+              <a:buNone/>
+            </a:pPr>
+            <a:r>
+              <a:rPr lang="en-US" sz="2600" dirty="0">
+                <a:latin typeface="Courier New" panose="02070309020205020404" pitchFamily="49" charset="0"/>
+                <a:cs typeface="Courier New" panose="02070309020205020404" pitchFamily="49" charset="0"/>
+              </a:rPr>
+              <a:t>      apply </a:t>
+            </a:r>
+            <a:r>
+              <a:rPr lang="en-US" sz="2600" dirty="0" err="1">
+                <a:latin typeface="Courier New" panose="02070309020205020404" pitchFamily="49" charset="0"/>
+                <a:cs typeface="Courier New" panose="02070309020205020404" pitchFamily="49" charset="0"/>
+              </a:rPr>
+              <a:t>iff.intro</a:t>
+            </a:r>
+            <a:r>
+              <a:rPr lang="en-US" sz="2600" dirty="0">
+                <a:latin typeface="Courier New" panose="02070309020205020404" pitchFamily="49" charset="0"/>
+                <a:cs typeface="Courier New" panose="02070309020205020404" pitchFamily="49" charset="0"/>
+              </a:rPr>
+              <a:t>,</a:t>
+            </a:r>
+          </a:p>
+          <a:p>
+            <a:pPr marL="0" indent="0">
+              <a:buNone/>
+            </a:pPr>
+            <a:r>
+              <a:rPr lang="en-US" sz="2600" dirty="0">
+                <a:latin typeface="Courier New" panose="02070309020205020404" pitchFamily="49" charset="0"/>
+                <a:cs typeface="Courier New" panose="02070309020205020404" pitchFamily="49" charset="0"/>
+              </a:rPr>
+              <a:t>      assume </a:t>
+            </a:r>
+            <a:r>
+              <a:rPr lang="en-US" sz="2600" dirty="0" err="1">
+                <a:latin typeface="Courier New" panose="02070309020205020404" pitchFamily="49" charset="0"/>
+                <a:cs typeface="Courier New" panose="02070309020205020404" pitchFamily="49" charset="0"/>
+              </a:rPr>
+              <a:t>pfPorfalse</a:t>
+            </a:r>
+            <a:r>
+              <a:rPr lang="en-US" sz="2600" dirty="0">
+                <a:latin typeface="Courier New" panose="02070309020205020404" pitchFamily="49" charset="0"/>
+                <a:cs typeface="Courier New" panose="02070309020205020404" pitchFamily="49" charset="0"/>
+              </a:rPr>
+              <a:t>,</a:t>
+            </a:r>
+          </a:p>
+          <a:p>
+            <a:pPr marL="0" indent="0">
+              <a:buNone/>
+            </a:pPr>
+            <a:r>
+              <a:rPr lang="en-US" sz="2600" dirty="0">
+                <a:latin typeface="Courier New" panose="02070309020205020404" pitchFamily="49" charset="0"/>
+                <a:cs typeface="Courier New" panose="02070309020205020404" pitchFamily="49" charset="0"/>
+              </a:rPr>
+              <a:t>      cases </a:t>
+            </a:r>
+            <a:r>
+              <a:rPr lang="en-US" sz="2600" dirty="0" err="1">
+                <a:latin typeface="Courier New" panose="02070309020205020404" pitchFamily="49" charset="0"/>
+                <a:cs typeface="Courier New" panose="02070309020205020404" pitchFamily="49" charset="0"/>
+              </a:rPr>
+              <a:t>pfPorfalse</a:t>
+            </a:r>
+            <a:r>
+              <a:rPr lang="en-US" sz="2600" dirty="0">
+                <a:latin typeface="Courier New" panose="02070309020205020404" pitchFamily="49" charset="0"/>
+                <a:cs typeface="Courier New" panose="02070309020205020404" pitchFamily="49" charset="0"/>
+              </a:rPr>
+              <a:t> with </a:t>
+            </a:r>
+            <a:r>
+              <a:rPr lang="en-US" sz="2600" dirty="0" err="1">
+                <a:latin typeface="Courier New" panose="02070309020205020404" pitchFamily="49" charset="0"/>
+                <a:cs typeface="Courier New" panose="02070309020205020404" pitchFamily="49" charset="0"/>
+              </a:rPr>
+              <a:t>pfP</a:t>
+            </a:r>
+            <a:r>
+              <a:rPr lang="en-US" sz="2600" dirty="0">
+                <a:latin typeface="Courier New" panose="02070309020205020404" pitchFamily="49" charset="0"/>
+                <a:cs typeface="Courier New" panose="02070309020205020404" pitchFamily="49" charset="0"/>
+              </a:rPr>
+              <a:t> </a:t>
+            </a:r>
+            <a:r>
+              <a:rPr lang="en-US" sz="2600" dirty="0" err="1">
+                <a:latin typeface="Courier New" panose="02070309020205020404" pitchFamily="49" charset="0"/>
+                <a:cs typeface="Courier New" panose="02070309020205020404" pitchFamily="49" charset="0"/>
+              </a:rPr>
+              <a:t>pfFalse</a:t>
+            </a:r>
+            <a:r>
+              <a:rPr lang="en-US" sz="2600" dirty="0">
+                <a:latin typeface="Courier New" panose="02070309020205020404" pitchFamily="49" charset="0"/>
+                <a:cs typeface="Courier New" panose="02070309020205020404" pitchFamily="49" charset="0"/>
+              </a:rPr>
+              <a:t>,</a:t>
+            </a:r>
+          </a:p>
+          <a:p>
+            <a:pPr marL="0" indent="0">
+              <a:buNone/>
+            </a:pPr>
+            <a:r>
+              <a:rPr lang="en-US" sz="2600" dirty="0">
+                <a:latin typeface="Courier New" panose="02070309020205020404" pitchFamily="49" charset="0"/>
+                <a:cs typeface="Courier New" panose="02070309020205020404" pitchFamily="49" charset="0"/>
+              </a:rPr>
+              <a:t>        assumption, -- case where we have a proof of P</a:t>
+            </a:r>
+          </a:p>
+          <a:p>
+            <a:pPr marL="0" indent="0">
+              <a:buNone/>
+            </a:pPr>
+            <a:r>
+              <a:rPr lang="en-US" sz="2600" dirty="0">
+                <a:latin typeface="Courier New" panose="02070309020205020404" pitchFamily="49" charset="0"/>
+                <a:cs typeface="Courier New" panose="02070309020205020404" pitchFamily="49" charset="0"/>
+              </a:rPr>
+              <a:t>        exact </a:t>
+            </a:r>
+            <a:r>
+              <a:rPr lang="en-US" sz="2600" dirty="0" err="1">
+                <a:latin typeface="Courier New" panose="02070309020205020404" pitchFamily="49" charset="0"/>
+                <a:cs typeface="Courier New" panose="02070309020205020404" pitchFamily="49" charset="0"/>
+              </a:rPr>
+              <a:t>false.elim</a:t>
+            </a:r>
+            <a:r>
+              <a:rPr lang="en-US" sz="2600" dirty="0">
+                <a:latin typeface="Courier New" panose="02070309020205020404" pitchFamily="49" charset="0"/>
+                <a:cs typeface="Courier New" panose="02070309020205020404" pitchFamily="49" charset="0"/>
+              </a:rPr>
+              <a:t> </a:t>
+            </a:r>
+            <a:r>
+              <a:rPr lang="en-US" sz="2600" dirty="0" err="1">
+                <a:latin typeface="Courier New" panose="02070309020205020404" pitchFamily="49" charset="0"/>
+                <a:cs typeface="Courier New" panose="02070309020205020404" pitchFamily="49" charset="0"/>
+              </a:rPr>
+              <a:t>pfFalse</a:t>
+            </a:r>
+            <a:r>
+              <a:rPr lang="en-US" sz="2600" dirty="0">
+                <a:latin typeface="Courier New" panose="02070309020205020404" pitchFamily="49" charset="0"/>
+                <a:cs typeface="Courier New" panose="02070309020205020404" pitchFamily="49" charset="0"/>
+              </a:rPr>
+              <a:t>, -- case with proof of false</a:t>
+            </a:r>
+          </a:p>
+          <a:p>
+            <a:pPr marL="0" indent="0">
+              <a:buNone/>
+            </a:pPr>
+            <a:r>
+              <a:rPr lang="en-US" sz="2600" dirty="0">
+                <a:latin typeface="Courier New" panose="02070309020205020404" pitchFamily="49" charset="0"/>
+                <a:cs typeface="Courier New" panose="02070309020205020404" pitchFamily="49" charset="0"/>
+              </a:rPr>
+              <a:t>      apply </a:t>
+            </a:r>
+            <a:r>
+              <a:rPr lang="en-US" sz="2600" dirty="0" err="1">
+                <a:latin typeface="Courier New" panose="02070309020205020404" pitchFamily="49" charset="0"/>
+                <a:cs typeface="Courier New" panose="02070309020205020404" pitchFamily="49" charset="0"/>
+              </a:rPr>
+              <a:t>or.intro_left</a:t>
+            </a:r>
+            <a:endParaRPr lang="en-US" sz="2600" dirty="0">
+              <a:latin typeface="Courier New" panose="02070309020205020404" pitchFamily="49" charset="0"/>
+              <a:cs typeface="Courier New" panose="02070309020205020404" pitchFamily="49" charset="0"/>
+            </a:endParaRPr>
+          </a:p>
+          <a:p>
+            <a:pPr marL="0" indent="0">
+              <a:buNone/>
+            </a:pPr>
+            <a:r>
+              <a:rPr lang="en-US" sz="2600" dirty="0">
+                <a:latin typeface="Courier New" panose="02070309020205020404" pitchFamily="49" charset="0"/>
+                <a:cs typeface="Courier New" panose="02070309020205020404" pitchFamily="49" charset="0"/>
+              </a:rPr>
+              <a:t>    end</a:t>
+            </a:r>
+          </a:p>
+          <a:p>
+            <a:pPr marL="0" indent="0">
+              <a:buNone/>
+            </a:pPr>
+            <a:endParaRPr lang="en-US" dirty="0"/>
+          </a:p>
+        </p:txBody>
+      </p:sp>
+      <p:sp>
+        <p:nvSpPr>
+          <p:cNvPr id="4" name="Slide Number Placeholder 3">
+            <a:extLst>
+              <a:ext uri="{FF2B5EF4-FFF2-40B4-BE49-F238E27FC236}">
+                <a16:creationId xmlns:a16="http://schemas.microsoft.com/office/drawing/2014/main" id="{913376F0-2CBD-EC46-B547-AD4BEA7F454B}"/>
+              </a:ext>
+            </a:extLst>
+          </p:cNvPr>
+          <p:cNvSpPr>
+            <a:spLocks noGrp="1"/>
+          </p:cNvSpPr>
+          <p:nvPr>
+            <p:ph type="sldNum" sz="quarter" idx="12"/>
+          </p:nvPr>
+        </p:nvSpPr>
+        <p:spPr/>
+        <p:txBody>
+          <a:bodyPr/>
+          <a:lstStyle/>
+          <a:p>
+            <a:fld id="{3352CBF5-17B8-4387-88A6-ABF9F8C64D5A}" type="slidenum">
+              <a:rPr lang="en-US" smtClean="0"/>
+              <a:t>12</a:t>
+            </a:fld>
+            <a:endParaRPr lang="en-US"/>
+          </a:p>
+        </p:txBody>
+      </p:sp>
+    </p:spTree>
+    <p:extLst>
+      <p:ext uri="{BB962C8B-B14F-4D97-AF65-F5344CB8AC3E}">
+        <p14:creationId xmlns:p14="http://schemas.microsoft.com/office/powerpoint/2010/main" val="4036505198"/>
+      </p:ext>
+    </p:extLst>
+  </p:cSld>
+  <p:clrMapOvr>
+    <a:masterClrMapping/>
+  </p:clrMapOvr>
+</p:sld>
+</file>
+
+<file path=ppt/slides/slide13.xml><?xml version="1.0" encoding="utf-8"?>
+<p:sld xmlns:a="http://schemas.openxmlformats.org/drawingml/2006/main" xmlns:r="http://schemas.openxmlformats.org/officeDocument/2006/relationships" xmlns:p="http://schemas.openxmlformats.org/presentationml/2006/main">
+  <p:cSld>
+    <p:spTree>
+      <p:nvGrpSpPr>
+        <p:cNvPr id="1" name=""/>
+        <p:cNvGrpSpPr/>
+        <p:nvPr/>
+      </p:nvGrpSpPr>
+      <p:grpSpPr>
+        <a:xfrm>
+          <a:off x="0" y="0"/>
+          <a:ext cx="0" cy="0"/>
+          <a:chOff x="0" y="0"/>
+          <a:chExt cx="0" cy="0"/>
+        </a:xfrm>
+      </p:grpSpPr>
+      <p:sp>
+        <p:nvSpPr>
+          <p:cNvPr id="2" name="Title 1">
+            <a:extLst>
+              <a:ext uri="{FF2B5EF4-FFF2-40B4-BE49-F238E27FC236}">
                 <a16:creationId xmlns:a16="http://schemas.microsoft.com/office/drawing/2014/main" id="{490E2B65-CFE4-154D-89C2-18A0694DD2EA}"/>
               </a:ext>
             </a:extLst>
@@ -4037,7 +4488,7 @@
           <a:p>
             <a:fld id="{3352CBF5-17B8-4387-88A6-ABF9F8C64D5A}" type="slidenum">
               <a:rPr lang="en-US" smtClean="0"/>
-              <a:t>11</a:t>
+              <a:t>13</a:t>
             </a:fld>
             <a:endParaRPr lang="en-US"/>
           </a:p>
@@ -4056,7 +4507,270 @@
 </p:sld>
 </file>
 
-<file path=ppt/slides/slide12.xml><?xml version="1.0" encoding="utf-8"?>
+<file path=ppt/slides/slide14.xml><?xml version="1.0" encoding="utf-8"?>
+<p:sld xmlns:a="http://schemas.openxmlformats.org/drawingml/2006/main" xmlns:r="http://schemas.openxmlformats.org/officeDocument/2006/relationships" xmlns:p="http://schemas.openxmlformats.org/presentationml/2006/main">
+  <p:cSld>
+    <p:spTree>
+      <p:nvGrpSpPr>
+        <p:cNvPr id="1" name=""/>
+        <p:cNvGrpSpPr/>
+        <p:nvPr/>
+      </p:nvGrpSpPr>
+      <p:grpSpPr>
+        <a:xfrm>
+          <a:off x="0" y="0"/>
+          <a:ext cx="0" cy="0"/>
+          <a:chOff x="0" y="0"/>
+          <a:chExt cx="0" cy="0"/>
+        </a:xfrm>
+      </p:grpSpPr>
+      <p:sp>
+        <p:nvSpPr>
+          <p:cNvPr id="2" name="Title 1">
+            <a:extLst>
+              <a:ext uri="{FF2B5EF4-FFF2-40B4-BE49-F238E27FC236}">
+                <a16:creationId xmlns:a16="http://schemas.microsoft.com/office/drawing/2014/main" id="{031A7A7C-C28B-3C45-AD49-8DDF9EA8FE7D}"/>
+              </a:ext>
+            </a:extLst>
+          </p:cNvPr>
+          <p:cNvSpPr>
+            <a:spLocks noGrp="1"/>
+          </p:cNvSpPr>
+          <p:nvPr>
+            <p:ph type="title"/>
+          </p:nvPr>
+        </p:nvSpPr>
+        <p:spPr/>
+        <p:txBody>
+          <a:bodyPr/>
+          <a:lstStyle/>
+          <a:p>
+            <a:r>
+              <a:rPr lang="en-US" dirty="0"/>
+              <a:t>Disjunction Syllogism</a:t>
+            </a:r>
+          </a:p>
+        </p:txBody>
+      </p:sp>
+      <p:sp>
+        <p:nvSpPr>
+          <p:cNvPr id="3" name="Content Placeholder 2">
+            <a:extLst>
+              <a:ext uri="{FF2B5EF4-FFF2-40B4-BE49-F238E27FC236}">
+                <a16:creationId xmlns:a16="http://schemas.microsoft.com/office/drawing/2014/main" id="{751F2402-35EC-DE4B-BA60-6674B1A290F8}"/>
+              </a:ext>
+            </a:extLst>
+          </p:cNvPr>
+          <p:cNvSpPr>
+            <a:spLocks noGrp="1"/>
+          </p:cNvSpPr>
+          <p:nvPr>
+            <p:ph idx="1"/>
+          </p:nvPr>
+        </p:nvSpPr>
+        <p:spPr/>
+        <p:txBody>
+          <a:bodyPr>
+            <a:normAutofit/>
+          </a:bodyPr>
+          <a:lstStyle/>
+          <a:p>
+            <a:pPr marL="0" indent="0">
+              <a:buNone/>
+            </a:pPr>
+            <a:r>
+              <a:rPr lang="en-US" sz="2400" dirty="0">
+                <a:latin typeface="Courier New" panose="02070309020205020404" pitchFamily="49" charset="0"/>
+                <a:cs typeface="Courier New" panose="02070309020205020404" pitchFamily="49" charset="0"/>
+              </a:rPr>
+              <a:t>theorem </a:t>
+            </a:r>
+            <a:r>
+              <a:rPr lang="en-US" sz="2400" dirty="0" err="1">
+                <a:latin typeface="Courier New" panose="02070309020205020404" pitchFamily="49" charset="0"/>
+                <a:cs typeface="Courier New" panose="02070309020205020404" pitchFamily="49" charset="0"/>
+              </a:rPr>
+              <a:t>disjunctiveSyllogism</a:t>
+            </a:r>
+            <a:r>
+              <a:rPr lang="en-US" sz="2400" dirty="0">
+                <a:latin typeface="Courier New" panose="02070309020205020404" pitchFamily="49" charset="0"/>
+                <a:cs typeface="Courier New" panose="02070309020205020404" pitchFamily="49" charset="0"/>
+              </a:rPr>
+              <a:t> :</a:t>
+            </a:r>
+          </a:p>
+          <a:p>
+            <a:pPr marL="0" indent="0">
+              <a:buNone/>
+            </a:pPr>
+            <a:r>
+              <a:rPr lang="en-US" sz="2400" dirty="0">
+                <a:latin typeface="Courier New" panose="02070309020205020404" pitchFamily="49" charset="0"/>
+                <a:cs typeface="Courier New" panose="02070309020205020404" pitchFamily="49" charset="0"/>
+              </a:rPr>
+              <a:t>  ∀ P Q : Prop, P ∨ Q → ¬Q → P :=</a:t>
+            </a:r>
+          </a:p>
+          <a:p>
+            <a:pPr marL="0" indent="0">
+              <a:buNone/>
+            </a:pPr>
+            <a:r>
+              <a:rPr lang="en-US" sz="2400" dirty="0">
+                <a:latin typeface="Courier New" panose="02070309020205020404" pitchFamily="49" charset="0"/>
+                <a:cs typeface="Courier New" panose="02070309020205020404" pitchFamily="49" charset="0"/>
+              </a:rPr>
+              <a:t>begin</a:t>
+            </a:r>
+          </a:p>
+          <a:p>
+            <a:pPr marL="0" indent="0">
+              <a:buNone/>
+            </a:pPr>
+            <a:r>
+              <a:rPr lang="en-US" sz="2400" dirty="0">
+                <a:latin typeface="Courier New" panose="02070309020205020404" pitchFamily="49" charset="0"/>
+                <a:cs typeface="Courier New" panose="02070309020205020404" pitchFamily="49" charset="0"/>
+              </a:rPr>
+              <a:t>  intros P Q </a:t>
+            </a:r>
+            <a:r>
+              <a:rPr lang="en-US" sz="2400" dirty="0" err="1">
+                <a:latin typeface="Courier New" panose="02070309020205020404" pitchFamily="49" charset="0"/>
+                <a:cs typeface="Courier New" panose="02070309020205020404" pitchFamily="49" charset="0"/>
+              </a:rPr>
+              <a:t>porq</a:t>
+            </a:r>
+            <a:r>
+              <a:rPr lang="en-US" sz="2400" dirty="0">
+                <a:latin typeface="Courier New" panose="02070309020205020404" pitchFamily="49" charset="0"/>
+                <a:cs typeface="Courier New" panose="02070309020205020404" pitchFamily="49" charset="0"/>
+              </a:rPr>
+              <a:t> nq, -- assumptions</a:t>
+            </a:r>
+          </a:p>
+          <a:p>
+            <a:pPr marL="0" indent="0">
+              <a:buNone/>
+            </a:pPr>
+            <a:r>
+              <a:rPr lang="en-US" sz="2400" dirty="0">
+                <a:latin typeface="Courier New" panose="02070309020205020404" pitchFamily="49" charset="0"/>
+                <a:cs typeface="Courier New" panose="02070309020205020404" pitchFamily="49" charset="0"/>
+              </a:rPr>
+              <a:t>  cases </a:t>
+            </a:r>
+            <a:r>
+              <a:rPr lang="en-US" sz="2400" dirty="0" err="1">
+                <a:latin typeface="Courier New" panose="02070309020205020404" pitchFamily="49" charset="0"/>
+                <a:cs typeface="Courier New" panose="02070309020205020404" pitchFamily="49" charset="0"/>
+              </a:rPr>
+              <a:t>porq</a:t>
+            </a:r>
+            <a:r>
+              <a:rPr lang="en-US" sz="2400" dirty="0">
+                <a:latin typeface="Courier New" panose="02070309020205020404" pitchFamily="49" charset="0"/>
+                <a:cs typeface="Courier New" panose="02070309020205020404" pitchFamily="49" charset="0"/>
+              </a:rPr>
+              <a:t> with p q, -- now by cases</a:t>
+            </a:r>
+          </a:p>
+          <a:p>
+            <a:pPr marL="0" indent="0">
+              <a:buNone/>
+            </a:pPr>
+            <a:r>
+              <a:rPr lang="en-US" sz="2400" dirty="0">
+                <a:latin typeface="Courier New" panose="02070309020205020404" pitchFamily="49" charset="0"/>
+                <a:cs typeface="Courier New" panose="02070309020205020404" pitchFamily="49" charset="0"/>
+              </a:rPr>
+              <a:t>    assumption, -- case where p is true,</a:t>
+            </a:r>
+          </a:p>
+          <a:p>
+            <a:pPr marL="0" indent="0">
+              <a:buNone/>
+            </a:pPr>
+            <a:r>
+              <a:rPr lang="en-US" sz="2400">
+                <a:latin typeface="Courier New" panose="02070309020205020404" pitchFamily="49" charset="0"/>
+                <a:cs typeface="Courier New" panose="02070309020205020404" pitchFamily="49" charset="0"/>
+              </a:rPr>
+              <a:t>    exact </a:t>
+            </a:r>
+            <a:r>
+              <a:rPr lang="en-US" sz="2400" dirty="0" err="1">
+                <a:latin typeface="Courier New" panose="02070309020205020404" pitchFamily="49" charset="0"/>
+                <a:cs typeface="Courier New" panose="02070309020205020404" pitchFamily="49" charset="0"/>
+              </a:rPr>
+              <a:t>false.elim</a:t>
+            </a:r>
+            <a:r>
+              <a:rPr lang="en-US" sz="2400" dirty="0">
+                <a:latin typeface="Courier New" panose="02070309020205020404" pitchFamily="49" charset="0"/>
+                <a:cs typeface="Courier New" panose="02070309020205020404" pitchFamily="49" charset="0"/>
+              </a:rPr>
+              <a:t> (nq q) -- or q true</a:t>
+            </a:r>
+          </a:p>
+          <a:p>
+            <a:pPr marL="0" indent="0">
+              <a:buNone/>
+            </a:pPr>
+            <a:r>
+              <a:rPr lang="en-US" sz="2400" dirty="0">
+                <a:latin typeface="Courier New" panose="02070309020205020404" pitchFamily="49" charset="0"/>
+                <a:cs typeface="Courier New" panose="02070309020205020404" pitchFamily="49" charset="0"/>
+              </a:rPr>
+              <a:t>end</a:t>
+            </a:r>
+          </a:p>
+        </p:txBody>
+      </p:sp>
+      <p:sp>
+        <p:nvSpPr>
+          <p:cNvPr id="4" name="Slide Number Placeholder 3">
+            <a:extLst>
+              <a:ext uri="{FF2B5EF4-FFF2-40B4-BE49-F238E27FC236}">
+                <a16:creationId xmlns:a16="http://schemas.microsoft.com/office/drawing/2014/main" id="{CDD7961E-7BEF-F246-A88F-B84346C5DD2C}"/>
+              </a:ext>
+            </a:extLst>
+          </p:cNvPr>
+          <p:cNvSpPr>
+            <a:spLocks noGrp="1"/>
+          </p:cNvSpPr>
+          <p:nvPr>
+            <p:ph type="sldNum" sz="quarter" idx="12"/>
+          </p:nvPr>
+        </p:nvSpPr>
+        <p:spPr/>
+        <p:txBody>
+          <a:bodyPr/>
+          <a:lstStyle/>
+          <a:p>
+            <a:fld id="{3352CBF5-17B8-4387-88A6-ABF9F8C64D5A}" type="slidenum">
+              <a:rPr lang="en-US" smtClean="0"/>
+              <a:t>14</a:t>
+            </a:fld>
+            <a:endParaRPr lang="en-US"/>
+          </a:p>
+        </p:txBody>
+      </p:sp>
+    </p:spTree>
+    <p:extLst>
+      <p:ext uri="{BB962C8B-B14F-4D97-AF65-F5344CB8AC3E}">
+        <p14:creationId xmlns:p14="http://schemas.microsoft.com/office/powerpoint/2010/main" val="225693791"/>
+      </p:ext>
+    </p:extLst>
+  </p:cSld>
+  <p:clrMapOvr>
+    <a:masterClrMapping/>
+  </p:clrMapOvr>
+</p:sld>
+</file>
+
+<file path=ppt/slides/slide15.xml><?xml version="1.0" encoding="utf-8"?>
 <p:sld xmlns:a="http://schemas.openxmlformats.org/drawingml/2006/main" xmlns:r="http://schemas.openxmlformats.org/officeDocument/2006/relationships" xmlns:p="http://schemas.openxmlformats.org/presentationml/2006/main">
   <p:cSld>
     <p:bg>
@@ -4327,7 +5041,7 @@
           <a:p>
             <a:fld id="{3352CBF5-17B8-4387-88A6-ABF9F8C64D5A}" type="slidenum">
               <a:rPr lang="en-US" smtClean="0"/>
-              <a:t>12</a:t>
+              <a:t>15</a:t>
             </a:fld>
             <a:endParaRPr lang="en-US"/>
           </a:p>
@@ -4898,6 +5612,78 @@
                 <a:latin typeface="Courier New" panose="02070309020205020404" pitchFamily="49" charset="0"/>
                 <a:cs typeface="Courier New" panose="02070309020205020404" pitchFamily="49" charset="0"/>
               </a:rPr>
+              <a:t>theorem </a:t>
+            </a:r>
+            <a:r>
+              <a:rPr lang="en-US" sz="2400" dirty="0" err="1">
+                <a:latin typeface="Courier New" panose="02070309020205020404" pitchFamily="49" charset="0"/>
+                <a:cs typeface="Courier New" panose="02070309020205020404" pitchFamily="49" charset="0"/>
+              </a:rPr>
+              <a:t>goodSide</a:t>
+            </a:r>
+            <a:r>
+              <a:rPr lang="en-US" sz="2400" dirty="0">
+                <a:latin typeface="Courier New" panose="02070309020205020404" pitchFamily="49" charset="0"/>
+                <a:cs typeface="Courier New" panose="02070309020205020404" pitchFamily="49" charset="0"/>
+              </a:rPr>
+              <a:t> : 0 = 0 ∨ 0 = 1 :=</a:t>
+            </a:r>
+          </a:p>
+          <a:p>
+            <a:pPr marL="0" indent="0">
+              <a:buNone/>
+            </a:pPr>
+            <a:r>
+              <a:rPr lang="en-US" sz="2400" dirty="0">
+                <a:latin typeface="Courier New" panose="02070309020205020404" pitchFamily="49" charset="0"/>
+                <a:cs typeface="Courier New" panose="02070309020205020404" pitchFamily="49" charset="0"/>
+              </a:rPr>
+              <a:t>  </a:t>
+            </a:r>
+            <a:r>
+              <a:rPr lang="en-US" sz="2400" dirty="0" err="1">
+                <a:latin typeface="Courier New" panose="02070309020205020404" pitchFamily="49" charset="0"/>
+                <a:cs typeface="Courier New" panose="02070309020205020404" pitchFamily="49" charset="0"/>
+              </a:rPr>
+              <a:t>or.intro_left</a:t>
+            </a:r>
+            <a:r>
+              <a:rPr lang="en-US" sz="2400" dirty="0">
+                <a:latin typeface="Courier New" panose="02070309020205020404" pitchFamily="49" charset="0"/>
+                <a:cs typeface="Courier New" panose="02070309020205020404" pitchFamily="49" charset="0"/>
+              </a:rPr>
+              <a:t> (0=1) (</a:t>
+            </a:r>
+            <a:r>
+              <a:rPr lang="en-US" sz="2400" dirty="0" err="1">
+                <a:latin typeface="Courier New" panose="02070309020205020404" pitchFamily="49" charset="0"/>
+                <a:cs typeface="Courier New" panose="02070309020205020404" pitchFamily="49" charset="0"/>
+              </a:rPr>
+              <a:t>eq.refl</a:t>
+            </a:r>
+            <a:r>
+              <a:rPr lang="en-US" sz="2400" dirty="0">
+                <a:latin typeface="Courier New" panose="02070309020205020404" pitchFamily="49" charset="0"/>
+                <a:cs typeface="Courier New" panose="02070309020205020404" pitchFamily="49" charset="0"/>
+              </a:rPr>
+              <a:t> 0)</a:t>
+            </a:r>
+          </a:p>
+          <a:p>
+            <a:pPr marL="0" indent="0">
+              <a:buNone/>
+            </a:pPr>
+            <a:endParaRPr lang="en-US" dirty="0"/>
+          </a:p>
+          <a:p>
+            <a:pPr marL="0" indent="0">
+              <a:buNone/>
+            </a:pPr>
+            <a:r>
+              <a:rPr lang="en-US" sz="2400" dirty="0">
+                <a:latin typeface="Courier New" panose="02070309020205020404" pitchFamily="49" charset="0"/>
+                <a:cs typeface="Courier New" panose="02070309020205020404" pitchFamily="49" charset="0"/>
+              </a:rPr>
               <a:t>example : P ∨ false := </a:t>
             </a:r>
           </a:p>
@@ -5065,7 +5851,7 @@
           <p:cNvPr id="2" name="Title 1">
             <a:extLst>
               <a:ext uri="{FF2B5EF4-FFF2-40B4-BE49-F238E27FC236}">
-                <a16:creationId xmlns:a16="http://schemas.microsoft.com/office/drawing/2014/main" id="{437741C8-3DE4-FA4E-8D38-EFCBFA9C299D}"/>
+                <a16:creationId xmlns:a16="http://schemas.microsoft.com/office/drawing/2014/main" id="{250F0B11-3970-A845-8064-567B08373569}"/>
               </a:ext>
             </a:extLst>
           </p:cNvPr>
@@ -5083,7 +5869,7 @@
           <a:p>
             <a:r>
               <a:rPr lang="en-US" dirty="0"/>
-              <a:t>Disjunction absorption</a:t>
+              <a:t>Exercise</a:t>
             </a:r>
           </a:p>
         </p:txBody>
@@ -5093,7 +5879,7 @@
           <p:cNvPr id="3" name="Content Placeholder 2">
             <a:extLst>
               <a:ext uri="{FF2B5EF4-FFF2-40B4-BE49-F238E27FC236}">
-                <a16:creationId xmlns:a16="http://schemas.microsoft.com/office/drawing/2014/main" id="{39C53515-787A-E944-BF5B-C25F724F9391}"/>
+                <a16:creationId xmlns:a16="http://schemas.microsoft.com/office/drawing/2014/main" id="{5D8EB04D-2C15-2344-9223-0752EAEF6261}"/>
               </a:ext>
             </a:extLst>
           </p:cNvPr>
@@ -5111,24 +5897,37 @@
           <a:p>
             <a:r>
               <a:rPr lang="en-US" dirty="0"/>
-              <a:t>In multiplication, 0 is the absorption element, because anything times 0 is 0</a:t>
-            </a:r>
-          </a:p>
-          <a:p>
-            <a:r>
-              <a:rPr lang="en-US" dirty="0"/>
-              <a:t>What is the absorption element in disjunction? I.e., what is the element X such that P </a:t>
-            </a:r>
-            <a:r>
-              <a:rPr lang="en-US" dirty="0">
-                <a:latin typeface="Courier New" panose="02070309020205020404" pitchFamily="49" charset="0"/>
-                <a:cs typeface="Courier New" panose="02070309020205020404" pitchFamily="49" charset="0"/>
-              </a:rPr>
-              <a:t>∨</a:t>
-            </a:r>
-            <a:r>
-              <a:rPr lang="en-US" dirty="0"/>
-              <a:t> X = X for all propositions P?</a:t>
+              <a:t>Prove 0 = 1 ∨ 0 = 0</a:t>
+            </a:r>
+          </a:p>
+          <a:p>
+            <a:pPr marL="0" indent="0">
+              <a:buNone/>
+            </a:pPr>
+            <a:endParaRPr lang="en-US" dirty="0"/>
+          </a:p>
+          <a:p>
+            <a:pPr marL="0" indent="0">
+              <a:buNone/>
+            </a:pPr>
+            <a:r>
+              <a:rPr lang="en-US" sz="2400" dirty="0">
+                <a:latin typeface="Courier New" panose="02070309020205020404" pitchFamily="49" charset="0"/>
+                <a:cs typeface="Courier New" panose="02070309020205020404" pitchFamily="49" charset="0"/>
+              </a:rPr>
+              <a:t>example: 0 = 1 ∨ 0 = 0 :=</a:t>
+            </a:r>
+          </a:p>
+          <a:p>
+            <a:pPr marL="0" indent="0">
+              <a:buNone/>
+            </a:pPr>
+            <a:r>
+              <a:rPr lang="en-US" sz="2400" dirty="0">
+                <a:latin typeface="Courier New" panose="02070309020205020404" pitchFamily="49" charset="0"/>
+                <a:cs typeface="Courier New" panose="02070309020205020404" pitchFamily="49" charset="0"/>
+              </a:rPr>
+              <a:t>  sorry</a:t>
             </a:r>
           </a:p>
         </p:txBody>
@@ -5138,7 +5937,7 @@
           <p:cNvPr id="4" name="Slide Number Placeholder 3">
             <a:extLst>
               <a:ext uri="{FF2B5EF4-FFF2-40B4-BE49-F238E27FC236}">
-                <a16:creationId xmlns:a16="http://schemas.microsoft.com/office/drawing/2014/main" id="{F499448C-6AEE-BF40-8126-3AEB646CF5CC}"/>
+                <a16:creationId xmlns:a16="http://schemas.microsoft.com/office/drawing/2014/main" id="{ABABD450-489D-7446-8BA2-1C7779F0E84A}"/>
               </a:ext>
             </a:extLst>
           </p:cNvPr>
@@ -5165,7 +5964,7 @@
     </p:spTree>
     <p:extLst>
       <p:ext uri="{BB962C8B-B14F-4D97-AF65-F5344CB8AC3E}">
-        <p14:creationId xmlns:p14="http://schemas.microsoft.com/office/powerpoint/2010/main" val="354563140"/>
+        <p14:creationId xmlns:p14="http://schemas.microsoft.com/office/powerpoint/2010/main" val="3397649038"/>
       </p:ext>
     </p:extLst>
   </p:cSld>
@@ -5197,7 +5996,7 @@
           <p:cNvPr id="2" name="Title 1">
             <a:extLst>
               <a:ext uri="{FF2B5EF4-FFF2-40B4-BE49-F238E27FC236}">
-                <a16:creationId xmlns:a16="http://schemas.microsoft.com/office/drawing/2014/main" id="{F4EE265F-B1AC-DC4D-9D8C-FE4E136E6F47}"/>
+                <a16:creationId xmlns:a16="http://schemas.microsoft.com/office/drawing/2014/main" id="{3F72F0CD-EBA8-BF49-93E2-494740FA66A8}"/>
               </a:ext>
             </a:extLst>
           </p:cNvPr>
@@ -5215,8 +6014,13 @@
           <a:p>
             <a:r>
               <a:rPr lang="en-US" dirty="0"/>
-              <a:t>Disjunction with true</a:t>
-            </a:r>
+              <a:t>An aside on </a:t>
+            </a:r>
+            <a:r>
+              <a:rPr lang="en-US" dirty="0" err="1"/>
+              <a:t>or_intro.left</a:t>
+            </a:r>
+            <a:endParaRPr lang="en-US" dirty="0"/>
           </a:p>
         </p:txBody>
       </p:sp>
@@ -5225,7 +6029,7 @@
           <p:cNvPr id="3" name="Content Placeholder 2">
             <a:extLst>
               <a:ext uri="{FF2B5EF4-FFF2-40B4-BE49-F238E27FC236}">
-                <a16:creationId xmlns:a16="http://schemas.microsoft.com/office/drawing/2014/main" id="{C13B504E-F089-154D-9B13-B9EA8AF15F74}"/>
+                <a16:creationId xmlns:a16="http://schemas.microsoft.com/office/drawing/2014/main" id="{39843261-E378-444A-BD8C-A398FED4EE7B}"/>
               </a:ext>
             </a:extLst>
           </p:cNvPr>
@@ -5243,7 +6047,15 @@
           <a:p>
             <a:r>
               <a:rPr lang="en-US" dirty="0"/>
-              <a:t>Here’s a proof that P or true is always true:</a:t>
+              <a:t>Right click on </a:t>
+            </a:r>
+            <a:r>
+              <a:rPr lang="en-US" dirty="0" err="1"/>
+              <a:t>or_intro.left</a:t>
+            </a:r>
+            <a:r>
+              <a:rPr lang="en-US" dirty="0"/>
+              <a:t> and choose “peek definition”:</a:t>
             </a:r>
           </a:p>
           <a:p>
@@ -5251,25 +6063,25 @@
               <a:buNone/>
             </a:pPr>
             <a:r>
-              <a:rPr lang="en-US" sz="2400" dirty="0">
-                <a:latin typeface="Courier New" panose="02070309020205020404" pitchFamily="49" charset="0"/>
-                <a:cs typeface="Courier New" panose="02070309020205020404" pitchFamily="49" charset="0"/>
-              </a:rPr>
-              <a:t>theorem </a:t>
-            </a:r>
-            <a:r>
-              <a:rPr lang="en-US" sz="2400" dirty="0" err="1">
-                <a:latin typeface="Courier New" panose="02070309020205020404" pitchFamily="49" charset="0"/>
-                <a:cs typeface="Courier New" panose="02070309020205020404" pitchFamily="49" charset="0"/>
-              </a:rPr>
-              <a:t>id_right_or</a:t>
-            </a:r>
-            <a:r>
-              <a:rPr lang="en-US" sz="2400" dirty="0">
-                <a:latin typeface="Courier New" panose="02070309020205020404" pitchFamily="49" charset="0"/>
-                <a:cs typeface="Courier New" panose="02070309020205020404" pitchFamily="49" charset="0"/>
-              </a:rPr>
-              <a:t> : </a:t>
+              <a:rPr lang="en-US" sz="2000" dirty="0">
+                <a:latin typeface="Courier New" panose="02070309020205020404" pitchFamily="49" charset="0"/>
+                <a:cs typeface="Courier New" panose="02070309020205020404" pitchFamily="49" charset="0"/>
+              </a:rPr>
+              <a:t>def </a:t>
+            </a:r>
+            <a:r>
+              <a:rPr lang="en-US" sz="2000" dirty="0" err="1">
+                <a:latin typeface="Courier New" panose="02070309020205020404" pitchFamily="49" charset="0"/>
+                <a:cs typeface="Courier New" panose="02070309020205020404" pitchFamily="49" charset="0"/>
+              </a:rPr>
+              <a:t>or.intro_left</a:t>
+            </a:r>
+            <a:r>
+              <a:rPr lang="en-US" sz="2000" dirty="0">
+                <a:latin typeface="Courier New" panose="02070309020205020404" pitchFamily="49" charset="0"/>
+                <a:cs typeface="Courier New" panose="02070309020205020404" pitchFamily="49" charset="0"/>
+              </a:rPr>
+              <a:t> {a : Prop} (b : Prop) (ha : a) : or a b :=</a:t>
             </a:r>
           </a:p>
           <a:p>
@@ -5277,86 +6089,74 @@
               <a:buNone/>
             </a:pPr>
             <a:r>
-              <a:rPr lang="en-US" sz="2400" dirty="0">
-                <a:latin typeface="Courier New" panose="02070309020205020404" pitchFamily="49" charset="0"/>
-                <a:cs typeface="Courier New" panose="02070309020205020404" pitchFamily="49" charset="0"/>
-              </a:rPr>
-              <a:t>  ∀ P : Prop, P ∨ true :=</a:t>
+              <a:rPr lang="en-US" sz="2000" dirty="0" err="1">
+                <a:latin typeface="Courier New" panose="02070309020205020404" pitchFamily="49" charset="0"/>
+                <a:cs typeface="Courier New" panose="02070309020205020404" pitchFamily="49" charset="0"/>
+              </a:rPr>
+              <a:t>or.inl</a:t>
+            </a:r>
+            <a:r>
+              <a:rPr lang="en-US" sz="2000" dirty="0">
+                <a:latin typeface="Courier New" panose="02070309020205020404" pitchFamily="49" charset="0"/>
+                <a:cs typeface="Courier New" panose="02070309020205020404" pitchFamily="49" charset="0"/>
+              </a:rPr>
+              <a:t> ha</a:t>
             </a:r>
           </a:p>
           <a:p>
             <a:pPr marL="0" indent="0">
               <a:buNone/>
             </a:pPr>
-            <a:r>
-              <a:rPr lang="en-US" sz="2400" dirty="0">
-                <a:latin typeface="Courier New" panose="02070309020205020404" pitchFamily="49" charset="0"/>
-                <a:cs typeface="Courier New" panose="02070309020205020404" pitchFamily="49" charset="0"/>
-              </a:rPr>
-              <a:t>    </a:t>
-            </a:r>
-            <a:r>
-              <a:rPr lang="el-GR" sz="2400" dirty="0">
-                <a:latin typeface="Courier New" panose="02070309020205020404" pitchFamily="49" charset="0"/>
-                <a:cs typeface="Courier New" panose="02070309020205020404" pitchFamily="49" charset="0"/>
-              </a:rPr>
-              <a:t>λ </a:t>
-            </a:r>
-            <a:r>
-              <a:rPr lang="en-US" sz="2400" dirty="0">
-                <a:latin typeface="Courier New" panose="02070309020205020404" pitchFamily="49" charset="0"/>
-                <a:cs typeface="Courier New" panose="02070309020205020404" pitchFamily="49" charset="0"/>
-              </a:rPr>
-              <a:t>P,</a:t>
-            </a:r>
-          </a:p>
-          <a:p>
-            <a:pPr marL="0" indent="0">
-              <a:buNone/>
-            </a:pPr>
-            <a:r>
-              <a:rPr lang="en-US" sz="2400" dirty="0">
-                <a:latin typeface="Courier New" panose="02070309020205020404" pitchFamily="49" charset="0"/>
-                <a:cs typeface="Courier New" panose="02070309020205020404" pitchFamily="49" charset="0"/>
-              </a:rPr>
-              <a:t>      </a:t>
-            </a:r>
-            <a:r>
-              <a:rPr lang="en-US" sz="2400" dirty="0" err="1">
-                <a:latin typeface="Courier New" panose="02070309020205020404" pitchFamily="49" charset="0"/>
-                <a:cs typeface="Courier New" panose="02070309020205020404" pitchFamily="49" charset="0"/>
-              </a:rPr>
-              <a:t>or.intro_right</a:t>
-            </a:r>
-            <a:r>
-              <a:rPr lang="en-US" sz="2400" dirty="0">
-                <a:latin typeface="Courier New" panose="02070309020205020404" pitchFamily="49" charset="0"/>
-                <a:cs typeface="Courier New" panose="02070309020205020404" pitchFamily="49" charset="0"/>
-              </a:rPr>
-              <a:t> P </a:t>
-            </a:r>
-            <a:r>
-              <a:rPr lang="en-US" sz="2400" dirty="0" err="1">
-                <a:latin typeface="Courier New" panose="02070309020205020404" pitchFamily="49" charset="0"/>
-                <a:cs typeface="Courier New" panose="02070309020205020404" pitchFamily="49" charset="0"/>
-              </a:rPr>
-              <a:t>true.intro</a:t>
-            </a:r>
-            <a:endParaRPr lang="en-US" sz="2400" dirty="0">
+            <a:endParaRPr lang="en-US" sz="2000" dirty="0">
               <a:latin typeface="Courier New" panose="02070309020205020404" pitchFamily="49" charset="0"/>
               <a:cs typeface="Courier New" panose="02070309020205020404" pitchFamily="49" charset="0"/>
             </a:endParaRPr>
           </a:p>
           <a:p>
             <a:r>
-              <a:rPr lang="en-US" dirty="0">
-                <a:cs typeface="Courier New" panose="02070309020205020404" pitchFamily="49" charset="0"/>
-              </a:rPr>
-              <a:t>Exercise: Prove that true or Q is always true as well.</a:t>
-            </a:r>
-          </a:p>
-          <a:p>
-            <a:endParaRPr lang="en-US" dirty="0"/>
+              <a:rPr lang="en-US" dirty="0"/>
+              <a:t>Note that</a:t>
+            </a:r>
+          </a:p>
+          <a:p>
+            <a:pPr lvl="1"/>
+            <a:r>
+              <a:rPr lang="en-US" dirty="0" err="1"/>
+              <a:t>or_intro.left</a:t>
+            </a:r>
+            <a:r>
+              <a:rPr lang="en-US" dirty="0"/>
+              <a:t> has 3 arguments, the first of which is implicit, and the second two of which are explicit.</a:t>
+            </a:r>
+          </a:p>
+          <a:p>
+            <a:pPr lvl="1"/>
+            <a:r>
+              <a:rPr lang="en-US" dirty="0"/>
+              <a:t>The first two arguments are propositions and the third is a proof of the first proposition (which is how the first argument is inferred)</a:t>
+            </a:r>
+          </a:p>
+          <a:p>
+            <a:pPr lvl="1"/>
+            <a:r>
+              <a:rPr lang="en-US" dirty="0" err="1"/>
+              <a:t>or_intro.left</a:t>
+            </a:r>
+            <a:r>
+              <a:rPr lang="en-US" dirty="0"/>
+              <a:t> has a return type of “</a:t>
+            </a:r>
+            <a:r>
+              <a:rPr lang="en-US" sz="2000" dirty="0">
+                <a:latin typeface="Courier New" panose="02070309020205020404" pitchFamily="49" charset="0"/>
+                <a:cs typeface="Courier New" panose="02070309020205020404" pitchFamily="49" charset="0"/>
+              </a:rPr>
+              <a:t>or a b</a:t>
+            </a:r>
+            <a:r>
+              <a:rPr lang="en-US" dirty="0"/>
+              <a:t>”</a:t>
+            </a:r>
           </a:p>
         </p:txBody>
       </p:sp>
@@ -5365,7 +6165,7 @@
           <p:cNvPr id="4" name="Slide Number Placeholder 3">
             <a:extLst>
               <a:ext uri="{FF2B5EF4-FFF2-40B4-BE49-F238E27FC236}">
-                <a16:creationId xmlns:a16="http://schemas.microsoft.com/office/drawing/2014/main" id="{4E6EC673-4884-A048-8F9A-2B0EADAE0160}"/>
+                <a16:creationId xmlns:a16="http://schemas.microsoft.com/office/drawing/2014/main" id="{304884BE-1243-184F-83B0-73D712B6EF93}"/>
               </a:ext>
             </a:extLst>
           </p:cNvPr>
@@ -5392,7 +6192,7 @@
     </p:spTree>
     <p:extLst>
       <p:ext uri="{BB962C8B-B14F-4D97-AF65-F5344CB8AC3E}">
-        <p14:creationId xmlns:p14="http://schemas.microsoft.com/office/powerpoint/2010/main" val="1537724452"/>
+        <p14:creationId xmlns:p14="http://schemas.microsoft.com/office/powerpoint/2010/main" val="423081766"/>
       </p:ext>
     </p:extLst>
   </p:cSld>
@@ -5424,7 +6224,7 @@
           <p:cNvPr id="2" name="Title 1">
             <a:extLst>
               <a:ext uri="{FF2B5EF4-FFF2-40B4-BE49-F238E27FC236}">
-                <a16:creationId xmlns:a16="http://schemas.microsoft.com/office/drawing/2014/main" id="{83DDEC75-12A1-784D-AC83-03D678B0D31A}"/>
+                <a16:creationId xmlns:a16="http://schemas.microsoft.com/office/drawing/2014/main" id="{437741C8-3DE4-FA4E-8D38-EFCBFA9C299D}"/>
               </a:ext>
             </a:extLst>
           </p:cNvPr>
@@ -5442,8 +6242,16 @@
           <a:p>
             <a:r>
               <a:rPr lang="en-US" dirty="0"/>
-              <a:t>Elimination rule</a:t>
-            </a:r>
+              <a:t>Disjunction absorption</a:t>
+            </a:r>
+            <a:br>
+              <a:rPr lang="en-US" dirty="0"/>
+            </a:br>
+            <a:r>
+              <a:rPr lang="en-US" sz="3600" dirty="0"/>
+              <a:t>(or the “zero” of disjunction)</a:t>
+            </a:r>
+            <a:endParaRPr lang="en-US" dirty="0"/>
           </a:p>
         </p:txBody>
       </p:sp>
@@ -5452,7 +6260,7 @@
           <p:cNvPr id="3" name="Content Placeholder 2">
             <a:extLst>
               <a:ext uri="{FF2B5EF4-FFF2-40B4-BE49-F238E27FC236}">
-                <a16:creationId xmlns:a16="http://schemas.microsoft.com/office/drawing/2014/main" id="{73097CB7-C02E-CB40-8A26-B331EF9E630A}"/>
+                <a16:creationId xmlns:a16="http://schemas.microsoft.com/office/drawing/2014/main" id="{39C53515-787A-E944-BF5B-C25F724F9391}"/>
               </a:ext>
             </a:extLst>
           </p:cNvPr>
@@ -5465,158 +6273,30 @@
         </p:nvSpPr>
         <p:spPr/>
         <p:txBody>
-          <a:bodyPr>
-            <a:normAutofit fontScale="92500" lnSpcReduction="10000"/>
-          </a:bodyPr>
+          <a:bodyPr/>
           <a:lstStyle/>
           <a:p>
             <a:r>
               <a:rPr lang="en-US" dirty="0"/>
-              <a:t>The elimination rule for disjunction has some nuance:</a:t>
-            </a:r>
-          </a:p>
-          <a:p>
-            <a:pPr lvl="1"/>
+              <a:t>In multiplication, 0 is the absorption element, because anything times 0 is 0</a:t>
+            </a:r>
+          </a:p>
+          <a:p>
             <a:r>
               <a:rPr lang="en-US" dirty="0"/>
-              <a:t>If P ∨ Q, then if both P → R and Q → R, then R</a:t>
-            </a:r>
-          </a:p>
-          <a:p>
-            <a:pPr marL="0" indent="0">
-              <a:buNone/>
-            </a:pPr>
-            <a:r>
-              <a:rPr lang="en-US" sz="2400" dirty="0">
-                <a:latin typeface="Courier New" panose="02070309020205020404" pitchFamily="49" charset="0"/>
-                <a:cs typeface="Courier New" panose="02070309020205020404" pitchFamily="49" charset="0"/>
-              </a:rPr>
-              <a:t>   </a:t>
-            </a:r>
-            <a:r>
-              <a:rPr lang="en-US" sz="2400" dirty="0" err="1">
-                <a:latin typeface="Courier New" panose="02070309020205020404" pitchFamily="49" charset="0"/>
-                <a:cs typeface="Courier New" panose="02070309020205020404" pitchFamily="49" charset="0"/>
-              </a:rPr>
-              <a:t>pfPQ</a:t>
-            </a:r>
-            <a:r>
-              <a:rPr lang="en-US" sz="2400" dirty="0">
-                <a:latin typeface="Courier New" panose="02070309020205020404" pitchFamily="49" charset="0"/>
-                <a:cs typeface="Courier New" panose="02070309020205020404" pitchFamily="49" charset="0"/>
-              </a:rPr>
-              <a:t>: P ∨ Q, </a:t>
-            </a:r>
-            <a:r>
-              <a:rPr lang="en-US" sz="2400" dirty="0" err="1">
-                <a:latin typeface="Courier New" panose="02070309020205020404" pitchFamily="49" charset="0"/>
-                <a:cs typeface="Courier New" panose="02070309020205020404" pitchFamily="49" charset="0"/>
-              </a:rPr>
-              <a:t>pfPR</a:t>
-            </a:r>
-            <a:r>
-              <a:rPr lang="en-US" sz="2400" dirty="0">
-                <a:latin typeface="Courier New" panose="02070309020205020404" pitchFamily="49" charset="0"/>
-                <a:cs typeface="Courier New" panose="02070309020205020404" pitchFamily="49" charset="0"/>
-              </a:rPr>
-              <a:t>: P → R, </a:t>
-            </a:r>
-            <a:r>
-              <a:rPr lang="en-US" sz="2400" dirty="0" err="1">
-                <a:latin typeface="Courier New" panose="02070309020205020404" pitchFamily="49" charset="0"/>
-                <a:cs typeface="Courier New" panose="02070309020205020404" pitchFamily="49" charset="0"/>
-              </a:rPr>
-              <a:t>pfQR</a:t>
-            </a:r>
-            <a:r>
-              <a:rPr lang="en-US" sz="2400" dirty="0">
-                <a:latin typeface="Courier New" panose="02070309020205020404" pitchFamily="49" charset="0"/>
-                <a:cs typeface="Courier New" panose="02070309020205020404" pitchFamily="49" charset="0"/>
-              </a:rPr>
-              <a:t>: Q → R</a:t>
-            </a:r>
-          </a:p>
-          <a:p>
-            <a:pPr marL="0" indent="0">
-              <a:buNone/>
-            </a:pPr>
-            <a:r>
-              <a:rPr lang="en-US" sz="2400" dirty="0">
-                <a:latin typeface="Courier New" panose="02070309020205020404" pitchFamily="49" charset="0"/>
-                <a:cs typeface="Courier New" panose="02070309020205020404" pitchFamily="49" charset="0"/>
-              </a:rPr>
-              <a:t>  -------------------------------------- ∨-</a:t>
-            </a:r>
-            <a:r>
-              <a:rPr lang="en-US" sz="2400" dirty="0" err="1">
-                <a:latin typeface="Courier New" panose="02070309020205020404" pitchFamily="49" charset="0"/>
-                <a:cs typeface="Courier New" panose="02070309020205020404" pitchFamily="49" charset="0"/>
-              </a:rPr>
-              <a:t>elim</a:t>
-            </a:r>
-            <a:endParaRPr lang="en-US" sz="2400" dirty="0">
-              <a:latin typeface="Courier New" panose="02070309020205020404" pitchFamily="49" charset="0"/>
-              <a:cs typeface="Courier New" panose="02070309020205020404" pitchFamily="49" charset="0"/>
-            </a:endParaRPr>
-          </a:p>
-          <a:p>
-            <a:pPr marL="0" indent="0">
-              <a:buNone/>
-            </a:pPr>
-            <a:r>
-              <a:rPr lang="en-US" sz="2400" dirty="0">
-                <a:latin typeface="Courier New" panose="02070309020205020404" pitchFamily="49" charset="0"/>
-                <a:cs typeface="Courier New" panose="02070309020205020404" pitchFamily="49" charset="0"/>
-              </a:rPr>
-              <a:t>                     R</a:t>
-            </a:r>
-          </a:p>
-          <a:p>
+              <a:t>What is the absorption element in disjunction? I.e., what is the element X such that P </a:t>
+            </a:r>
+            <a:r>
+              <a:rPr lang="en-US" dirty="0">
+                <a:latin typeface="Courier New" panose="02070309020205020404" pitchFamily="49" charset="0"/>
+                <a:cs typeface="Courier New" panose="02070309020205020404" pitchFamily="49" charset="0"/>
+              </a:rPr>
+              <a:t>∨</a:t>
+            </a:r>
             <a:r>
               <a:rPr lang="en-US" dirty="0"/>
-              <a:t>Example:</a:t>
-            </a:r>
-          </a:p>
-          <a:p>
-            <a:pPr lvl="1"/>
-            <a:r>
-              <a:rPr lang="en-US" dirty="0"/>
-              <a:t>When it’s raining, the grass is wet (P → R)</a:t>
-            </a:r>
-          </a:p>
-          <a:p>
-            <a:pPr lvl="1"/>
-            <a:r>
-              <a:rPr lang="en-US" dirty="0"/>
-              <a:t>When the sprinkler’s on, the grass is wet (Q → R)</a:t>
-            </a:r>
-          </a:p>
-          <a:p>
-            <a:pPr lvl="1"/>
-            <a:r>
-              <a:rPr lang="en-US" dirty="0"/>
-              <a:t>It’s raining, or the sprinkler’s on (P ∨ Q)</a:t>
-            </a:r>
-          </a:p>
-          <a:p>
-            <a:pPr lvl="1"/>
-            <a:r>
-              <a:rPr lang="en-US" dirty="0"/>
-              <a:t>Therefore, the grass must be wet (R)</a:t>
-            </a:r>
-          </a:p>
-          <a:p>
-            <a:r>
-              <a:rPr lang="en-US" dirty="0"/>
-              <a:t>See Lean for examples</a:t>
-            </a:r>
-          </a:p>
-          <a:p>
-            <a:pPr lvl="1"/>
-            <a:endParaRPr lang="en-US" dirty="0"/>
-          </a:p>
-          <a:p>
-            <a:endParaRPr lang="en-US" dirty="0"/>
+              <a:t> X = X for all propositions P?</a:t>
+            </a:r>
           </a:p>
         </p:txBody>
       </p:sp>
@@ -5625,7 +6305,7 @@
           <p:cNvPr id="4" name="Slide Number Placeholder 3">
             <a:extLst>
               <a:ext uri="{FF2B5EF4-FFF2-40B4-BE49-F238E27FC236}">
-                <a16:creationId xmlns:a16="http://schemas.microsoft.com/office/drawing/2014/main" id="{CA053BD6-EFB1-BF44-B448-B32BC87043FF}"/>
+                <a16:creationId xmlns:a16="http://schemas.microsoft.com/office/drawing/2014/main" id="{F499448C-6AEE-BF40-8126-3AEB646CF5CC}"/>
               </a:ext>
             </a:extLst>
           </p:cNvPr>
@@ -5652,7 +6332,7 @@
     </p:spTree>
     <p:extLst>
       <p:ext uri="{BB962C8B-B14F-4D97-AF65-F5344CB8AC3E}">
-        <p14:creationId xmlns:p14="http://schemas.microsoft.com/office/powerpoint/2010/main" val="721220024"/>
+        <p14:creationId xmlns:p14="http://schemas.microsoft.com/office/powerpoint/2010/main" val="354563140"/>
       </p:ext>
     </p:extLst>
   </p:cSld>
@@ -5684,7 +6364,7 @@
           <p:cNvPr id="2" name="Title 1">
             <a:extLst>
               <a:ext uri="{FF2B5EF4-FFF2-40B4-BE49-F238E27FC236}">
-                <a16:creationId xmlns:a16="http://schemas.microsoft.com/office/drawing/2014/main" id="{05A09F99-3D4C-ED4C-B43F-FBA7A57E324C}"/>
+                <a16:creationId xmlns:a16="http://schemas.microsoft.com/office/drawing/2014/main" id="{F4EE265F-B1AC-DC4D-9D8C-FE4E136E6F47}"/>
               </a:ext>
             </a:extLst>
           </p:cNvPr>
@@ -5702,7 +6382,7 @@
           <a:p>
             <a:r>
               <a:rPr lang="en-US" dirty="0"/>
-              <a:t>Cases</a:t>
+              <a:t>Disjunction with true</a:t>
             </a:r>
           </a:p>
         </p:txBody>
@@ -5712,7 +6392,7 @@
           <p:cNvPr id="3" name="Content Placeholder 2">
             <a:extLst>
               <a:ext uri="{FF2B5EF4-FFF2-40B4-BE49-F238E27FC236}">
-                <a16:creationId xmlns:a16="http://schemas.microsoft.com/office/drawing/2014/main" id="{974912DA-052A-644D-AA69-3DAFFFBD3D6D}"/>
+                <a16:creationId xmlns:a16="http://schemas.microsoft.com/office/drawing/2014/main" id="{C13B504E-F089-154D-9B13-B9EA8AF15F74}"/>
               </a:ext>
             </a:extLst>
           </p:cNvPr>
@@ -5725,32 +6405,50 @@
         </p:nvSpPr>
         <p:spPr/>
         <p:txBody>
-          <a:bodyPr>
-            <a:normAutofit fontScale="85000" lnSpcReduction="20000"/>
-          </a:bodyPr>
+          <a:bodyPr/>
           <a:lstStyle/>
           <a:p>
             <a:r>
               <a:rPr lang="en-US" dirty="0"/>
-              <a:t>We’ve already seen cases, but now let’s examine it more deeply with respect to disjunction:</a:t>
+              <a:t>Here’s a proof that P or true is always true:</a:t>
             </a:r>
           </a:p>
           <a:p>
             <a:pPr marL="0" indent="0">
               <a:buNone/>
             </a:pPr>
-            <a:endParaRPr lang="en-US" dirty="0"/>
+            <a:r>
+              <a:rPr lang="en-US" sz="2400" dirty="0">
+                <a:latin typeface="Courier New" panose="02070309020205020404" pitchFamily="49" charset="0"/>
+                <a:cs typeface="Courier New" panose="02070309020205020404" pitchFamily="49" charset="0"/>
+              </a:rPr>
+              <a:t>theorem </a:t>
+            </a:r>
+            <a:r>
+              <a:rPr lang="en-US" sz="2400" dirty="0" err="1">
+                <a:latin typeface="Courier New" panose="02070309020205020404" pitchFamily="49" charset="0"/>
+                <a:cs typeface="Courier New" panose="02070309020205020404" pitchFamily="49" charset="0"/>
+              </a:rPr>
+              <a:t>id_right_or</a:t>
+            </a:r>
+            <a:r>
+              <a:rPr lang="en-US" sz="2400" dirty="0">
+                <a:latin typeface="Courier New" panose="02070309020205020404" pitchFamily="49" charset="0"/>
+                <a:cs typeface="Courier New" panose="02070309020205020404" pitchFamily="49" charset="0"/>
+              </a:rPr>
+              <a:t> : </a:t>
+            </a:r>
           </a:p>
           <a:p>
             <a:pPr marL="0" indent="0">
               <a:buNone/>
             </a:pPr>
             <a:r>
-              <a:rPr lang="en-US" sz="2600" dirty="0">
-                <a:latin typeface="Courier New" panose="02070309020205020404" pitchFamily="49" charset="0"/>
-                <a:cs typeface="Courier New" panose="02070309020205020404" pitchFamily="49" charset="0"/>
-              </a:rPr>
-              <a:t>theorem wet''' : </a:t>
+              <a:rPr lang="en-US" sz="2400" dirty="0">
+                <a:latin typeface="Courier New" panose="02070309020205020404" pitchFamily="49" charset="0"/>
+                <a:cs typeface="Courier New" panose="02070309020205020404" pitchFamily="49" charset="0"/>
+              </a:rPr>
+              <a:t>  ∀ P : Prop, P ∨ true :=</a:t>
             </a:r>
           </a:p>
           <a:p>
@@ -5758,11 +6456,25 @@
               <a:buNone/>
             </a:pPr>
             <a:r>
-              <a:rPr lang="en-US" sz="2600" dirty="0">
-                <a:latin typeface="Courier New" panose="02070309020205020404" pitchFamily="49" charset="0"/>
-                <a:cs typeface="Courier New" panose="02070309020205020404" pitchFamily="49" charset="0"/>
-              </a:rPr>
-              <a:t>  ∀ R S W: Prop, </a:t>
+              <a:rPr lang="en-US" sz="2400" dirty="0">
+                <a:latin typeface="Courier New" panose="02070309020205020404" pitchFamily="49" charset="0"/>
+                <a:cs typeface="Courier New" panose="02070309020205020404" pitchFamily="49" charset="0"/>
+              </a:rPr>
+              <a:t>    </a:t>
+            </a:r>
+            <a:r>
+              <a:rPr lang="el-GR" sz="2400" dirty="0">
+                <a:latin typeface="Courier New" panose="02070309020205020404" pitchFamily="49" charset="0"/>
+                <a:cs typeface="Courier New" panose="02070309020205020404" pitchFamily="49" charset="0"/>
+              </a:rPr>
+              <a:t>λ </a:t>
+            </a:r>
+            <a:r>
+              <a:rPr lang="en-US" sz="2400" dirty="0">
+                <a:latin typeface="Courier New" panose="02070309020205020404" pitchFamily="49" charset="0"/>
+                <a:cs typeface="Courier New" panose="02070309020205020404" pitchFamily="49" charset="0"/>
+              </a:rPr>
+              <a:t>P,</a:t>
             </a:r>
           </a:p>
           <a:p>
@@ -5770,173 +6482,47 @@
               <a:buNone/>
             </a:pPr>
             <a:r>
-              <a:rPr lang="en-US" sz="2600" dirty="0">
-                <a:latin typeface="Courier New" panose="02070309020205020404" pitchFamily="49" charset="0"/>
-                <a:cs typeface="Courier New" panose="02070309020205020404" pitchFamily="49" charset="0"/>
-              </a:rPr>
-              <a:t>    (R ∨ S) → (R → W) → (S → W) → W :=</a:t>
-            </a:r>
-          </a:p>
-          <a:p>
-            <a:pPr marL="0" indent="0">
-              <a:buNone/>
-            </a:pPr>
-            <a:r>
-              <a:rPr lang="en-US" sz="2600" dirty="0">
-                <a:latin typeface="Courier New" panose="02070309020205020404" pitchFamily="49" charset="0"/>
-                <a:cs typeface="Courier New" panose="02070309020205020404" pitchFamily="49" charset="0"/>
-              </a:rPr>
-              <a:t>begin</a:t>
-            </a:r>
-          </a:p>
-          <a:p>
-            <a:pPr marL="0" indent="0">
-              <a:buNone/>
-            </a:pPr>
-            <a:r>
-              <a:rPr lang="en-US" sz="2600" dirty="0">
-                <a:latin typeface="Courier New" panose="02070309020205020404" pitchFamily="49" charset="0"/>
-                <a:cs typeface="Courier New" panose="02070309020205020404" pitchFamily="49" charset="0"/>
-              </a:rPr>
-              <a:t>  assume R S W </a:t>
-            </a:r>
-            <a:r>
-              <a:rPr lang="en-US" sz="2600" dirty="0" err="1">
-                <a:latin typeface="Courier New" panose="02070309020205020404" pitchFamily="49" charset="0"/>
-                <a:cs typeface="Courier New" panose="02070309020205020404" pitchFamily="49" charset="0"/>
-              </a:rPr>
-              <a:t>pfRorS</a:t>
-            </a:r>
-            <a:r>
-              <a:rPr lang="en-US" sz="2600" dirty="0">
-                <a:latin typeface="Courier New" panose="02070309020205020404" pitchFamily="49" charset="0"/>
-                <a:cs typeface="Courier New" panose="02070309020205020404" pitchFamily="49" charset="0"/>
-              </a:rPr>
-              <a:t> r2w s2w,</a:t>
-            </a:r>
-          </a:p>
-          <a:p>
-            <a:pPr marL="0" indent="0">
-              <a:buNone/>
-            </a:pPr>
-            <a:r>
-              <a:rPr lang="en-US" sz="2600" dirty="0">
-                <a:latin typeface="Courier New" panose="02070309020205020404" pitchFamily="49" charset="0"/>
-                <a:cs typeface="Courier New" panose="02070309020205020404" pitchFamily="49" charset="0"/>
-              </a:rPr>
-              <a:t>  cases </a:t>
-            </a:r>
-            <a:r>
-              <a:rPr lang="en-US" sz="2600" dirty="0" err="1">
-                <a:latin typeface="Courier New" panose="02070309020205020404" pitchFamily="49" charset="0"/>
-                <a:cs typeface="Courier New" panose="02070309020205020404" pitchFamily="49" charset="0"/>
-              </a:rPr>
-              <a:t>pfRorS</a:t>
-            </a:r>
-            <a:r>
-              <a:rPr lang="en-US" sz="2600" dirty="0">
-                <a:latin typeface="Courier New" panose="02070309020205020404" pitchFamily="49" charset="0"/>
-                <a:cs typeface="Courier New" panose="02070309020205020404" pitchFamily="49" charset="0"/>
-              </a:rPr>
-              <a:t> with </a:t>
-            </a:r>
-            <a:r>
-              <a:rPr lang="en-US" sz="2600" dirty="0" err="1">
-                <a:latin typeface="Courier New" panose="02070309020205020404" pitchFamily="49" charset="0"/>
-                <a:cs typeface="Courier New" panose="02070309020205020404" pitchFamily="49" charset="0"/>
-              </a:rPr>
-              <a:t>pfR</a:t>
-            </a:r>
-            <a:r>
-              <a:rPr lang="en-US" sz="2600" dirty="0">
-                <a:latin typeface="Courier New" panose="02070309020205020404" pitchFamily="49" charset="0"/>
-                <a:cs typeface="Courier New" panose="02070309020205020404" pitchFamily="49" charset="0"/>
-              </a:rPr>
-              <a:t> </a:t>
-            </a:r>
-            <a:r>
-              <a:rPr lang="en-US" sz="2600" dirty="0" err="1">
-                <a:latin typeface="Courier New" panose="02070309020205020404" pitchFamily="49" charset="0"/>
-                <a:cs typeface="Courier New" panose="02070309020205020404" pitchFamily="49" charset="0"/>
-              </a:rPr>
-              <a:t>pfS</a:t>
-            </a:r>
-            <a:r>
-              <a:rPr lang="en-US" sz="2600" dirty="0">
-                <a:latin typeface="Courier New" panose="02070309020205020404" pitchFamily="49" charset="0"/>
-                <a:cs typeface="Courier New" panose="02070309020205020404" pitchFamily="49" charset="0"/>
-              </a:rPr>
-              <a:t>,</a:t>
-            </a:r>
-          </a:p>
-          <a:p>
-            <a:pPr marL="0" indent="0">
-              <a:buNone/>
-            </a:pPr>
-            <a:r>
-              <a:rPr lang="en-US" sz="2600" dirty="0">
-                <a:latin typeface="Courier New" panose="02070309020205020404" pitchFamily="49" charset="0"/>
-                <a:cs typeface="Courier New" panose="02070309020205020404" pitchFamily="49" charset="0"/>
-              </a:rPr>
-              <a:t>    exact r2w </a:t>
-            </a:r>
-            <a:r>
-              <a:rPr lang="en-US" sz="2600" dirty="0" err="1">
-                <a:latin typeface="Courier New" panose="02070309020205020404" pitchFamily="49" charset="0"/>
-                <a:cs typeface="Courier New" panose="02070309020205020404" pitchFamily="49" charset="0"/>
-              </a:rPr>
-              <a:t>pfR</a:t>
-            </a:r>
-            <a:r>
-              <a:rPr lang="en-US" sz="2600" dirty="0">
-                <a:latin typeface="Courier New" panose="02070309020205020404" pitchFamily="49" charset="0"/>
-                <a:cs typeface="Courier New" panose="02070309020205020404" pitchFamily="49" charset="0"/>
-              </a:rPr>
-              <a:t>, -- case when it’s raining</a:t>
-            </a:r>
-          </a:p>
-          <a:p>
-            <a:pPr marL="0" indent="0">
-              <a:buNone/>
-            </a:pPr>
-            <a:r>
-              <a:rPr lang="en-US" sz="2600" dirty="0">
-                <a:latin typeface="Courier New" panose="02070309020205020404" pitchFamily="49" charset="0"/>
-                <a:cs typeface="Courier New" panose="02070309020205020404" pitchFamily="49" charset="0"/>
-              </a:rPr>
-              <a:t>    exact s2w </a:t>
-            </a:r>
-            <a:r>
-              <a:rPr lang="en-US" sz="2600" dirty="0" err="1">
-                <a:latin typeface="Courier New" panose="02070309020205020404" pitchFamily="49" charset="0"/>
-                <a:cs typeface="Courier New" panose="02070309020205020404" pitchFamily="49" charset="0"/>
-              </a:rPr>
-              <a:t>pfS</a:t>
-            </a:r>
-            <a:r>
-              <a:rPr lang="en-US" sz="2600" dirty="0">
-                <a:latin typeface="Courier New" panose="02070309020205020404" pitchFamily="49" charset="0"/>
-                <a:cs typeface="Courier New" panose="02070309020205020404" pitchFamily="49" charset="0"/>
-              </a:rPr>
-              <a:t>, -- case when the sprinkler’s on</a:t>
-            </a:r>
-          </a:p>
-          <a:p>
-            <a:pPr marL="0" indent="0">
-              <a:buNone/>
-            </a:pPr>
-            <a:r>
-              <a:rPr lang="en-US" sz="2600" dirty="0">
-                <a:latin typeface="Courier New" panose="02070309020205020404" pitchFamily="49" charset="0"/>
-                <a:cs typeface="Courier New" panose="02070309020205020404" pitchFamily="49" charset="0"/>
-              </a:rPr>
-              <a:t>end</a:t>
-            </a:r>
-          </a:p>
-          <a:p>
-            <a:pPr marL="0" indent="0">
-              <a:buNone/>
-            </a:pPr>
+              <a:rPr lang="en-US" sz="2400" dirty="0">
+                <a:latin typeface="Courier New" panose="02070309020205020404" pitchFamily="49" charset="0"/>
+                <a:cs typeface="Courier New" panose="02070309020205020404" pitchFamily="49" charset="0"/>
+              </a:rPr>
+              <a:t>      </a:t>
+            </a:r>
+            <a:r>
+              <a:rPr lang="en-US" sz="2400" dirty="0" err="1">
+                <a:latin typeface="Courier New" panose="02070309020205020404" pitchFamily="49" charset="0"/>
+                <a:cs typeface="Courier New" panose="02070309020205020404" pitchFamily="49" charset="0"/>
+              </a:rPr>
+              <a:t>or.intro_right</a:t>
+            </a:r>
+            <a:r>
+              <a:rPr lang="en-US" sz="2400" dirty="0">
+                <a:latin typeface="Courier New" panose="02070309020205020404" pitchFamily="49" charset="0"/>
+                <a:cs typeface="Courier New" panose="02070309020205020404" pitchFamily="49" charset="0"/>
+              </a:rPr>
+              <a:t> P </a:t>
+            </a:r>
+            <a:r>
+              <a:rPr lang="en-US" sz="2400" dirty="0" err="1">
+                <a:latin typeface="Courier New" panose="02070309020205020404" pitchFamily="49" charset="0"/>
+                <a:cs typeface="Courier New" panose="02070309020205020404" pitchFamily="49" charset="0"/>
+              </a:rPr>
+              <a:t>true.intro</a:t>
+            </a:r>
+            <a:endParaRPr lang="en-US" sz="2400" dirty="0">
+              <a:latin typeface="Courier New" panose="02070309020205020404" pitchFamily="49" charset="0"/>
+              <a:cs typeface="Courier New" panose="02070309020205020404" pitchFamily="49" charset="0"/>
+            </a:endParaRPr>
+          </a:p>
+          <a:p>
+            <a:r>
+              <a:rPr lang="en-US" dirty="0">
+                <a:cs typeface="Courier New" panose="02070309020205020404" pitchFamily="49" charset="0"/>
+              </a:rPr>
+              <a:t>Exercise: Prove that true or Q is always true as well.</a:t>
+            </a:r>
+          </a:p>
+          <a:p>
             <a:endParaRPr lang="en-US" dirty="0"/>
           </a:p>
         </p:txBody>
@@ -5946,7 +6532,7 @@
           <p:cNvPr id="4" name="Slide Number Placeholder 3">
             <a:extLst>
               <a:ext uri="{FF2B5EF4-FFF2-40B4-BE49-F238E27FC236}">
-                <a16:creationId xmlns:a16="http://schemas.microsoft.com/office/drawing/2014/main" id="{2C51E704-2BDA-FA4F-BCD0-8872EB2A8DA4}"/>
+                <a16:creationId xmlns:a16="http://schemas.microsoft.com/office/drawing/2014/main" id="{4E6EC673-4884-A048-8F9A-2B0EADAE0160}"/>
               </a:ext>
             </a:extLst>
           </p:cNvPr>
@@ -5973,7 +6559,7 @@
     </p:spTree>
     <p:extLst>
       <p:ext uri="{BB962C8B-B14F-4D97-AF65-F5344CB8AC3E}">
-        <p14:creationId xmlns:p14="http://schemas.microsoft.com/office/powerpoint/2010/main" val="3861147334"/>
+        <p14:creationId xmlns:p14="http://schemas.microsoft.com/office/powerpoint/2010/main" val="1537724452"/>
       </p:ext>
     </p:extLst>
   </p:cSld>
@@ -6005,7 +6591,7 @@
           <p:cNvPr id="2" name="Title 1">
             <a:extLst>
               <a:ext uri="{FF2B5EF4-FFF2-40B4-BE49-F238E27FC236}">
-                <a16:creationId xmlns:a16="http://schemas.microsoft.com/office/drawing/2014/main" id="{54A03735-720F-5F44-B80D-7B7CDDA1012C}"/>
+                <a16:creationId xmlns:a16="http://schemas.microsoft.com/office/drawing/2014/main" id="{83DDEC75-12A1-784D-AC83-03D678B0D31A}"/>
               </a:ext>
             </a:extLst>
           </p:cNvPr>
@@ -6023,7 +6609,7 @@
           <a:p>
             <a:r>
               <a:rPr lang="en-US" dirty="0"/>
-              <a:t>Disjunction Identity</a:t>
+              <a:t>Elimination rule</a:t>
             </a:r>
           </a:p>
         </p:txBody>
@@ -6033,7 +6619,7 @@
           <p:cNvPr id="3" name="Content Placeholder 2">
             <a:extLst>
               <a:ext uri="{FF2B5EF4-FFF2-40B4-BE49-F238E27FC236}">
-                <a16:creationId xmlns:a16="http://schemas.microsoft.com/office/drawing/2014/main" id="{81E4415C-DA17-7D4F-9C25-102BB0CAF6A9}"/>
+                <a16:creationId xmlns:a16="http://schemas.microsoft.com/office/drawing/2014/main" id="{73097CB7-C02E-CB40-8A26-B331EF9E630A}"/>
               </a:ext>
             </a:extLst>
           </p:cNvPr>
@@ -6046,25 +6632,158 @@
         </p:nvSpPr>
         <p:spPr/>
         <p:txBody>
-          <a:bodyPr/>
+          <a:bodyPr>
+            <a:normAutofit fontScale="92500" lnSpcReduction="10000"/>
+          </a:bodyPr>
           <a:lstStyle/>
           <a:p>
             <a:r>
               <a:rPr lang="en-US" dirty="0"/>
-              <a:t>In multiplication, 1 is the identity element, because x times 1 is x for any value of x</a:t>
-            </a:r>
-          </a:p>
-          <a:p>
+              <a:t>The elimination rule for disjunction has some nuance:</a:t>
+            </a:r>
+          </a:p>
+          <a:p>
+            <a:pPr lvl="1"/>
             <a:r>
               <a:rPr lang="en-US" dirty="0"/>
-              <a:t>In addition, 0 is the identity element, because x plus 0 is x for any value of x</a:t>
+              <a:t>If P ∨ Q, then if both P → R and Q → R, then R</a:t>
+            </a:r>
+          </a:p>
+          <a:p>
+            <a:pPr marL="0" indent="0">
+              <a:buNone/>
+            </a:pPr>
+            <a:r>
+              <a:rPr lang="en-US" sz="2400" dirty="0">
+                <a:latin typeface="Courier New" panose="02070309020205020404" pitchFamily="49" charset="0"/>
+                <a:cs typeface="Courier New" panose="02070309020205020404" pitchFamily="49" charset="0"/>
+              </a:rPr>
+              <a:t>   </a:t>
+            </a:r>
+            <a:r>
+              <a:rPr lang="en-US" sz="2400" dirty="0" err="1">
+                <a:latin typeface="Courier New" panose="02070309020205020404" pitchFamily="49" charset="0"/>
+                <a:cs typeface="Courier New" panose="02070309020205020404" pitchFamily="49" charset="0"/>
+              </a:rPr>
+              <a:t>pfPQ</a:t>
+            </a:r>
+            <a:r>
+              <a:rPr lang="en-US" sz="2400" dirty="0">
+                <a:latin typeface="Courier New" panose="02070309020205020404" pitchFamily="49" charset="0"/>
+                <a:cs typeface="Courier New" panose="02070309020205020404" pitchFamily="49" charset="0"/>
+              </a:rPr>
+              <a:t>: P ∨ Q, </a:t>
+            </a:r>
+            <a:r>
+              <a:rPr lang="en-US" sz="2400" dirty="0" err="1">
+                <a:latin typeface="Courier New" panose="02070309020205020404" pitchFamily="49" charset="0"/>
+                <a:cs typeface="Courier New" panose="02070309020205020404" pitchFamily="49" charset="0"/>
+              </a:rPr>
+              <a:t>pfPR</a:t>
+            </a:r>
+            <a:r>
+              <a:rPr lang="en-US" sz="2400" dirty="0">
+                <a:latin typeface="Courier New" panose="02070309020205020404" pitchFamily="49" charset="0"/>
+                <a:cs typeface="Courier New" panose="02070309020205020404" pitchFamily="49" charset="0"/>
+              </a:rPr>
+              <a:t>: P → R, </a:t>
+            </a:r>
+            <a:r>
+              <a:rPr lang="en-US" sz="2400" dirty="0" err="1">
+                <a:latin typeface="Courier New" panose="02070309020205020404" pitchFamily="49" charset="0"/>
+                <a:cs typeface="Courier New" panose="02070309020205020404" pitchFamily="49" charset="0"/>
+              </a:rPr>
+              <a:t>pfQR</a:t>
+            </a:r>
+            <a:r>
+              <a:rPr lang="en-US" sz="2400" dirty="0">
+                <a:latin typeface="Courier New" panose="02070309020205020404" pitchFamily="49" charset="0"/>
+                <a:cs typeface="Courier New" panose="02070309020205020404" pitchFamily="49" charset="0"/>
+              </a:rPr>
+              <a:t>: Q → R</a:t>
+            </a:r>
+          </a:p>
+          <a:p>
+            <a:pPr marL="0" indent="0">
+              <a:buNone/>
+            </a:pPr>
+            <a:r>
+              <a:rPr lang="en-US" sz="2400" dirty="0">
+                <a:latin typeface="Courier New" panose="02070309020205020404" pitchFamily="49" charset="0"/>
+                <a:cs typeface="Courier New" panose="02070309020205020404" pitchFamily="49" charset="0"/>
+              </a:rPr>
+              <a:t>  -------------------------------------- ∨-</a:t>
+            </a:r>
+            <a:r>
+              <a:rPr lang="en-US" sz="2400" dirty="0" err="1">
+                <a:latin typeface="Courier New" panose="02070309020205020404" pitchFamily="49" charset="0"/>
+                <a:cs typeface="Courier New" panose="02070309020205020404" pitchFamily="49" charset="0"/>
+              </a:rPr>
+              <a:t>elim</a:t>
+            </a:r>
+            <a:endParaRPr lang="en-US" sz="2400" dirty="0">
+              <a:latin typeface="Courier New" panose="02070309020205020404" pitchFamily="49" charset="0"/>
+              <a:cs typeface="Courier New" panose="02070309020205020404" pitchFamily="49" charset="0"/>
+            </a:endParaRPr>
+          </a:p>
+          <a:p>
+            <a:pPr marL="0" indent="0">
+              <a:buNone/>
+            </a:pPr>
+            <a:r>
+              <a:rPr lang="en-US" sz="2400" dirty="0">
+                <a:latin typeface="Courier New" panose="02070309020205020404" pitchFamily="49" charset="0"/>
+                <a:cs typeface="Courier New" panose="02070309020205020404" pitchFamily="49" charset="0"/>
+              </a:rPr>
+              <a:t>                     R</a:t>
             </a:r>
           </a:p>
           <a:p>
             <a:r>
               <a:rPr lang="en-US" dirty="0"/>
-              <a:t>What is the identity element for disjunction?</a:t>
-            </a:r>
+              <a:t>Example:</a:t>
+            </a:r>
+          </a:p>
+          <a:p>
+            <a:pPr lvl="1"/>
+            <a:r>
+              <a:rPr lang="en-US" dirty="0"/>
+              <a:t>When it’s raining, the grass is wet (P → R)</a:t>
+            </a:r>
+          </a:p>
+          <a:p>
+            <a:pPr lvl="1"/>
+            <a:r>
+              <a:rPr lang="en-US" dirty="0"/>
+              <a:t>When the sprinkler’s on, the grass is wet (Q → R)</a:t>
+            </a:r>
+          </a:p>
+          <a:p>
+            <a:pPr lvl="1"/>
+            <a:r>
+              <a:rPr lang="en-US" dirty="0"/>
+              <a:t>It’s raining, or the sprinkler’s on (P ∨ Q)</a:t>
+            </a:r>
+          </a:p>
+          <a:p>
+            <a:pPr lvl="1"/>
+            <a:r>
+              <a:rPr lang="en-US" dirty="0"/>
+              <a:t>Therefore, the grass must be wet (R)</a:t>
+            </a:r>
+          </a:p>
+          <a:p>
+            <a:r>
+              <a:rPr lang="en-US" dirty="0"/>
+              <a:t>See Lean for examples</a:t>
+            </a:r>
+          </a:p>
+          <a:p>
+            <a:pPr lvl="1"/>
+            <a:endParaRPr lang="en-US" dirty="0"/>
+          </a:p>
+          <a:p>
+            <a:endParaRPr lang="en-US" dirty="0"/>
           </a:p>
         </p:txBody>
       </p:sp>
@@ -6073,7 +6792,7 @@
           <p:cNvPr id="4" name="Slide Number Placeholder 3">
             <a:extLst>
               <a:ext uri="{FF2B5EF4-FFF2-40B4-BE49-F238E27FC236}">
-                <a16:creationId xmlns:a16="http://schemas.microsoft.com/office/drawing/2014/main" id="{A30249B4-7088-4145-87FB-7B0B85EE1BE1}"/>
+                <a16:creationId xmlns:a16="http://schemas.microsoft.com/office/drawing/2014/main" id="{CA053BD6-EFB1-BF44-B448-B32BC87043FF}"/>
               </a:ext>
             </a:extLst>
           </p:cNvPr>
@@ -6100,7 +6819,7 @@
     </p:spTree>
     <p:extLst>
       <p:ext uri="{BB962C8B-B14F-4D97-AF65-F5344CB8AC3E}">
-        <p14:creationId xmlns:p14="http://schemas.microsoft.com/office/powerpoint/2010/main" val="784796663"/>
+        <p14:creationId xmlns:p14="http://schemas.microsoft.com/office/powerpoint/2010/main" val="721220024"/>
       </p:ext>
     </p:extLst>
   </p:cSld>

</xml_diff>

<commit_message>
Added proof of 2nd De Morgan's law
</commit_message>
<xml_diff>
--- a/09_Disjunction/Disjunction.pptx
+++ b/09_Disjunction/Disjunction.pptx
@@ -5,7 +5,7 @@
     <p:sldMasterId id="2147483648" r:id="rId1"/>
   </p:sldMasterIdLst>
   <p:notesMasterIdLst>
-    <p:notesMasterId r:id="rId17"/>
+    <p:notesMasterId r:id="rId18"/>
   </p:notesMasterIdLst>
   <p:sldIdLst>
     <p:sldId id="258" r:id="rId2"/>
@@ -22,7 +22,8 @@
     <p:sldId id="368" r:id="rId13"/>
     <p:sldId id="369" r:id="rId14"/>
     <p:sldId id="373" r:id="rId15"/>
-    <p:sldId id="261" r:id="rId16"/>
+    <p:sldId id="374" r:id="rId16"/>
+    <p:sldId id="261" r:id="rId17"/>
   </p:sldIdLst>
   <p:sldSz cx="12192000" cy="6858000"/>
   <p:notesSz cx="6858000" cy="9144000"/>
@@ -4693,7 +4694,7 @@
               <a:buNone/>
             </a:pPr>
             <a:r>
-              <a:rPr lang="en-US" sz="2400">
+              <a:rPr lang="en-US" sz="2400" dirty="0">
                 <a:latin typeface="Courier New" panose="02070309020205020404" pitchFamily="49" charset="0"/>
                 <a:cs typeface="Courier New" panose="02070309020205020404" pitchFamily="49" charset="0"/>
               </a:rPr>
@@ -4771,6 +4772,175 @@
 </file>
 
 <file path=ppt/slides/slide15.xml><?xml version="1.0" encoding="utf-8"?>
+<p:sld xmlns:a="http://schemas.openxmlformats.org/drawingml/2006/main" xmlns:r="http://schemas.openxmlformats.org/officeDocument/2006/relationships" xmlns:p="http://schemas.openxmlformats.org/presentationml/2006/main">
+  <p:cSld>
+    <p:spTree>
+      <p:nvGrpSpPr>
+        <p:cNvPr id="1" name=""/>
+        <p:cNvGrpSpPr/>
+        <p:nvPr/>
+      </p:nvGrpSpPr>
+      <p:grpSpPr>
+        <a:xfrm>
+          <a:off x="0" y="0"/>
+          <a:ext cx="0" cy="0"/>
+          <a:chOff x="0" y="0"/>
+          <a:chExt cx="0" cy="0"/>
+        </a:xfrm>
+      </p:grpSpPr>
+      <p:sp>
+        <p:nvSpPr>
+          <p:cNvPr id="2" name="Title 1">
+            <a:extLst>
+              <a:ext uri="{FF2B5EF4-FFF2-40B4-BE49-F238E27FC236}">
+                <a16:creationId xmlns:a16="http://schemas.microsoft.com/office/drawing/2014/main" id="{27414F51-B29C-634E-B6C6-E085C9D6B3F1}"/>
+              </a:ext>
+            </a:extLst>
+          </p:cNvPr>
+          <p:cNvSpPr>
+            <a:spLocks noGrp="1"/>
+          </p:cNvSpPr>
+          <p:nvPr>
+            <p:ph type="title"/>
+          </p:nvPr>
+        </p:nvSpPr>
+        <p:spPr/>
+        <p:txBody>
+          <a:bodyPr/>
+          <a:lstStyle/>
+          <a:p>
+            <a:r>
+              <a:rPr lang="en-US" dirty="0"/>
+              <a:t>De Morgan’s Laws</a:t>
+            </a:r>
+          </a:p>
+        </p:txBody>
+      </p:sp>
+      <p:sp>
+        <p:nvSpPr>
+          <p:cNvPr id="3" name="Content Placeholder 2">
+            <a:extLst>
+              <a:ext uri="{FF2B5EF4-FFF2-40B4-BE49-F238E27FC236}">
+                <a16:creationId xmlns:a16="http://schemas.microsoft.com/office/drawing/2014/main" id="{E2F3030E-4713-9947-8DBC-49EDC8FD1322}"/>
+              </a:ext>
+            </a:extLst>
+          </p:cNvPr>
+          <p:cNvSpPr>
+            <a:spLocks noGrp="1"/>
+          </p:cNvSpPr>
+          <p:nvPr>
+            <p:ph idx="1"/>
+          </p:nvPr>
+        </p:nvSpPr>
+        <p:spPr/>
+        <p:txBody>
+          <a:bodyPr>
+            <a:normAutofit lnSpcReduction="10000"/>
+          </a:bodyPr>
+          <a:lstStyle/>
+          <a:p>
+            <a:r>
+              <a:rPr lang="en-US" dirty="0"/>
+              <a:t>First law: ¬(P ∨ Q) ↔ ¬P ∧ ¬Q </a:t>
+            </a:r>
+          </a:p>
+          <a:p>
+            <a:pPr lvl="1"/>
+            <a:r>
+              <a:rPr lang="en-US" dirty="0"/>
+              <a:t>If it’s not true that P or Q is true, then it’s true that P is not true and Q is not true</a:t>
+            </a:r>
+          </a:p>
+          <a:p>
+            <a:pPr lvl="1"/>
+            <a:r>
+              <a:rPr lang="en-US" dirty="0"/>
+              <a:t>If it’s not true that it’s raining or the sprinkler is on, then it’s true that it’s not raining and the sprinkler is not on</a:t>
+            </a:r>
+          </a:p>
+          <a:p>
+            <a:pPr lvl="1"/>
+            <a:r>
+              <a:rPr lang="en-US"/>
+              <a:t>Homework #4</a:t>
+            </a:r>
+            <a:endParaRPr lang="en-US" dirty="0"/>
+          </a:p>
+          <a:p>
+            <a:r>
+              <a:rPr lang="en-US" dirty="0"/>
+              <a:t>Second law: ¬(P ∧ Q) ↔ ¬P ∨ ¬Q</a:t>
+            </a:r>
+          </a:p>
+          <a:p>
+            <a:pPr lvl="1"/>
+            <a:r>
+              <a:rPr lang="en-US" dirty="0"/>
+              <a:t>If it’s not true that P and Q is true, then it’s true that P is not true or Q is not true</a:t>
+            </a:r>
+          </a:p>
+          <a:p>
+            <a:pPr lvl="1"/>
+            <a:r>
+              <a:rPr lang="en-US" dirty="0"/>
+              <a:t>If it’s not true that it’s raining and the sprinkler is on, then it’s true that either it’s not raining, or the sprinkler is off, or both</a:t>
+            </a:r>
+          </a:p>
+          <a:p>
+            <a:pPr lvl="1"/>
+            <a:r>
+              <a:rPr lang="en-US" dirty="0"/>
+              <a:t>See Lean for proof</a:t>
+            </a:r>
+          </a:p>
+          <a:p>
+            <a:endParaRPr lang="en-US" dirty="0"/>
+          </a:p>
+        </p:txBody>
+      </p:sp>
+      <p:sp>
+        <p:nvSpPr>
+          <p:cNvPr id="4" name="Slide Number Placeholder 3">
+            <a:extLst>
+              <a:ext uri="{FF2B5EF4-FFF2-40B4-BE49-F238E27FC236}">
+                <a16:creationId xmlns:a16="http://schemas.microsoft.com/office/drawing/2014/main" id="{EF36971D-54B3-1C44-95E4-B81DC8ECD541}"/>
+              </a:ext>
+            </a:extLst>
+          </p:cNvPr>
+          <p:cNvSpPr>
+            <a:spLocks noGrp="1"/>
+          </p:cNvSpPr>
+          <p:nvPr>
+            <p:ph type="sldNum" sz="quarter" idx="12"/>
+          </p:nvPr>
+        </p:nvSpPr>
+        <p:spPr/>
+        <p:txBody>
+          <a:bodyPr/>
+          <a:lstStyle/>
+          <a:p>
+            <a:fld id="{3352CBF5-17B8-4387-88A6-ABF9F8C64D5A}" type="slidenum">
+              <a:rPr lang="en-US" smtClean="0"/>
+              <a:t>15</a:t>
+            </a:fld>
+            <a:endParaRPr lang="en-US"/>
+          </a:p>
+        </p:txBody>
+      </p:sp>
+    </p:spTree>
+    <p:extLst>
+      <p:ext uri="{BB962C8B-B14F-4D97-AF65-F5344CB8AC3E}">
+        <p14:creationId xmlns:p14="http://schemas.microsoft.com/office/powerpoint/2010/main" val="473758851"/>
+      </p:ext>
+    </p:extLst>
+  </p:cSld>
+  <p:clrMapOvr>
+    <a:masterClrMapping/>
+  </p:clrMapOvr>
+</p:sld>
+</file>
+
+<file path=ppt/slides/slide16.xml><?xml version="1.0" encoding="utf-8"?>
 <p:sld xmlns:a="http://schemas.openxmlformats.org/drawingml/2006/main" xmlns:r="http://schemas.openxmlformats.org/officeDocument/2006/relationships" xmlns:p="http://schemas.openxmlformats.org/presentationml/2006/main">
   <p:cSld>
     <p:bg>
@@ -5041,7 +5211,7 @@
           <a:p>
             <a:fld id="{3352CBF5-17B8-4387-88A6-ABF9F8C64D5A}" type="slidenum">
               <a:rPr lang="en-US" smtClean="0"/>
-              <a:t>15</a:t>
+              <a:t>16</a:t>
             </a:fld>
             <a:endParaRPr lang="en-US"/>
           </a:p>

</xml_diff>

<commit_message>
Added proof that P -> Q is the same as ¬P \/ Q
</commit_message>
<xml_diff>
--- a/09_Disjunction/Disjunction.pptx
+++ b/09_Disjunction/Disjunction.pptx
@@ -5,7 +5,7 @@
     <p:sldMasterId id="2147483648" r:id="rId1"/>
   </p:sldMasterIdLst>
   <p:notesMasterIdLst>
-    <p:notesMasterId r:id="rId18"/>
+    <p:notesMasterId r:id="rId19"/>
   </p:notesMasterIdLst>
   <p:sldIdLst>
     <p:sldId id="258" r:id="rId2"/>
@@ -23,7 +23,8 @@
     <p:sldId id="369" r:id="rId14"/>
     <p:sldId id="373" r:id="rId15"/>
     <p:sldId id="374" r:id="rId16"/>
-    <p:sldId id="261" r:id="rId17"/>
+    <p:sldId id="375" r:id="rId17"/>
+    <p:sldId id="261" r:id="rId18"/>
   </p:sldIdLst>
   <p:sldSz cx="12192000" cy="6858000"/>
   <p:notesSz cx="6858000" cy="9144000"/>
@@ -4861,10 +4862,9 @@
           <a:p>
             <a:pPr lvl="1"/>
             <a:r>
-              <a:rPr lang="en-US"/>
+              <a:rPr lang="en-US" dirty="0"/>
               <a:t>Homework #4</a:t>
             </a:r>
-            <a:endParaRPr lang="en-US" dirty="0"/>
           </a:p>
           <a:p>
             <a:r>
@@ -4941,6 +4941,138 @@
 </file>
 
 <file path=ppt/slides/slide16.xml><?xml version="1.0" encoding="utf-8"?>
+<p:sld xmlns:a="http://schemas.openxmlformats.org/drawingml/2006/main" xmlns:r="http://schemas.openxmlformats.org/officeDocument/2006/relationships" xmlns:p="http://schemas.openxmlformats.org/presentationml/2006/main">
+  <p:cSld>
+    <p:spTree>
+      <p:nvGrpSpPr>
+        <p:cNvPr id="1" name=""/>
+        <p:cNvGrpSpPr/>
+        <p:nvPr/>
+      </p:nvGrpSpPr>
+      <p:grpSpPr>
+        <a:xfrm>
+          <a:off x="0" y="0"/>
+          <a:ext cx="0" cy="0"/>
+          <a:chOff x="0" y="0"/>
+          <a:chExt cx="0" cy="0"/>
+        </a:xfrm>
+      </p:grpSpPr>
+      <p:sp>
+        <p:nvSpPr>
+          <p:cNvPr id="2" name="Title 1">
+            <a:extLst>
+              <a:ext uri="{FF2B5EF4-FFF2-40B4-BE49-F238E27FC236}">
+                <a16:creationId xmlns:a16="http://schemas.microsoft.com/office/drawing/2014/main" id="{098D82B0-901E-1849-95DB-340B8A7579B6}"/>
+              </a:ext>
+            </a:extLst>
+          </p:cNvPr>
+          <p:cNvSpPr>
+            <a:spLocks noGrp="1"/>
+          </p:cNvSpPr>
+          <p:nvPr>
+            <p:ph type="title"/>
+          </p:nvPr>
+        </p:nvSpPr>
+        <p:spPr/>
+        <p:txBody>
+          <a:bodyPr/>
+          <a:lstStyle/>
+          <a:p>
+            <a:r>
+              <a:rPr lang="en-US" dirty="0"/>
+              <a:t>Proof that (P → Q) ↔ (¬P ∨ Q)</a:t>
+            </a:r>
+          </a:p>
+        </p:txBody>
+      </p:sp>
+      <p:sp>
+        <p:nvSpPr>
+          <p:cNvPr id="3" name="Content Placeholder 2">
+            <a:extLst>
+              <a:ext uri="{FF2B5EF4-FFF2-40B4-BE49-F238E27FC236}">
+                <a16:creationId xmlns:a16="http://schemas.microsoft.com/office/drawing/2014/main" id="{2E0AB863-EA41-4B4A-81C9-C52789B385E4}"/>
+              </a:ext>
+            </a:extLst>
+          </p:cNvPr>
+          <p:cNvSpPr>
+            <a:spLocks noGrp="1"/>
+          </p:cNvSpPr>
+          <p:nvPr>
+            <p:ph idx="1"/>
+          </p:nvPr>
+        </p:nvSpPr>
+        <p:spPr/>
+        <p:txBody>
+          <a:bodyPr/>
+          <a:lstStyle/>
+          <a:p>
+            <a:r>
+              <a:rPr lang="en-US" dirty="0"/>
+              <a:t>During the implication discussion we mentioned that “not P or Q” was essentially equivalent to “P implies Q”</a:t>
+            </a:r>
+          </a:p>
+          <a:p>
+            <a:pPr lvl="1"/>
+            <a:r>
+              <a:rPr lang="en-US" dirty="0"/>
+              <a:t>This is only true if one assumes the axiom of the excluded middle (or some other axiom)</a:t>
+            </a:r>
+          </a:p>
+          <a:p>
+            <a:pPr lvl="1"/>
+            <a:endParaRPr lang="en-US" dirty="0"/>
+          </a:p>
+          <a:p>
+            <a:r>
+              <a:rPr lang="en-US"/>
+              <a:t>See proof in Lean</a:t>
+            </a:r>
+          </a:p>
+        </p:txBody>
+      </p:sp>
+      <p:sp>
+        <p:nvSpPr>
+          <p:cNvPr id="4" name="Slide Number Placeholder 3">
+            <a:extLst>
+              <a:ext uri="{FF2B5EF4-FFF2-40B4-BE49-F238E27FC236}">
+                <a16:creationId xmlns:a16="http://schemas.microsoft.com/office/drawing/2014/main" id="{9E396F9F-C759-804A-A97D-9158E9F70E88}"/>
+              </a:ext>
+            </a:extLst>
+          </p:cNvPr>
+          <p:cNvSpPr>
+            <a:spLocks noGrp="1"/>
+          </p:cNvSpPr>
+          <p:nvPr>
+            <p:ph type="sldNum" sz="quarter" idx="12"/>
+          </p:nvPr>
+        </p:nvSpPr>
+        <p:spPr/>
+        <p:txBody>
+          <a:bodyPr/>
+          <a:lstStyle/>
+          <a:p>
+            <a:fld id="{3352CBF5-17B8-4387-88A6-ABF9F8C64D5A}" type="slidenum">
+              <a:rPr lang="en-US" smtClean="0"/>
+              <a:t>16</a:t>
+            </a:fld>
+            <a:endParaRPr lang="en-US"/>
+          </a:p>
+        </p:txBody>
+      </p:sp>
+    </p:spTree>
+    <p:extLst>
+      <p:ext uri="{BB962C8B-B14F-4D97-AF65-F5344CB8AC3E}">
+        <p14:creationId xmlns:p14="http://schemas.microsoft.com/office/powerpoint/2010/main" val="3854619403"/>
+      </p:ext>
+    </p:extLst>
+  </p:cSld>
+  <p:clrMapOvr>
+    <a:masterClrMapping/>
+  </p:clrMapOvr>
+</p:sld>
+</file>
+
+<file path=ppt/slides/slide17.xml><?xml version="1.0" encoding="utf-8"?>
 <p:sld xmlns:a="http://schemas.openxmlformats.org/drawingml/2006/main" xmlns:r="http://schemas.openxmlformats.org/officeDocument/2006/relationships" xmlns:p="http://schemas.openxmlformats.org/presentationml/2006/main">
   <p:cSld>
     <p:bg>
@@ -5211,7 +5343,7 @@
           <a:p>
             <a:fld id="{3352CBF5-17B8-4387-88A6-ABF9F8C64D5A}" type="slidenum">
               <a:rPr lang="en-US" smtClean="0"/>
-              <a:t>16</a:t>
+              <a:t>17</a:t>
             </a:fld>
             <a:endParaRPr lang="en-US"/>
           </a:p>

</xml_diff>